<commit_message>
Java 17 Upgrade PPT v3
</commit_message>
<xml_diff>
--- a/doc/reference/Java_17 _Upgrade.pptx
+++ b/doc/reference/Java_17 _Upgrade.pptx
@@ -18,15 +18,16 @@
     <p:sldId id="304" r:id="rId12"/>
     <p:sldId id="300" r:id="rId13"/>
     <p:sldId id="302" r:id="rId14"/>
-    <p:sldId id="303" r:id="rId15"/>
-    <p:sldId id="293" r:id="rId16"/>
-    <p:sldId id="297" r:id="rId17"/>
-    <p:sldId id="294" r:id="rId18"/>
-    <p:sldId id="298" r:id="rId19"/>
-    <p:sldId id="295" r:id="rId20"/>
-    <p:sldId id="299" r:id="rId21"/>
-    <p:sldId id="290" r:id="rId22"/>
-    <p:sldId id="273" r:id="rId23"/>
+    <p:sldId id="305" r:id="rId15"/>
+    <p:sldId id="303" r:id="rId16"/>
+    <p:sldId id="293" r:id="rId17"/>
+    <p:sldId id="297" r:id="rId18"/>
+    <p:sldId id="294" r:id="rId19"/>
+    <p:sldId id="298" r:id="rId20"/>
+    <p:sldId id="295" r:id="rId21"/>
+    <p:sldId id="299" r:id="rId22"/>
+    <p:sldId id="290" r:id="rId23"/>
+    <p:sldId id="273" r:id="rId24"/>
   </p:sldIdLst>
   <p:sldSz cx="12192000" cy="6858000"/>
   <p:notesSz cx="6858000" cy="9144000"/>
@@ -6900,7 +6901,7 @@
             </a:pPr>
             <a:r>
               <a:rPr lang="en-US" sz="1700" dirty="0"/>
-              <a:t>Extended switch Expressions</a:t>
+              <a:t>Extended switch Expressions (JEP 406)</a:t>
             </a:r>
           </a:p>
           <a:p>
@@ -6934,7 +6935,7 @@
             </a:r>
             <a:r>
               <a:rPr lang="en-US" sz="1700" dirty="0"/>
-              <a:t> Pattern Matching</a:t>
+              <a:t> Pattern Matching (JEP 394)</a:t>
             </a:r>
           </a:p>
           <a:p>
@@ -7686,19 +7687,59 @@
             </a:r>
           </a:p>
           <a:p>
+            <a:pPr lvl="1">
+              <a:buFont typeface="Wingdings" panose="05000000000000000000" pitchFamily="2" charset="2"/>
+              <a:buChar char="Ø"/>
+            </a:pPr>
+            <a:r>
+              <a:rPr lang="en-US" dirty="0"/>
+              <a:t>Applet API</a:t>
+            </a:r>
+          </a:p>
+          <a:p>
+            <a:pPr lvl="1">
+              <a:buFont typeface="Wingdings" panose="05000000000000000000" pitchFamily="2" charset="2"/>
+              <a:buChar char="Ø"/>
+            </a:pPr>
+            <a:r>
+              <a:rPr lang="en-US" dirty="0"/>
+              <a:t>Tracing Flags</a:t>
+            </a:r>
+          </a:p>
+          <a:p>
+            <a:pPr lvl="1">
+              <a:buFont typeface="Wingdings" panose="05000000000000000000" pitchFamily="2" charset="2"/>
+              <a:buChar char="Ø"/>
+            </a:pPr>
+            <a:r>
+              <a:rPr lang="en-US" dirty="0"/>
+              <a:t>Biased Locking</a:t>
+            </a:r>
+          </a:p>
+          <a:p>
+            <a:pPr lvl="1">
+              <a:buFont typeface="Wingdings" panose="05000000000000000000" pitchFamily="2" charset="2"/>
+              <a:buChar char="Ø"/>
+            </a:pPr>
+            <a:r>
+              <a:rPr lang="en-US" dirty="0"/>
+              <a:t>3DES and RC4 in Kerberos</a:t>
+            </a:r>
+          </a:p>
+          <a:p>
+            <a:pPr lvl="1">
+              <a:buFont typeface="Wingdings" panose="05000000000000000000" pitchFamily="2" charset="2"/>
+              <a:buChar char="Ø"/>
+            </a:pPr>
+            <a:r>
+              <a:rPr lang="en-US" dirty="0"/>
+              <a:t>Socket Implementation Factory</a:t>
+            </a:r>
+          </a:p>
+          <a:p>
             <a:r>
               <a:rPr lang="en-US" dirty="0"/>
               <a:t>Removals</a:t>
-            </a:r>
-          </a:p>
-          <a:p>
-            <a:pPr lvl="1">
-              <a:buFont typeface="Wingdings" panose="05000000000000000000" pitchFamily="2" charset="2"/>
-              <a:buChar char="Ø"/>
-            </a:pPr>
-            <a:r>
-              <a:rPr lang="en-US" dirty="0"/>
-              <a:t>JAXB</a:t>
             </a:r>
           </a:p>
           <a:p>
@@ -7722,7 +7763,7 @@
             </a:pPr>
             <a:r>
               <a:rPr lang="en-US" dirty="0"/>
-              <a:t>Parallel Garbage Collector</a:t>
+              <a:t>CMS Garbage Collector</a:t>
             </a:r>
           </a:p>
           <a:p>
@@ -7759,13 +7800,43 @@
               </a:rPr>
               <a:t>option results in an error</a:t>
             </a:r>
-            <a:endParaRPr lang="en-US" b="1" dirty="0">
-              <a:solidFill>
-                <a:schemeClr val="tx2"/>
-              </a:solidFill>
-            </a:endParaRPr>
-          </a:p>
-          <a:p>
+          </a:p>
+          <a:p>
+            <a:pPr lvl="1">
+              <a:buFont typeface="Wingdings" panose="05000000000000000000" pitchFamily="2" charset="2"/>
+              <a:buChar char="Ø"/>
+            </a:pPr>
+            <a:r>
+              <a:rPr lang="en-US" dirty="0">
+                <a:solidFill>
+                  <a:srgbClr val="333333"/>
+                </a:solidFill>
+              </a:rPr>
+              <a:t>R</a:t>
+            </a:r>
+            <a:r>
+              <a:rPr lang="en-US" i="0" dirty="0">
+                <a:solidFill>
+                  <a:srgbClr val="333333"/>
+                </a:solidFill>
+                <a:effectLst/>
+              </a:rPr>
+              <a:t>oot certificates with 1024-bit keys</a:t>
+            </a:r>
+          </a:p>
+          <a:p>
+            <a:pPr lvl="1">
+              <a:buFont typeface="Wingdings" panose="05000000000000000000" pitchFamily="2" charset="2"/>
+              <a:buChar char="Ø"/>
+            </a:pPr>
+            <a:r>
+              <a:rPr lang="en-US" dirty="0">
+                <a:solidFill>
+                  <a:srgbClr val="333333"/>
+                </a:solidFill>
+              </a:rPr>
+              <a:t>Obsolete Tracing Flags</a:t>
+            </a:r>
             <a:endParaRPr lang="en-US" dirty="0"/>
           </a:p>
         </p:txBody>
@@ -7856,11 +7927,352 @@
           </a:xfrm>
         </p:spPr>
         <p:txBody>
-          <a:bodyPr numCol="2">
+          <a:bodyPr numCol="1">
             <a:normAutofit/>
           </a:bodyPr>
           <a:lstStyle/>
           <a:p>
+            <a:pPr lvl="1">
+              <a:buFont typeface="Wingdings" panose="05000000000000000000" pitchFamily="2" charset="2"/>
+              <a:buChar char="Ø"/>
+            </a:pPr>
+            <a:r>
+              <a:rPr lang="en-US" dirty="0"/>
+              <a:t>Removals </a:t>
+            </a:r>
+            <a:r>
+              <a:rPr lang="en-US" sz="1100" dirty="0"/>
+              <a:t>(</a:t>
+            </a:r>
+            <a:r>
+              <a:rPr lang="en-US" sz="1100" dirty="0" err="1"/>
+              <a:t>Cont</a:t>
+            </a:r>
+            <a:r>
+              <a:rPr lang="en-US" sz="1100" dirty="0"/>
+              <a:t>)</a:t>
+            </a:r>
+            <a:endParaRPr lang="en-US" dirty="0">
+              <a:solidFill>
+                <a:srgbClr val="333333"/>
+              </a:solidFill>
+            </a:endParaRPr>
+          </a:p>
+          <a:p>
+            <a:pPr lvl="1">
+              <a:buFont typeface="Wingdings" panose="05000000000000000000" pitchFamily="2" charset="2"/>
+              <a:buChar char="Ø"/>
+            </a:pPr>
+            <a:r>
+              <a:rPr lang="en-US" dirty="0">
+                <a:solidFill>
+                  <a:srgbClr val="333333"/>
+                </a:solidFill>
+              </a:rPr>
+              <a:t>Java EE and CORBA</a:t>
+            </a:r>
+          </a:p>
+          <a:p>
+            <a:pPr lvl="2">
+              <a:buFont typeface="Wingdings" panose="05000000000000000000" pitchFamily="2" charset="2"/>
+              <a:buChar char="Ø"/>
+            </a:pPr>
+            <a:r>
+              <a:rPr lang="en-US" dirty="0">
+                <a:solidFill>
+                  <a:srgbClr val="333333"/>
+                </a:solidFill>
+              </a:rPr>
+              <a:t>JAXB</a:t>
+            </a:r>
+          </a:p>
+          <a:p>
+            <a:pPr lvl="2">
+              <a:buFont typeface="Wingdings" panose="05000000000000000000" pitchFamily="2" charset="2"/>
+              <a:buChar char="Ø"/>
+            </a:pPr>
+            <a:r>
+              <a:rPr lang="en-US" dirty="0">
+                <a:solidFill>
+                  <a:srgbClr val="333333"/>
+                </a:solidFill>
+              </a:rPr>
+              <a:t>JAX-WS</a:t>
+            </a:r>
+          </a:p>
+          <a:p>
+            <a:pPr lvl="1">
+              <a:buFont typeface="Wingdings" panose="05000000000000000000" pitchFamily="2" charset="2"/>
+              <a:buChar char="Ø"/>
+            </a:pPr>
+            <a:r>
+              <a:rPr lang="en-US" dirty="0" err="1">
+                <a:solidFill>
+                  <a:srgbClr val="333333"/>
+                </a:solidFill>
+              </a:rPr>
+              <a:t>JavaDB</a:t>
+            </a:r>
+            <a:endParaRPr lang="en-US" dirty="0">
+              <a:solidFill>
+                <a:srgbClr val="333333"/>
+              </a:solidFill>
+            </a:endParaRPr>
+          </a:p>
+          <a:p>
+            <a:pPr lvl="1">
+              <a:buFont typeface="Wingdings" panose="05000000000000000000" pitchFamily="2" charset="2"/>
+              <a:buChar char="Ø"/>
+            </a:pPr>
+            <a:r>
+              <a:rPr lang="en-US" dirty="0">
+                <a:solidFill>
+                  <a:srgbClr val="333333"/>
+                </a:solidFill>
+              </a:rPr>
+              <a:t>Java </a:t>
+            </a:r>
+            <a:r>
+              <a:rPr lang="en-US" dirty="0" err="1">
+                <a:solidFill>
+                  <a:srgbClr val="333333"/>
+                </a:solidFill>
+              </a:rPr>
+              <a:t>VisualVM</a:t>
+            </a:r>
+            <a:endParaRPr lang="en-US" sz="1100" dirty="0"/>
+          </a:p>
+          <a:p>
+            <a:pPr lvl="1">
+              <a:buFont typeface="Wingdings" panose="05000000000000000000" pitchFamily="2" charset="2"/>
+              <a:buChar char="Ø"/>
+            </a:pPr>
+            <a:r>
+              <a:rPr lang="en-US" dirty="0">
+                <a:solidFill>
+                  <a:srgbClr val="333333"/>
+                </a:solidFill>
+              </a:rPr>
+              <a:t>Javadoc removals</a:t>
+            </a:r>
+          </a:p>
+          <a:p>
+            <a:pPr lvl="2">
+              <a:buFont typeface="Wingdings" panose="05000000000000000000" pitchFamily="2" charset="2"/>
+              <a:buChar char="Ø"/>
+            </a:pPr>
+            <a:r>
+              <a:rPr lang="en-US" dirty="0">
+                <a:solidFill>
+                  <a:srgbClr val="333333"/>
+                </a:solidFill>
+              </a:rPr>
+              <a:t>HTML 4</a:t>
+            </a:r>
+          </a:p>
+          <a:p>
+            <a:pPr lvl="2">
+              <a:buFont typeface="Wingdings" panose="05000000000000000000" pitchFamily="2" charset="2"/>
+              <a:buChar char="Ø"/>
+            </a:pPr>
+            <a:r>
+              <a:rPr lang="en-US" dirty="0">
+                <a:solidFill>
+                  <a:srgbClr val="333333"/>
+                </a:solidFill>
+              </a:rPr>
+              <a:t>Old Javadoc API</a:t>
+            </a:r>
+          </a:p>
+          <a:p>
+            <a:pPr lvl="2">
+              <a:buFont typeface="Wingdings" panose="05000000000000000000" pitchFamily="2" charset="2"/>
+              <a:buChar char="Ø"/>
+            </a:pPr>
+            <a:r>
+              <a:rPr lang="en-US" dirty="0">
+                <a:solidFill>
+                  <a:srgbClr val="333333"/>
+                </a:solidFill>
+              </a:rPr>
+              <a:t>Frames support</a:t>
+            </a:r>
+          </a:p>
+          <a:p>
+            <a:pPr lvl="2">
+              <a:buFont typeface="Wingdings" panose="05000000000000000000" pitchFamily="2" charset="2"/>
+              <a:buChar char="Ø"/>
+            </a:pPr>
+            <a:r>
+              <a:rPr lang="en-US" dirty="0">
+                <a:solidFill>
+                  <a:srgbClr val="333333"/>
+                </a:solidFill>
+              </a:rPr>
+              <a:t>--no-module-directories options</a:t>
+            </a:r>
+          </a:p>
+          <a:p>
+            <a:pPr lvl="2">
+              <a:buFont typeface="Wingdings" panose="05000000000000000000" pitchFamily="2" charset="2"/>
+              <a:buChar char="Ø"/>
+            </a:pPr>
+            <a:r>
+              <a:rPr lang="en-US" dirty="0">
+                <a:solidFill>
+                  <a:srgbClr val="333333"/>
+                </a:solidFill>
+              </a:rPr>
+              <a:t>See </a:t>
+            </a:r>
+            <a:r>
+              <a:rPr lang="en-US" dirty="0">
+                <a:solidFill>
+                  <a:schemeClr val="accent2"/>
+                </a:solidFill>
+                <a:hlinkClick r:id="rId2">
+                  <a:extLst>
+                    <a:ext uri="{A12FA001-AC4F-418D-AE19-62706E023703}">
+                      <ahyp:hlinkClr xmlns:ahyp="http://schemas.microsoft.com/office/drawing/2018/hyperlinkcolor" val="tx"/>
+                    </a:ext>
+                  </a:extLst>
+                </a:hlinkClick>
+              </a:rPr>
+              <a:t>JDK-8235608</a:t>
+            </a:r>
+            <a:endParaRPr lang="en-US" dirty="0">
+              <a:solidFill>
+                <a:schemeClr val="accent2"/>
+              </a:solidFill>
+            </a:endParaRPr>
+          </a:p>
+          <a:p>
+            <a:pPr lvl="1">
+              <a:buFont typeface="Wingdings" panose="05000000000000000000" pitchFamily="2" charset="2"/>
+              <a:buChar char="Ø"/>
+            </a:pPr>
+            <a:r>
+              <a:rPr lang="en-US" dirty="0">
+                <a:solidFill>
+                  <a:schemeClr val="accent2"/>
+                </a:solidFill>
+                <a:hlinkClick r:id="rId3">
+                  <a:extLst>
+                    <a:ext uri="{A12FA001-AC4F-418D-AE19-62706E023703}">
+                      <ahyp:hlinkClr xmlns:ahyp="http://schemas.microsoft.com/office/drawing/2018/hyperlinkcolor" val="tx"/>
+                    </a:ext>
+                  </a:extLst>
+                </a:hlinkClick>
+              </a:rPr>
+              <a:t>Java 12 Release Notes Removals</a:t>
+            </a:r>
+            <a:endParaRPr lang="en-US" dirty="0">
+              <a:solidFill>
+                <a:schemeClr val="accent2"/>
+              </a:solidFill>
+            </a:endParaRPr>
+          </a:p>
+          <a:p>
+            <a:endParaRPr lang="en-US" dirty="0"/>
+          </a:p>
+        </p:txBody>
+      </p:sp>
+    </p:spTree>
+    <p:extLst>
+      <p:ext uri="{BB962C8B-B14F-4D97-AF65-F5344CB8AC3E}">
+        <p14:creationId xmlns:p14="http://schemas.microsoft.com/office/powerpoint/2010/main" val="4003932486"/>
+      </p:ext>
+    </p:extLst>
+  </p:cSld>
+  <p:clrMapOvr>
+    <a:masterClrMapping/>
+  </p:clrMapOvr>
+</p:sld>
+</file>
+
+<file path=ppt/slides/slide15.xml><?xml version="1.0" encoding="utf-8"?>
+<p:sld xmlns:a="http://schemas.openxmlformats.org/drawingml/2006/main" xmlns:r="http://schemas.openxmlformats.org/officeDocument/2006/relationships" xmlns:p="http://schemas.openxmlformats.org/presentationml/2006/main">
+  <p:cSld>
+    <p:spTree>
+      <p:nvGrpSpPr>
+        <p:cNvPr id="1" name=""/>
+        <p:cNvGrpSpPr/>
+        <p:nvPr/>
+      </p:nvGrpSpPr>
+      <p:grpSpPr>
+        <a:xfrm>
+          <a:off x="0" y="0"/>
+          <a:ext cx="0" cy="0"/>
+          <a:chOff x="0" y="0"/>
+          <a:chExt cx="0" cy="0"/>
+        </a:xfrm>
+      </p:grpSpPr>
+      <p:sp>
+        <p:nvSpPr>
+          <p:cNvPr id="2" name="Title 1"/>
+          <p:cNvSpPr>
+            <a:spLocks noGrp="1"/>
+          </p:cNvSpPr>
+          <p:nvPr>
+            <p:ph type="title"/>
+          </p:nvPr>
+        </p:nvSpPr>
+        <p:spPr>
+          <a:xfrm>
+            <a:off x="646111" y="452718"/>
+            <a:ext cx="9404723" cy="910569"/>
+          </a:xfrm>
+        </p:spPr>
+        <p:txBody>
+          <a:bodyPr/>
+          <a:lstStyle/>
+          <a:p>
+            <a:r>
+              <a:rPr lang="en-US" dirty="0"/>
+              <a:t>Changes Since Java 8 </a:t>
+            </a:r>
+            <a:r>
+              <a:rPr lang="en-US" sz="1800" dirty="0"/>
+              <a:t>(</a:t>
+            </a:r>
+            <a:r>
+              <a:rPr lang="en-US" sz="1800" dirty="0" err="1"/>
+              <a:t>Cont</a:t>
+            </a:r>
+            <a:r>
+              <a:rPr lang="en-US" sz="1800" dirty="0"/>
+              <a:t>)</a:t>
+            </a:r>
+          </a:p>
+        </p:txBody>
+      </p:sp>
+      <p:sp>
+        <p:nvSpPr>
+          <p:cNvPr id="3" name="Content Placeholder 2"/>
+          <p:cNvSpPr>
+            <a:spLocks noGrp="1"/>
+          </p:cNvSpPr>
+          <p:nvPr>
+            <p:ph idx="1"/>
+          </p:nvPr>
+        </p:nvSpPr>
+        <p:spPr>
+          <a:xfrm>
+            <a:off x="646111" y="1363287"/>
+            <a:ext cx="9403743" cy="5120639"/>
+          </a:xfrm>
+        </p:spPr>
+        <p:txBody>
+          <a:bodyPr numCol="3">
+            <a:normAutofit lnSpcReduction="10000"/>
+          </a:bodyPr>
+          <a:lstStyle/>
+          <a:p>
+            <a:pPr>
+              <a:lnSpc>
+                <a:spcPct val="110000"/>
+              </a:lnSpc>
+            </a:pPr>
             <a:r>
               <a:rPr lang="en-US" dirty="0"/>
               <a:t>Full JEP List (from Java 9 – Java 17)</a:t>
@@ -7903,6 +8315,16 @@
             </a:pPr>
             <a:r>
               <a:rPr lang="en-US" dirty="0"/>
+              <a:t>240</a:t>
+            </a:r>
+          </a:p>
+          <a:p>
+            <a:pPr lvl="1">
+              <a:buFont typeface="Wingdings" panose="05000000000000000000" pitchFamily="2" charset="2"/>
+              <a:buChar char="Ø"/>
+            </a:pPr>
+            <a:r>
+              <a:rPr lang="en-US" dirty="0"/>
               <a:t>261</a:t>
             </a:r>
           </a:p>
@@ -7923,6 +8345,16 @@
             </a:pPr>
             <a:r>
               <a:rPr lang="en-US" dirty="0"/>
+              <a:t>290</a:t>
+            </a:r>
+          </a:p>
+          <a:p>
+            <a:pPr lvl="1">
+              <a:buFont typeface="Wingdings" panose="05000000000000000000" pitchFamily="2" charset="2"/>
+              <a:buChar char="Ø"/>
+            </a:pPr>
+            <a:r>
+              <a:rPr lang="en-US" dirty="0"/>
               <a:t>318</a:t>
             </a:r>
           </a:p>
@@ -7971,6 +8403,20 @@
               <a:buFont typeface="Wingdings" panose="05000000000000000000" pitchFamily="2" charset="2"/>
               <a:buChar char="Ø"/>
             </a:pPr>
+            <a:endParaRPr lang="en-US" dirty="0"/>
+          </a:p>
+          <a:p>
+            <a:pPr lvl="1">
+              <a:buFont typeface="Wingdings" panose="05000000000000000000" pitchFamily="2" charset="2"/>
+              <a:buChar char="Ø"/>
+            </a:pPr>
+            <a:endParaRPr lang="en-US" dirty="0"/>
+          </a:p>
+          <a:p>
+            <a:pPr lvl="1">
+              <a:buFont typeface="Wingdings" panose="05000000000000000000" pitchFamily="2" charset="2"/>
+              <a:buChar char="Ø"/>
+            </a:pPr>
             <a:r>
               <a:rPr lang="en-US" dirty="0"/>
               <a:t>350</a:t>
@@ -8003,6 +8449,26 @@
             </a:pPr>
             <a:r>
               <a:rPr lang="en-US" dirty="0"/>
+              <a:t>356</a:t>
+            </a:r>
+          </a:p>
+          <a:p>
+            <a:pPr lvl="1">
+              <a:buFont typeface="Wingdings" panose="05000000000000000000" pitchFamily="2" charset="2"/>
+              <a:buChar char="Ø"/>
+            </a:pPr>
+            <a:r>
+              <a:rPr lang="en-US" dirty="0"/>
+              <a:t>363</a:t>
+            </a:r>
+          </a:p>
+          <a:p>
+            <a:pPr lvl="1">
+              <a:buFont typeface="Wingdings" panose="05000000000000000000" pitchFamily="2" charset="2"/>
+              <a:buChar char="Ø"/>
+            </a:pPr>
+            <a:r>
+              <a:rPr lang="en-US" dirty="0"/>
               <a:t>372</a:t>
             </a:r>
           </a:p>
@@ -8013,6 +8479,16 @@
             </a:pPr>
             <a:r>
               <a:rPr lang="en-US" dirty="0"/>
+              <a:t>374</a:t>
+            </a:r>
+          </a:p>
+          <a:p>
+            <a:pPr lvl="1">
+              <a:buFont typeface="Wingdings" panose="05000000000000000000" pitchFamily="2" charset="2"/>
+              <a:buChar char="Ø"/>
+            </a:pPr>
+            <a:r>
+              <a:rPr lang="en-US" dirty="0"/>
               <a:t>377</a:t>
             </a:r>
           </a:p>
@@ -8033,6 +8509,47 @@
             </a:pPr>
             <a:r>
               <a:rPr lang="en-US" dirty="0"/>
+              <a:t>382</a:t>
+            </a:r>
+          </a:p>
+          <a:p>
+            <a:pPr lvl="1">
+              <a:buFont typeface="Wingdings" panose="05000000000000000000" pitchFamily="2" charset="2"/>
+              <a:buChar char="Ø"/>
+            </a:pPr>
+            <a:r>
+              <a:rPr lang="en-US" dirty="0"/>
+              <a:t>391</a:t>
+            </a:r>
+          </a:p>
+          <a:p>
+            <a:pPr lvl="1">
+              <a:buFont typeface="Wingdings" panose="05000000000000000000" pitchFamily="2" charset="2"/>
+              <a:buChar char="Ø"/>
+            </a:pPr>
+            <a:endParaRPr lang="en-US" dirty="0"/>
+          </a:p>
+          <a:p>
+            <a:pPr lvl="1">
+              <a:buFont typeface="Wingdings" panose="05000000000000000000" pitchFamily="2" charset="2"/>
+              <a:buChar char="Ø"/>
+            </a:pPr>
+            <a:endParaRPr lang="en-US" dirty="0"/>
+          </a:p>
+          <a:p>
+            <a:pPr lvl="1">
+              <a:buFont typeface="Wingdings" panose="05000000000000000000" pitchFamily="2" charset="2"/>
+              <a:buChar char="Ø"/>
+            </a:pPr>
+            <a:endParaRPr lang="en-US" dirty="0"/>
+          </a:p>
+          <a:p>
+            <a:pPr lvl="1">
+              <a:buFont typeface="Wingdings" panose="05000000000000000000" pitchFamily="2" charset="2"/>
+              <a:buChar char="Ø"/>
+            </a:pPr>
+            <a:r>
+              <a:rPr lang="en-US" dirty="0"/>
               <a:t>396</a:t>
             </a:r>
           </a:p>
@@ -8043,6 +8560,16 @@
             </a:pPr>
             <a:r>
               <a:rPr lang="en-US" dirty="0"/>
+              <a:t>398</a:t>
+            </a:r>
+          </a:p>
+          <a:p>
+            <a:pPr lvl="1">
+              <a:buFont typeface="Wingdings" panose="05000000000000000000" pitchFamily="2" charset="2"/>
+              <a:buChar char="Ø"/>
+            </a:pPr>
+            <a:r>
+              <a:rPr lang="en-US" dirty="0"/>
               <a:t>403</a:t>
             </a:r>
           </a:p>
@@ -8053,7 +8580,67 @@
             </a:pPr>
             <a:r>
               <a:rPr lang="en-US" dirty="0"/>
+              <a:t>406</a:t>
+            </a:r>
+          </a:p>
+          <a:p>
+            <a:pPr lvl="1">
+              <a:buFont typeface="Wingdings" panose="05000000000000000000" pitchFamily="2" charset="2"/>
+              <a:buChar char="Ø"/>
+            </a:pPr>
+            <a:r>
+              <a:rPr lang="en-US" dirty="0"/>
+              <a:t>407</a:t>
+            </a:r>
+          </a:p>
+          <a:p>
+            <a:pPr lvl="1">
+              <a:buFont typeface="Wingdings" panose="05000000000000000000" pitchFamily="2" charset="2"/>
+              <a:buChar char="Ø"/>
+            </a:pPr>
+            <a:r>
+              <a:rPr lang="en-US" dirty="0"/>
+              <a:t>409</a:t>
+            </a:r>
+          </a:p>
+          <a:p>
+            <a:pPr lvl="1">
+              <a:buFont typeface="Wingdings" panose="05000000000000000000" pitchFamily="2" charset="2"/>
+              <a:buChar char="Ø"/>
+            </a:pPr>
+            <a:r>
+              <a:rPr lang="en-US" dirty="0"/>
+              <a:t>410</a:t>
+            </a:r>
+          </a:p>
+          <a:p>
+            <a:pPr lvl="1">
+              <a:buFont typeface="Wingdings" panose="05000000000000000000" pitchFamily="2" charset="2"/>
+              <a:buChar char="Ø"/>
+            </a:pPr>
+            <a:r>
+              <a:rPr lang="en-US" dirty="0"/>
               <a:t>411</a:t>
+            </a:r>
+          </a:p>
+          <a:p>
+            <a:pPr lvl="1">
+              <a:buFont typeface="Wingdings" panose="05000000000000000000" pitchFamily="2" charset="2"/>
+              <a:buChar char="Ø"/>
+            </a:pPr>
+            <a:r>
+              <a:rPr lang="en-US" dirty="0"/>
+              <a:t>412</a:t>
+            </a:r>
+          </a:p>
+          <a:p>
+            <a:pPr lvl="1">
+              <a:buFont typeface="Wingdings" panose="05000000000000000000" pitchFamily="2" charset="2"/>
+              <a:buChar char="Ø"/>
+            </a:pPr>
+            <a:r>
+              <a:rPr lang="en-US" dirty="0"/>
+              <a:t>415</a:t>
             </a:r>
           </a:p>
           <a:p>
@@ -8078,7 +8665,7 @@
 </p:sld>
 </file>
 
-<file path=ppt/slides/slide15.xml><?xml version="1.0" encoding="utf-8"?>
+<file path=ppt/slides/slide16.xml><?xml version="1.0" encoding="utf-8"?>
 <p:sld xmlns:a="http://schemas.openxmlformats.org/drawingml/2006/main" xmlns:r="http://schemas.openxmlformats.org/officeDocument/2006/relationships" xmlns:p="http://schemas.openxmlformats.org/presentationml/2006/main">
   <p:cSld>
     <p:spTree>
@@ -8173,7 +8760,7 @@
 </p:sld>
 </file>
 
-<file path=ppt/slides/slide16.xml><?xml version="1.0" encoding="utf-8"?>
+<file path=ppt/slides/slide17.xml><?xml version="1.0" encoding="utf-8"?>
 <p:sld xmlns:a="http://schemas.openxmlformats.org/drawingml/2006/main" xmlns:r="http://schemas.openxmlformats.org/officeDocument/2006/relationships" xmlns:p="http://schemas.openxmlformats.org/presentationml/2006/main">
   <p:cSld>
     <p:spTree>
@@ -8257,7 +8844,7 @@
 </p:sld>
 </file>
 
-<file path=ppt/slides/slide17.xml><?xml version="1.0" encoding="utf-8"?>
+<file path=ppt/slides/slide18.xml><?xml version="1.0" encoding="utf-8"?>
 <p:sld xmlns:a="http://schemas.openxmlformats.org/drawingml/2006/main" xmlns:r="http://schemas.openxmlformats.org/officeDocument/2006/relationships" xmlns:p="http://schemas.openxmlformats.org/presentationml/2006/main">
   <p:cSld>
     <p:spTree>
@@ -8352,90 +8939,6 @@
 </p:sld>
 </file>
 
-<file path=ppt/slides/slide18.xml><?xml version="1.0" encoding="utf-8"?>
-<p:sld xmlns:a="http://schemas.openxmlformats.org/drawingml/2006/main" xmlns:r="http://schemas.openxmlformats.org/officeDocument/2006/relationships" xmlns:p="http://schemas.openxmlformats.org/presentationml/2006/main">
-  <p:cSld>
-    <p:spTree>
-      <p:nvGrpSpPr>
-        <p:cNvPr id="1" name=""/>
-        <p:cNvGrpSpPr/>
-        <p:nvPr/>
-      </p:nvGrpSpPr>
-      <p:grpSpPr>
-        <a:xfrm>
-          <a:off x="0" y="0"/>
-          <a:ext cx="0" cy="0"/>
-          <a:chOff x="0" y="0"/>
-          <a:chExt cx="0" cy="0"/>
-        </a:xfrm>
-      </p:grpSpPr>
-      <p:sp>
-        <p:nvSpPr>
-          <p:cNvPr id="2" name="Title 1"/>
-          <p:cNvSpPr>
-            <a:spLocks noGrp="1"/>
-          </p:cNvSpPr>
-          <p:nvPr>
-            <p:ph type="title"/>
-          </p:nvPr>
-        </p:nvSpPr>
-        <p:spPr>
-          <a:xfrm>
-            <a:off x="646111" y="452718"/>
-            <a:ext cx="9404723" cy="910569"/>
-          </a:xfrm>
-        </p:spPr>
-        <p:txBody>
-          <a:bodyPr/>
-          <a:lstStyle/>
-          <a:p>
-            <a:r>
-              <a:rPr lang="en-US" dirty="0"/>
-              <a:t>Common Problems</a:t>
-            </a:r>
-            <a:endParaRPr lang="en-US" sz="1800" dirty="0"/>
-          </a:p>
-        </p:txBody>
-      </p:sp>
-      <p:sp>
-        <p:nvSpPr>
-          <p:cNvPr id="3" name="Content Placeholder 2"/>
-          <p:cNvSpPr>
-            <a:spLocks noGrp="1"/>
-          </p:cNvSpPr>
-          <p:nvPr>
-            <p:ph idx="1"/>
-          </p:nvPr>
-        </p:nvSpPr>
-        <p:spPr>
-          <a:xfrm>
-            <a:off x="646111" y="1363287"/>
-            <a:ext cx="9403743" cy="5120639"/>
-          </a:xfrm>
-        </p:spPr>
-        <p:txBody>
-          <a:bodyPr>
-            <a:normAutofit/>
-          </a:bodyPr>
-          <a:lstStyle/>
-          <a:p>
-            <a:endParaRPr lang="en-US" dirty="0"/>
-          </a:p>
-        </p:txBody>
-      </p:sp>
-    </p:spTree>
-    <p:extLst>
-      <p:ext uri="{BB962C8B-B14F-4D97-AF65-F5344CB8AC3E}">
-        <p14:creationId xmlns:p14="http://schemas.microsoft.com/office/powerpoint/2010/main" val="1972312800"/>
-      </p:ext>
-    </p:extLst>
-  </p:cSld>
-  <p:clrMapOvr>
-    <a:masterClrMapping/>
-  </p:clrMapOvr>
-</p:sld>
-</file>
-
 <file path=ppt/slides/slide19.xml><?xml version="1.0" encoding="utf-8"?>
 <p:sld xmlns:a="http://schemas.openxmlformats.org/drawingml/2006/main" xmlns:r="http://schemas.openxmlformats.org/officeDocument/2006/relationships" xmlns:p="http://schemas.openxmlformats.org/presentationml/2006/main">
   <p:cSld>
@@ -8455,73 +8958,62 @@
       </p:grpSpPr>
       <p:sp>
         <p:nvSpPr>
-          <p:cNvPr id="2" name="Title 1">
-            <a:extLst>
-              <a:ext uri="{FF2B5EF4-FFF2-40B4-BE49-F238E27FC236}">
-                <a16:creationId xmlns:a16="http://schemas.microsoft.com/office/drawing/2014/main" id="{64C64BBE-DC3D-874C-A5D2-96AC27F3F4DB}"/>
-              </a:ext>
-            </a:extLst>
-          </p:cNvPr>
-          <p:cNvSpPr>
-            <a:spLocks noGrp="1"/>
-          </p:cNvSpPr>
-          <p:nvPr>
-            <p:ph type="ctrTitle"/>
+          <p:cNvPr id="2" name="Title 1"/>
+          <p:cNvSpPr>
+            <a:spLocks noGrp="1"/>
+          </p:cNvSpPr>
+          <p:nvPr>
+            <p:ph type="title"/>
           </p:nvPr>
         </p:nvSpPr>
         <p:spPr>
           <a:xfrm>
-            <a:off x="4974337" y="1265314"/>
-            <a:ext cx="4299666" cy="3249131"/>
+            <a:off x="646111" y="452718"/>
+            <a:ext cx="9404723" cy="910569"/>
           </a:xfrm>
         </p:spPr>
         <p:txBody>
-          <a:bodyPr anchorCtr="0">
+          <a:bodyPr/>
+          <a:lstStyle/>
+          <a:p>
+            <a:r>
+              <a:rPr lang="en-US" dirty="0"/>
+              <a:t>Common Problems</a:t>
+            </a:r>
+            <a:endParaRPr lang="en-US" sz="1800" dirty="0"/>
+          </a:p>
+        </p:txBody>
+      </p:sp>
+      <p:sp>
+        <p:nvSpPr>
+          <p:cNvPr id="3" name="Content Placeholder 2"/>
+          <p:cNvSpPr>
+            <a:spLocks noGrp="1"/>
+          </p:cNvSpPr>
+          <p:nvPr>
+            <p:ph idx="1"/>
+          </p:nvPr>
+        </p:nvSpPr>
+        <p:spPr>
+          <a:xfrm>
+            <a:off x="646111" y="1363287"/>
+            <a:ext cx="9403743" cy="5120639"/>
+          </a:xfrm>
+        </p:spPr>
+        <p:txBody>
+          <a:bodyPr>
             <a:normAutofit/>
           </a:bodyPr>
           <a:lstStyle/>
           <a:p>
-            <a:pPr algn="l"/>
-            <a:r>
-              <a:rPr lang="en-US" dirty="0"/>
-              <a:t>Future Java</a:t>
-            </a:r>
-          </a:p>
-        </p:txBody>
-      </p:sp>
-      <p:pic>
-        <p:nvPicPr>
-          <p:cNvPr id="5" name="Picture 4" descr="Close-up of water drops on a leaf in black and white">
-            <a:extLst>
-              <a:ext uri="{FF2B5EF4-FFF2-40B4-BE49-F238E27FC236}">
-                <a16:creationId xmlns:a16="http://schemas.microsoft.com/office/drawing/2014/main" id="{5B4601BB-44D3-39F5-A38E-46E6C44A3CB2}"/>
-              </a:ext>
-            </a:extLst>
-          </p:cNvPr>
-          <p:cNvPicPr>
-            <a:picLocks noChangeAspect="1"/>
-          </p:cNvPicPr>
-          <p:nvPr/>
-        </p:nvPicPr>
-        <p:blipFill rotWithShape="1">
-          <a:blip r:embed="rId2"/>
-          <a:srcRect l="14920" r="16571"/>
-          <a:stretch/>
-        </p:blipFill>
-        <p:spPr>
-          <a:xfrm>
-            <a:off x="888604" y="1605352"/>
-            <a:ext cx="3765692" cy="3655265"/>
-          </a:xfrm>
-          <a:prstGeom prst="rect">
-            <a:avLst/>
-          </a:prstGeom>
-        </p:spPr>
-      </p:pic>
+            <a:endParaRPr lang="en-US" dirty="0"/>
+          </a:p>
+        </p:txBody>
+      </p:sp>
     </p:spTree>
     <p:extLst>
       <p:ext uri="{BB962C8B-B14F-4D97-AF65-F5344CB8AC3E}">
-        <p14:creationId xmlns:p14="http://schemas.microsoft.com/office/powerpoint/2010/main" val="2586199879"/>
+        <p14:creationId xmlns:p14="http://schemas.microsoft.com/office/powerpoint/2010/main" val="1972312800"/>
       </p:ext>
     </p:extLst>
   </p:cSld>
@@ -8797,6 +9289,101 @@
       </p:grpSpPr>
       <p:sp>
         <p:nvSpPr>
+          <p:cNvPr id="2" name="Title 1">
+            <a:extLst>
+              <a:ext uri="{FF2B5EF4-FFF2-40B4-BE49-F238E27FC236}">
+                <a16:creationId xmlns:a16="http://schemas.microsoft.com/office/drawing/2014/main" id="{64C64BBE-DC3D-874C-A5D2-96AC27F3F4DB}"/>
+              </a:ext>
+            </a:extLst>
+          </p:cNvPr>
+          <p:cNvSpPr>
+            <a:spLocks noGrp="1"/>
+          </p:cNvSpPr>
+          <p:nvPr>
+            <p:ph type="ctrTitle"/>
+          </p:nvPr>
+        </p:nvSpPr>
+        <p:spPr>
+          <a:xfrm>
+            <a:off x="4974337" y="1265314"/>
+            <a:ext cx="4299666" cy="3249131"/>
+          </a:xfrm>
+        </p:spPr>
+        <p:txBody>
+          <a:bodyPr anchorCtr="0">
+            <a:normAutofit/>
+          </a:bodyPr>
+          <a:lstStyle/>
+          <a:p>
+            <a:pPr algn="l"/>
+            <a:r>
+              <a:rPr lang="en-US" dirty="0"/>
+              <a:t>Future Java</a:t>
+            </a:r>
+          </a:p>
+        </p:txBody>
+      </p:sp>
+      <p:pic>
+        <p:nvPicPr>
+          <p:cNvPr id="5" name="Picture 4" descr="Close-up of water drops on a leaf in black and white">
+            <a:extLst>
+              <a:ext uri="{FF2B5EF4-FFF2-40B4-BE49-F238E27FC236}">
+                <a16:creationId xmlns:a16="http://schemas.microsoft.com/office/drawing/2014/main" id="{5B4601BB-44D3-39F5-A38E-46E6C44A3CB2}"/>
+              </a:ext>
+            </a:extLst>
+          </p:cNvPr>
+          <p:cNvPicPr>
+            <a:picLocks noChangeAspect="1"/>
+          </p:cNvPicPr>
+          <p:nvPr/>
+        </p:nvPicPr>
+        <p:blipFill rotWithShape="1">
+          <a:blip r:embed="rId2"/>
+          <a:srcRect l="14920" r="16571"/>
+          <a:stretch/>
+        </p:blipFill>
+        <p:spPr>
+          <a:xfrm>
+            <a:off x="888604" y="1605352"/>
+            <a:ext cx="3765692" cy="3655265"/>
+          </a:xfrm>
+          <a:prstGeom prst="rect">
+            <a:avLst/>
+          </a:prstGeom>
+        </p:spPr>
+      </p:pic>
+    </p:spTree>
+    <p:extLst>
+      <p:ext uri="{BB962C8B-B14F-4D97-AF65-F5344CB8AC3E}">
+        <p14:creationId xmlns:p14="http://schemas.microsoft.com/office/powerpoint/2010/main" val="2586199879"/>
+      </p:ext>
+    </p:extLst>
+  </p:cSld>
+  <p:clrMapOvr>
+    <a:masterClrMapping/>
+  </p:clrMapOvr>
+</p:sld>
+</file>
+
+<file path=ppt/slides/slide21.xml><?xml version="1.0" encoding="utf-8"?>
+<p:sld xmlns:a="http://schemas.openxmlformats.org/drawingml/2006/main" xmlns:r="http://schemas.openxmlformats.org/officeDocument/2006/relationships" xmlns:p="http://schemas.openxmlformats.org/presentationml/2006/main">
+  <p:cSld>
+    <p:spTree>
+      <p:nvGrpSpPr>
+        <p:cNvPr id="1" name=""/>
+        <p:cNvGrpSpPr/>
+        <p:nvPr/>
+      </p:nvGrpSpPr>
+      <p:grpSpPr>
+        <a:xfrm>
+          <a:off x="0" y="0"/>
+          <a:ext cx="0" cy="0"/>
+          <a:chOff x="0" y="0"/>
+          <a:chExt cx="0" cy="0"/>
+        </a:xfrm>
+      </p:grpSpPr>
+      <p:sp>
+        <p:nvSpPr>
           <p:cNvPr id="2" name="Title 1"/>
           <p:cNvSpPr>
             <a:spLocks noGrp="1"/>
@@ -8862,7 +9449,7 @@
 </p:sld>
 </file>
 
-<file path=ppt/slides/slide21.xml><?xml version="1.0" encoding="utf-8"?>
+<file path=ppt/slides/slide22.xml><?xml version="1.0" encoding="utf-8"?>
 <p:sld xmlns:a="http://schemas.openxmlformats.org/drawingml/2006/main" xmlns:r="http://schemas.openxmlformats.org/officeDocument/2006/relationships" xmlns:p="http://schemas.openxmlformats.org/presentationml/2006/main">
   <p:cSld>
     <p:spTree>
@@ -8957,7 +9544,7 @@
 </p:sld>
 </file>
 
-<file path=ppt/slides/slide22.xml><?xml version="1.0" encoding="utf-8"?>
+<file path=ppt/slides/slide23.xml><?xml version="1.0" encoding="utf-8"?>
 <p:sld xmlns:a="http://schemas.openxmlformats.org/drawingml/2006/main" xmlns:r="http://schemas.openxmlformats.org/officeDocument/2006/relationships" xmlns:p="http://schemas.openxmlformats.org/presentationml/2006/main">
   <p:cSld>
     <p:spTree>
@@ -9359,7 +9946,7 @@
                   </a:extLst>
                 </a:hlinkClick>
               </a:rPr>
-              <a:t>Java 17 Features: A comparison between versions 8 and 17. What has changed over the years?</a:t>
+              <a:t>Java 17</a:t>
             </a:r>
             <a:endParaRPr lang="en-US" sz="1600" dirty="0">
               <a:solidFill>
@@ -9403,7 +9990,7 @@
                   </a:extLst>
                 </a:hlinkClick>
               </a:rPr>
-              <a:t>Java Version Almanac</a:t>
+              <a:t>Java 17 Features: A comparison between versions 8 and 17. What has changed over the years?</a:t>
             </a:r>
             <a:endParaRPr lang="en-US" sz="1600" dirty="0">
               <a:solidFill>
@@ -9447,7 +10034,7 @@
                   </a:extLst>
                 </a:hlinkClick>
               </a:rPr>
-              <a:t>JEP-0 (JDK Enhancements and Proposals)</a:t>
+              <a:t>Java Version Almanac</a:t>
             </a:r>
             <a:endParaRPr lang="en-US" sz="1600" dirty="0">
               <a:solidFill>
@@ -9483,9 +10070,103 @@
                     </a:prstClr>
                   </a:glow>
                 </a:effectLst>
-                <a:hlinkClick r:id="rId11"/>
+                <a:hlinkClick r:id="rId11">
+                  <a:extLst>
+                    <a:ext uri="{A12FA001-AC4F-418D-AE19-62706E023703}">
+                      <ahyp:hlinkClr xmlns:ahyp="http://schemas.microsoft.com/office/drawing/2018/hyperlinkcolor" val="tx"/>
+                    </a:ext>
+                  </a:extLst>
+                </a:hlinkClick>
+              </a:rPr>
+              <a:t>JEP-0 (JDK Enhancements and Proposals)</a:t>
+            </a:r>
+            <a:endParaRPr lang="en-US" sz="1600" dirty="0">
+              <a:solidFill>
+                <a:schemeClr val="accent2"/>
+              </a:solidFill>
+              <a:effectLst>
+                <a:glow rad="38100">
+                  <a:prstClr val="black">
+                    <a:lumMod val="50000"/>
+                    <a:lumOff val="50000"/>
+                    <a:alpha val="20000"/>
+                  </a:prstClr>
+                </a:glow>
+              </a:effectLst>
+            </a:endParaRPr>
+          </a:p>
+          <a:p>
+            <a:pPr marL="285750" indent="-285750">
+              <a:buFont typeface="Arial" panose="020B0604020202020204" pitchFamily="34" charset="0"/>
+              <a:buChar char="•"/>
+            </a:pPr>
+            <a:r>
+              <a:rPr lang="en-US" sz="1600" dirty="0">
+                <a:solidFill>
+                  <a:schemeClr val="accent2"/>
+                </a:solidFill>
+                <a:effectLst>
+                  <a:glow rad="38100">
+                    <a:prstClr val="black">
+                      <a:lumMod val="50000"/>
+                      <a:lumOff val="50000"/>
+                      <a:alpha val="20000"/>
+                    </a:prstClr>
+                  </a:glow>
+                </a:effectLst>
+                <a:hlinkClick r:id="rId12">
+                  <a:extLst>
+                    <a:ext uri="{A12FA001-AC4F-418D-AE19-62706E023703}">
+                      <ahyp:hlinkClr xmlns:ahyp="http://schemas.microsoft.com/office/drawing/2018/hyperlinkcolor" val="tx"/>
+                    </a:ext>
+                  </a:extLst>
+                </a:hlinkClick>
               </a:rPr>
               <a:t>Monitoring Java Application with Flight Recorder</a:t>
+            </a:r>
+            <a:endParaRPr lang="en-US" sz="1600" dirty="0">
+              <a:solidFill>
+                <a:schemeClr val="accent2"/>
+              </a:solidFill>
+              <a:effectLst>
+                <a:glow rad="38100">
+                  <a:prstClr val="black">
+                    <a:lumMod val="50000"/>
+                    <a:lumOff val="50000"/>
+                    <a:alpha val="20000"/>
+                  </a:prstClr>
+                </a:glow>
+              </a:effectLst>
+            </a:endParaRPr>
+          </a:p>
+          <a:p>
+            <a:pPr marL="285750" indent="-285750">
+              <a:buFont typeface="Arial" panose="020B0604020202020204" pitchFamily="34" charset="0"/>
+              <a:buChar char="•"/>
+            </a:pPr>
+            <a:r>
+              <a:rPr lang="en-US" sz="1600" dirty="0">
+                <a:solidFill>
+                  <a:schemeClr val="accent2"/>
+                </a:solidFill>
+                <a:effectLst>
+                  <a:glow rad="38100">
+                    <a:prstClr val="black">
+                      <a:lumMod val="50000"/>
+                      <a:lumOff val="50000"/>
+                      <a:alpha val="20000"/>
+                    </a:prstClr>
+                  </a:glow>
+                </a:effectLst>
+                <a:hlinkClick r:id="rId13">
+                  <a:extLst>
+                    <a:ext uri="{A12FA001-AC4F-418D-AE19-62706E023703}">
+                      <ahyp:hlinkClr xmlns:ahyp="http://schemas.microsoft.com/office/drawing/2018/hyperlinkcolor" val="tx"/>
+                    </a:ext>
+                  </a:extLst>
+                </a:hlinkClick>
+              </a:rPr>
+              <a:t>Oracle JDK Migration Guide</a:t>
             </a:r>
             <a:endParaRPr lang="en-US" sz="1600" dirty="0">
               <a:solidFill>

</xml_diff>

<commit_message>
Java Upgrade PPT v4
</commit_message>
<xml_diff>
--- a/doc/reference/Java_17 _Upgrade.pptx
+++ b/doc/reference/Java_17 _Upgrade.pptx
@@ -22,12 +22,14 @@
     <p:sldId id="303" r:id="rId16"/>
     <p:sldId id="293" r:id="rId17"/>
     <p:sldId id="297" r:id="rId18"/>
-    <p:sldId id="294" r:id="rId19"/>
-    <p:sldId id="298" r:id="rId20"/>
-    <p:sldId id="295" r:id="rId21"/>
-    <p:sldId id="299" r:id="rId22"/>
-    <p:sldId id="290" r:id="rId23"/>
-    <p:sldId id="273" r:id="rId24"/>
+    <p:sldId id="306" r:id="rId19"/>
+    <p:sldId id="294" r:id="rId20"/>
+    <p:sldId id="298" r:id="rId21"/>
+    <p:sldId id="308" r:id="rId22"/>
+    <p:sldId id="295" r:id="rId23"/>
+    <p:sldId id="299" r:id="rId24"/>
+    <p:sldId id="290" r:id="rId25"/>
+    <p:sldId id="273" r:id="rId26"/>
   </p:sldIdLst>
   <p:sldSz cx="12192000" cy="6858000"/>
   <p:notesSz cx="6858000" cy="9144000"/>
@@ -856,7 +858,7 @@
           <a:p>
             <a:fld id="{4AAD347D-5ACD-4C99-B74B-A9C85AD731AF}" type="datetimeFigureOut">
               <a:rPr lang="en-US" smtClean="0"/>
-              <a:t>10/31/2022</a:t>
+              <a:t>11/9/2022</a:t>
             </a:fld>
             <a:endParaRPr lang="en-US" dirty="0"/>
           </a:p>
@@ -1107,7 +1109,7 @@
           <a:p>
             <a:fld id="{4AAD347D-5ACD-4C99-B74B-A9C85AD731AF}" type="datetimeFigureOut">
               <a:rPr lang="en-US" smtClean="0"/>
-              <a:t>10/31/2022</a:t>
+              <a:t>11/9/2022</a:t>
             </a:fld>
             <a:endParaRPr lang="en-US" dirty="0"/>
           </a:p>
@@ -1422,7 +1424,7 @@
           <a:p>
             <a:fld id="{4AAD347D-5ACD-4C99-B74B-A9C85AD731AF}" type="datetimeFigureOut">
               <a:rPr lang="en-US" smtClean="0"/>
-              <a:t>10/31/2022</a:t>
+              <a:t>11/9/2022</a:t>
             </a:fld>
             <a:endParaRPr lang="en-US" dirty="0"/>
           </a:p>
@@ -1764,7 +1766,7 @@
           <a:p>
             <a:fld id="{4509A250-FF31-4206-8172-F9D3106AACB1}" type="datetimeFigureOut">
               <a:rPr lang="en-US" smtClean="0"/>
-              <a:t>10/31/2022</a:t>
+              <a:t>11/9/2022</a:t>
             </a:fld>
             <a:endParaRPr lang="en-US" dirty="0"/>
           </a:p>
@@ -2078,7 +2080,7 @@
           <a:p>
             <a:fld id="{4AAD347D-5ACD-4C99-B74B-A9C85AD731AF}" type="datetimeFigureOut">
               <a:rPr lang="en-US" smtClean="0"/>
-              <a:t>10/31/2022</a:t>
+              <a:t>11/9/2022</a:t>
             </a:fld>
             <a:endParaRPr lang="en-US" dirty="0"/>
           </a:p>
@@ -2472,7 +2474,7 @@
           <a:p>
             <a:fld id="{4AAD347D-5ACD-4C99-B74B-A9C85AD731AF}" type="datetimeFigureOut">
               <a:rPr lang="en-US" smtClean="0"/>
-              <a:t>10/31/2022</a:t>
+              <a:t>11/9/2022</a:t>
             </a:fld>
             <a:endParaRPr lang="en-US" dirty="0"/>
           </a:p>
@@ -2643,7 +2645,7 @@
           <a:p>
             <a:fld id="{4509A250-FF31-4206-8172-F9D3106AACB1}" type="datetimeFigureOut">
               <a:rPr lang="en-US" smtClean="0"/>
-              <a:t>10/31/2022</a:t>
+              <a:t>11/9/2022</a:t>
             </a:fld>
             <a:endParaRPr lang="en-US" dirty="0"/>
           </a:p>
@@ -2823,7 +2825,7 @@
           <a:p>
             <a:fld id="{4509A250-FF31-4206-8172-F9D3106AACB1}" type="datetimeFigureOut">
               <a:rPr lang="en-US" smtClean="0"/>
-              <a:t>10/31/2022</a:t>
+              <a:t>11/9/2022</a:t>
             </a:fld>
             <a:endParaRPr lang="en-US" dirty="0"/>
           </a:p>
@@ -2999,7 +3001,7 @@
           <a:p>
             <a:fld id="{4509A250-FF31-4206-8172-F9D3106AACB1}" type="datetimeFigureOut">
               <a:rPr lang="en-US" smtClean="0"/>
-              <a:t>10/31/2022</a:t>
+              <a:t>11/9/2022</a:t>
             </a:fld>
             <a:endParaRPr lang="en-US" dirty="0"/>
           </a:p>
@@ -3246,7 +3248,7 @@
           <a:p>
             <a:fld id="{9796027F-7875-4030-9381-8BD8C4F21935}" type="datetimeFigureOut">
               <a:rPr lang="en-US" smtClean="0"/>
-              <a:t>10/31/2022</a:t>
+              <a:t>11/9/2022</a:t>
             </a:fld>
             <a:endParaRPr lang="en-US" dirty="0"/>
           </a:p>
@@ -3478,7 +3480,7 @@
           <a:p>
             <a:fld id="{9796027F-7875-4030-9381-8BD8C4F21935}" type="datetimeFigureOut">
               <a:rPr lang="en-US" smtClean="0"/>
-              <a:t>10/31/2022</a:t>
+              <a:t>11/9/2022</a:t>
             </a:fld>
             <a:endParaRPr lang="en-US" dirty="0"/>
           </a:p>
@@ -3852,7 +3854,7 @@
           <a:p>
             <a:fld id="{9796027F-7875-4030-9381-8BD8C4F21935}" type="datetimeFigureOut">
               <a:rPr lang="en-US" smtClean="0"/>
-              <a:t>10/31/2022</a:t>
+              <a:t>11/9/2022</a:t>
             </a:fld>
             <a:endParaRPr lang="en-US" dirty="0"/>
           </a:p>
@@ -3975,7 +3977,7 @@
           <a:p>
             <a:fld id="{4509A250-FF31-4206-8172-F9D3106AACB1}" type="datetimeFigureOut">
               <a:rPr lang="en-US" smtClean="0"/>
-              <a:t>10/31/2022</a:t>
+              <a:t>11/9/2022</a:t>
             </a:fld>
             <a:endParaRPr lang="en-US" dirty="0"/>
           </a:p>
@@ -4070,7 +4072,7 @@
           <a:p>
             <a:fld id="{4509A250-FF31-4206-8172-F9D3106AACB1}" type="datetimeFigureOut">
               <a:rPr lang="en-US" smtClean="0"/>
-              <a:t>10/31/2022</a:t>
+              <a:t>11/9/2022</a:t>
             </a:fld>
             <a:endParaRPr lang="en-US" dirty="0"/>
           </a:p>
@@ -4325,7 +4327,7 @@
           <a:p>
             <a:fld id="{4509A250-FF31-4206-8172-F9D3106AACB1}" type="datetimeFigureOut">
               <a:rPr lang="en-US" smtClean="0"/>
-              <a:t>10/31/2022</a:t>
+              <a:t>11/9/2022</a:t>
             </a:fld>
             <a:endParaRPr lang="en-US" dirty="0"/>
           </a:p>
@@ -4588,7 +4590,7 @@
           <a:p>
             <a:fld id="{4509A250-FF31-4206-8172-F9D3106AACB1}" type="datetimeFigureOut">
               <a:rPr lang="en-US" smtClean="0"/>
-              <a:t>10/31/2022</a:t>
+              <a:t>11/9/2022</a:t>
             </a:fld>
             <a:endParaRPr lang="en-US" dirty="0"/>
           </a:p>
@@ -5331,7 +5333,7 @@
           <a:p>
             <a:fld id="{4AAD347D-5ACD-4C99-B74B-A9C85AD731AF}" type="datetimeFigureOut">
               <a:rPr lang="en-US" smtClean="0"/>
-              <a:t>10/31/2022</a:t>
+              <a:t>11/9/2022</a:t>
             </a:fld>
             <a:endParaRPr lang="en-US" dirty="0"/>
           </a:p>
@@ -8713,7 +8715,7 @@
             <a:pPr algn="l"/>
             <a:r>
               <a:rPr lang="en-US" dirty="0"/>
-              <a:t>JEPs Implemented</a:t>
+              <a:t>Common JEP Issues</a:t>
             </a:r>
           </a:p>
         </p:txBody>
@@ -8799,7 +8801,7 @@
           <a:p>
             <a:r>
               <a:rPr lang="en-US" dirty="0"/>
-              <a:t>JEPs Implemented</a:t>
+              <a:t>Common JEP Issues</a:t>
             </a:r>
             <a:endParaRPr lang="en-US" sz="1800" dirty="0"/>
           </a:p>
@@ -8826,6 +8828,116 @@
             <a:normAutofit/>
           </a:bodyPr>
           <a:lstStyle/>
+          <a:p>
+            <a:r>
+              <a:rPr lang="en-US" dirty="0"/>
+              <a:t>Thirty-three (33) JEPs implemented from Java 9 to Java 17</a:t>
+            </a:r>
+          </a:p>
+          <a:p>
+            <a:pPr lvl="1">
+              <a:buFont typeface="Wingdings" panose="05000000000000000000" pitchFamily="2" charset="2"/>
+              <a:buChar char="Ø"/>
+            </a:pPr>
+            <a:r>
+              <a:rPr lang="en-US" dirty="0"/>
+              <a:t>Many are new features</a:t>
+            </a:r>
+          </a:p>
+          <a:p>
+            <a:pPr lvl="1">
+              <a:buFont typeface="Wingdings" panose="05000000000000000000" pitchFamily="2" charset="2"/>
+              <a:buChar char="Ø"/>
+            </a:pPr>
+            <a:r>
+              <a:rPr lang="en-US" dirty="0"/>
+              <a:t>Several to fix bugs</a:t>
+            </a:r>
+          </a:p>
+          <a:p>
+            <a:pPr lvl="1">
+              <a:buFont typeface="Wingdings" panose="05000000000000000000" pitchFamily="2" charset="2"/>
+              <a:buChar char="Ø"/>
+            </a:pPr>
+            <a:r>
+              <a:rPr lang="en-US" dirty="0"/>
+              <a:t>Several to address design issues</a:t>
+            </a:r>
+          </a:p>
+          <a:p>
+            <a:pPr lvl="1">
+              <a:buFont typeface="Wingdings" panose="05000000000000000000" pitchFamily="2" charset="2"/>
+              <a:buChar char="Ø"/>
+            </a:pPr>
+            <a:r>
+              <a:rPr lang="en-US" dirty="0"/>
+              <a:t>Several API changes</a:t>
+            </a:r>
+          </a:p>
+          <a:p>
+            <a:pPr lvl="1">
+              <a:buFont typeface="Wingdings" panose="05000000000000000000" pitchFamily="2" charset="2"/>
+              <a:buChar char="Ø"/>
+            </a:pPr>
+            <a:r>
+              <a:rPr lang="en-US" dirty="0"/>
+              <a:t>Several removed features. APIs, etc.</a:t>
+            </a:r>
+          </a:p>
+          <a:p>
+            <a:r>
+              <a:rPr lang="en-US" dirty="0"/>
+              <a:t>Some may impact Java 8 applications</a:t>
+            </a:r>
+          </a:p>
+          <a:p>
+            <a:pPr lvl="1">
+              <a:buFont typeface="Wingdings" panose="05000000000000000000" pitchFamily="2" charset="2"/>
+              <a:buChar char="Ø"/>
+            </a:pPr>
+            <a:r>
+              <a:rPr lang="en-US" dirty="0"/>
+              <a:t>*JEP 372: Remove the </a:t>
+            </a:r>
+            <a:r>
+              <a:rPr lang="en-US" dirty="0" err="1"/>
+              <a:t>Nashorn</a:t>
+            </a:r>
+            <a:r>
+              <a:rPr lang="en-US" dirty="0"/>
+              <a:t> JavaScript Engine</a:t>
+            </a:r>
+          </a:p>
+          <a:p>
+            <a:pPr lvl="1">
+              <a:buFont typeface="Wingdings" panose="05000000000000000000" pitchFamily="2" charset="2"/>
+              <a:buChar char="Ø"/>
+            </a:pPr>
+            <a:r>
+              <a:rPr lang="en-US" dirty="0"/>
+              <a:t> JEP 396: Strongly Encapsulate JDK Internals by Default</a:t>
+            </a:r>
+          </a:p>
+          <a:p>
+            <a:pPr lvl="1">
+              <a:buFont typeface="Wingdings" panose="05000000000000000000" pitchFamily="2" charset="2"/>
+              <a:buChar char="Ø"/>
+            </a:pPr>
+            <a:r>
+              <a:rPr lang="en-US" dirty="0"/>
+              <a:t> JEP 403: Strongly Encapsulate JDK Internals</a:t>
+            </a:r>
+          </a:p>
+          <a:p>
+            <a:pPr lvl="1">
+              <a:buFont typeface="Wingdings" panose="05000000000000000000" pitchFamily="2" charset="2"/>
+              <a:buChar char="Ø"/>
+            </a:pPr>
+            <a:r>
+              <a:rPr lang="en-US" dirty="0"/>
+              <a:t>*JEP 411: Deprecate the Security Manager for Removal</a:t>
+            </a:r>
+          </a:p>
           <a:p>
             <a:endParaRPr lang="en-US" dirty="0"/>
           </a:p>
@@ -8845,6 +8957,231 @@
 </file>
 
 <file path=ppt/slides/slide18.xml><?xml version="1.0" encoding="utf-8"?>
+<p:sld xmlns:a="http://schemas.openxmlformats.org/drawingml/2006/main" xmlns:r="http://schemas.openxmlformats.org/officeDocument/2006/relationships" xmlns:p="http://schemas.openxmlformats.org/presentationml/2006/main">
+  <p:cSld>
+    <p:spTree>
+      <p:nvGrpSpPr>
+        <p:cNvPr id="1" name=""/>
+        <p:cNvGrpSpPr/>
+        <p:nvPr/>
+      </p:nvGrpSpPr>
+      <p:grpSpPr>
+        <a:xfrm>
+          <a:off x="0" y="0"/>
+          <a:ext cx="0" cy="0"/>
+          <a:chOff x="0" y="0"/>
+          <a:chExt cx="0" cy="0"/>
+        </a:xfrm>
+      </p:grpSpPr>
+      <p:sp>
+        <p:nvSpPr>
+          <p:cNvPr id="2" name="Title 1"/>
+          <p:cNvSpPr>
+            <a:spLocks noGrp="1"/>
+          </p:cNvSpPr>
+          <p:nvPr>
+            <p:ph type="title"/>
+          </p:nvPr>
+        </p:nvSpPr>
+        <p:spPr>
+          <a:xfrm>
+            <a:off x="646111" y="452718"/>
+            <a:ext cx="9404723" cy="910569"/>
+          </a:xfrm>
+        </p:spPr>
+        <p:txBody>
+          <a:bodyPr/>
+          <a:lstStyle/>
+          <a:p>
+            <a:r>
+              <a:rPr lang="en-US" dirty="0"/>
+              <a:t>Common JEP Issues </a:t>
+            </a:r>
+            <a:r>
+              <a:rPr lang="en-US" sz="1800" dirty="0"/>
+              <a:t>(</a:t>
+            </a:r>
+            <a:r>
+              <a:rPr lang="en-US" sz="1800" dirty="0" err="1"/>
+              <a:t>Cont</a:t>
+            </a:r>
+            <a:r>
+              <a:rPr lang="en-US" sz="1800" dirty="0"/>
+              <a:t>)</a:t>
+            </a:r>
+          </a:p>
+        </p:txBody>
+      </p:sp>
+      <p:sp>
+        <p:nvSpPr>
+          <p:cNvPr id="3" name="Content Placeholder 2"/>
+          <p:cNvSpPr>
+            <a:spLocks noGrp="1"/>
+          </p:cNvSpPr>
+          <p:nvPr>
+            <p:ph idx="1"/>
+          </p:nvPr>
+        </p:nvSpPr>
+        <p:spPr>
+          <a:xfrm>
+            <a:off x="646111" y="1363287"/>
+            <a:ext cx="9403743" cy="5120639"/>
+          </a:xfrm>
+        </p:spPr>
+        <p:txBody>
+          <a:bodyPr>
+            <a:normAutofit/>
+          </a:bodyPr>
+          <a:lstStyle/>
+          <a:p>
+            <a:pPr>
+              <a:buFont typeface="Wingdings" panose="05000000000000000000" pitchFamily="2" charset="2"/>
+              <a:buChar char="Ø"/>
+            </a:pPr>
+            <a:r>
+              <a:rPr lang="en-US" dirty="0"/>
+              <a:t>JEP 372: Remove the </a:t>
+            </a:r>
+            <a:r>
+              <a:rPr lang="en-US" dirty="0" err="1"/>
+              <a:t>Nashorn</a:t>
+            </a:r>
+            <a:r>
+              <a:rPr lang="en-US" dirty="0"/>
+              <a:t> JavaScript Engine</a:t>
+            </a:r>
+          </a:p>
+          <a:p>
+            <a:pPr lvl="1">
+              <a:buFont typeface="Wingdings" panose="05000000000000000000" pitchFamily="2" charset="2"/>
+              <a:buChar char="Ø"/>
+            </a:pPr>
+            <a:r>
+              <a:rPr lang="en-US" dirty="0"/>
+              <a:t>JSON or JavaScript that used </a:t>
+            </a:r>
+            <a:r>
+              <a:rPr lang="en-US" dirty="0" err="1"/>
+              <a:t>Nashorn</a:t>
+            </a:r>
+            <a:r>
+              <a:rPr lang="en-US" dirty="0"/>
+              <a:t> will throw an exception (compile or runtime)</a:t>
+            </a:r>
+          </a:p>
+          <a:p>
+            <a:pPr>
+              <a:buFont typeface="Wingdings" panose="05000000000000000000" pitchFamily="2" charset="2"/>
+              <a:buChar char="Ø"/>
+            </a:pPr>
+            <a:r>
+              <a:rPr lang="en-US" dirty="0"/>
+              <a:t> JEP 396 &amp; 403: Strongly Encapsulate JDK</a:t>
+            </a:r>
+          </a:p>
+          <a:p>
+            <a:pPr lvl="1">
+              <a:buFont typeface="Wingdings" panose="05000000000000000000" pitchFamily="2" charset="2"/>
+              <a:buChar char="Ø"/>
+            </a:pPr>
+            <a:r>
+              <a:rPr lang="en-US" dirty="0"/>
+              <a:t>Internal Java classes and methods should never be used</a:t>
+            </a:r>
+          </a:p>
+          <a:p>
+            <a:pPr lvl="1">
+              <a:buFont typeface="Wingdings" panose="05000000000000000000" pitchFamily="2" charset="2"/>
+              <a:buChar char="Ø"/>
+            </a:pPr>
+            <a:r>
+              <a:rPr lang="en-US" dirty="0"/>
+              <a:t>Java internals will not be accessible</a:t>
+            </a:r>
+          </a:p>
+          <a:p>
+            <a:pPr>
+              <a:buFont typeface="Wingdings" panose="05000000000000000000" pitchFamily="2" charset="2"/>
+              <a:buChar char="Ø"/>
+            </a:pPr>
+            <a:r>
+              <a:rPr lang="en-US" dirty="0"/>
+              <a:t>JEP 411: Deprecate the Security Manager for Removal</a:t>
+            </a:r>
+          </a:p>
+          <a:p>
+            <a:pPr lvl="1">
+              <a:buFont typeface="Wingdings" panose="05000000000000000000" pitchFamily="2" charset="2"/>
+              <a:buChar char="Ø"/>
+            </a:pPr>
+            <a:r>
+              <a:rPr lang="en-US" dirty="0"/>
+              <a:t>Legacy code with bugs and vulnerabilities</a:t>
+            </a:r>
+          </a:p>
+          <a:p>
+            <a:pPr lvl="1">
+              <a:buFont typeface="Wingdings" panose="05000000000000000000" pitchFamily="2" charset="2"/>
+              <a:buChar char="Ø"/>
+            </a:pPr>
+            <a:r>
+              <a:rPr lang="en-US" dirty="0"/>
+              <a:t>It was tightened up in a previous Java release (Java 15)</a:t>
+            </a:r>
+          </a:p>
+          <a:p>
+            <a:pPr lvl="1">
+              <a:buFont typeface="Wingdings" panose="05000000000000000000" pitchFamily="2" charset="2"/>
+              <a:buChar char="Ø"/>
+            </a:pPr>
+            <a:r>
+              <a:rPr lang="en-US" dirty="0"/>
+              <a:t>Invalid hostnames will no longer be allowed (bypass flag in-op)</a:t>
+            </a:r>
+          </a:p>
+          <a:p>
+            <a:pPr lvl="1">
+              <a:buFont typeface="Wingdings" panose="05000000000000000000" pitchFamily="2" charset="2"/>
+              <a:buChar char="Ø"/>
+            </a:pPr>
+            <a:r>
+              <a:rPr lang="en-US" dirty="0"/>
+              <a:t>It will be removed in a future release, possibly as soon as Java 20</a:t>
+            </a:r>
+          </a:p>
+          <a:p>
+            <a:pPr lvl="1">
+              <a:buFont typeface="Wingdings" panose="05000000000000000000" pitchFamily="2" charset="2"/>
+              <a:buChar char="Ø"/>
+            </a:pPr>
+            <a:r>
+              <a:rPr lang="en-US" dirty="0"/>
+              <a:t>Other Security Manager features may stop working (if not now, later)</a:t>
+            </a:r>
+          </a:p>
+          <a:p>
+            <a:pPr>
+              <a:buFont typeface="Wingdings" panose="05000000000000000000" pitchFamily="2" charset="2"/>
+              <a:buChar char="Ø"/>
+            </a:pPr>
+            <a:endParaRPr lang="en-US" dirty="0"/>
+          </a:p>
+        </p:txBody>
+      </p:sp>
+    </p:spTree>
+    <p:extLst>
+      <p:ext uri="{BB962C8B-B14F-4D97-AF65-F5344CB8AC3E}">
+        <p14:creationId xmlns:p14="http://schemas.microsoft.com/office/powerpoint/2010/main" val="2320012492"/>
+      </p:ext>
+    </p:extLst>
+  </p:cSld>
+  <p:clrMapOvr>
+    <a:masterClrMapping/>
+  </p:clrMapOvr>
+</p:sld>
+</file>
+
+<file path=ppt/slides/slide19.xml><?xml version="1.0" encoding="utf-8"?>
 <p:sld xmlns:a="http://schemas.openxmlformats.org/drawingml/2006/main" xmlns:r="http://schemas.openxmlformats.org/officeDocument/2006/relationships" xmlns:p="http://schemas.openxmlformats.org/presentationml/2006/main">
   <p:cSld>
     <p:spTree>
@@ -8930,90 +9267,6 @@
     <p:extLst>
       <p:ext uri="{BB962C8B-B14F-4D97-AF65-F5344CB8AC3E}">
         <p14:creationId xmlns:p14="http://schemas.microsoft.com/office/powerpoint/2010/main" val="2057672789"/>
-      </p:ext>
-    </p:extLst>
-  </p:cSld>
-  <p:clrMapOvr>
-    <a:masterClrMapping/>
-  </p:clrMapOvr>
-</p:sld>
-</file>
-
-<file path=ppt/slides/slide19.xml><?xml version="1.0" encoding="utf-8"?>
-<p:sld xmlns:a="http://schemas.openxmlformats.org/drawingml/2006/main" xmlns:r="http://schemas.openxmlformats.org/officeDocument/2006/relationships" xmlns:p="http://schemas.openxmlformats.org/presentationml/2006/main">
-  <p:cSld>
-    <p:spTree>
-      <p:nvGrpSpPr>
-        <p:cNvPr id="1" name=""/>
-        <p:cNvGrpSpPr/>
-        <p:nvPr/>
-      </p:nvGrpSpPr>
-      <p:grpSpPr>
-        <a:xfrm>
-          <a:off x="0" y="0"/>
-          <a:ext cx="0" cy="0"/>
-          <a:chOff x="0" y="0"/>
-          <a:chExt cx="0" cy="0"/>
-        </a:xfrm>
-      </p:grpSpPr>
-      <p:sp>
-        <p:nvSpPr>
-          <p:cNvPr id="2" name="Title 1"/>
-          <p:cNvSpPr>
-            <a:spLocks noGrp="1"/>
-          </p:cNvSpPr>
-          <p:nvPr>
-            <p:ph type="title"/>
-          </p:nvPr>
-        </p:nvSpPr>
-        <p:spPr>
-          <a:xfrm>
-            <a:off x="646111" y="452718"/>
-            <a:ext cx="9404723" cy="910569"/>
-          </a:xfrm>
-        </p:spPr>
-        <p:txBody>
-          <a:bodyPr/>
-          <a:lstStyle/>
-          <a:p>
-            <a:r>
-              <a:rPr lang="en-US" dirty="0"/>
-              <a:t>Common Problems</a:t>
-            </a:r>
-            <a:endParaRPr lang="en-US" sz="1800" dirty="0"/>
-          </a:p>
-        </p:txBody>
-      </p:sp>
-      <p:sp>
-        <p:nvSpPr>
-          <p:cNvPr id="3" name="Content Placeholder 2"/>
-          <p:cNvSpPr>
-            <a:spLocks noGrp="1"/>
-          </p:cNvSpPr>
-          <p:nvPr>
-            <p:ph idx="1"/>
-          </p:nvPr>
-        </p:nvSpPr>
-        <p:spPr>
-          <a:xfrm>
-            <a:off x="646111" y="1363287"/>
-            <a:ext cx="9403743" cy="5120639"/>
-          </a:xfrm>
-        </p:spPr>
-        <p:txBody>
-          <a:bodyPr>
-            <a:normAutofit/>
-          </a:bodyPr>
-          <a:lstStyle/>
-          <a:p>
-            <a:endParaRPr lang="en-US" dirty="0"/>
-          </a:p>
-        </p:txBody>
-      </p:sp>
-    </p:spTree>
-    <p:extLst>
-      <p:ext uri="{BB962C8B-B14F-4D97-AF65-F5344CB8AC3E}">
-        <p14:creationId xmlns:p14="http://schemas.microsoft.com/office/powerpoint/2010/main" val="1972312800"/>
       </p:ext>
     </p:extLst>
   </p:cSld>
@@ -9211,7 +9464,7 @@
             </a:pPr>
             <a:r>
               <a:rPr lang="en-US" dirty="0"/>
-              <a:t>JEPs Implemented</a:t>
+              <a:t>Common JEP Issues</a:t>
             </a:r>
           </a:p>
           <a:p>
@@ -9271,6 +9524,497 @@
 </file>
 
 <file path=ppt/slides/slide20.xml><?xml version="1.0" encoding="utf-8"?>
+<p:sld xmlns:a="http://schemas.openxmlformats.org/drawingml/2006/main" xmlns:r="http://schemas.openxmlformats.org/officeDocument/2006/relationships" xmlns:p="http://schemas.openxmlformats.org/presentationml/2006/main">
+  <p:cSld>
+    <p:spTree>
+      <p:nvGrpSpPr>
+        <p:cNvPr id="1" name=""/>
+        <p:cNvGrpSpPr/>
+        <p:nvPr/>
+      </p:nvGrpSpPr>
+      <p:grpSpPr>
+        <a:xfrm>
+          <a:off x="0" y="0"/>
+          <a:ext cx="0" cy="0"/>
+          <a:chOff x="0" y="0"/>
+          <a:chExt cx="0" cy="0"/>
+        </a:xfrm>
+      </p:grpSpPr>
+      <p:sp>
+        <p:nvSpPr>
+          <p:cNvPr id="2" name="Title 1"/>
+          <p:cNvSpPr>
+            <a:spLocks noGrp="1"/>
+          </p:cNvSpPr>
+          <p:nvPr>
+            <p:ph type="title"/>
+          </p:nvPr>
+        </p:nvSpPr>
+        <p:spPr>
+          <a:xfrm>
+            <a:off x="646111" y="452718"/>
+            <a:ext cx="9404723" cy="910569"/>
+          </a:xfrm>
+        </p:spPr>
+        <p:txBody>
+          <a:bodyPr/>
+          <a:lstStyle/>
+          <a:p>
+            <a:r>
+              <a:rPr lang="en-US" dirty="0"/>
+              <a:t>Common Problems</a:t>
+            </a:r>
+            <a:endParaRPr lang="en-US" sz="1800" dirty="0"/>
+          </a:p>
+        </p:txBody>
+      </p:sp>
+      <p:sp>
+        <p:nvSpPr>
+          <p:cNvPr id="3" name="Content Placeholder 2"/>
+          <p:cNvSpPr>
+            <a:spLocks noGrp="1"/>
+          </p:cNvSpPr>
+          <p:nvPr>
+            <p:ph idx="1"/>
+          </p:nvPr>
+        </p:nvSpPr>
+        <p:spPr>
+          <a:xfrm>
+            <a:off x="646111" y="1363287"/>
+            <a:ext cx="9403743" cy="5120639"/>
+          </a:xfrm>
+        </p:spPr>
+        <p:txBody>
+          <a:bodyPr>
+            <a:normAutofit/>
+          </a:bodyPr>
+          <a:lstStyle/>
+          <a:p>
+            <a:r>
+              <a:rPr lang="en-US" dirty="0"/>
+              <a:t>Security Manager</a:t>
+            </a:r>
+          </a:p>
+          <a:p>
+            <a:pPr lvl="1">
+              <a:buFont typeface="Wingdings" panose="05000000000000000000" pitchFamily="2" charset="2"/>
+              <a:buChar char="Ø"/>
+            </a:pPr>
+            <a:r>
+              <a:rPr lang="en-US" dirty="0"/>
+              <a:t>Invalid hostname failures</a:t>
+            </a:r>
+          </a:p>
+          <a:p>
+            <a:pPr lvl="1">
+              <a:buFont typeface="Wingdings" panose="05000000000000000000" pitchFamily="2" charset="2"/>
+              <a:buChar char="Ø"/>
+            </a:pPr>
+            <a:r>
+              <a:rPr lang="en-US" dirty="0"/>
+              <a:t>Unable to verify/validate certificates</a:t>
+            </a:r>
+          </a:p>
+          <a:p>
+            <a:pPr lvl="1">
+              <a:buFont typeface="Wingdings" panose="05000000000000000000" pitchFamily="2" charset="2"/>
+              <a:buChar char="Ø"/>
+            </a:pPr>
+            <a:r>
+              <a:rPr lang="en-US" dirty="0"/>
+              <a:t>Other issues depending upon API used and parameters passed</a:t>
+            </a:r>
+          </a:p>
+          <a:p>
+            <a:pPr lvl="1">
+              <a:buFont typeface="Wingdings" panose="05000000000000000000" pitchFamily="2" charset="2"/>
+              <a:buChar char="Ø"/>
+            </a:pPr>
+            <a:r>
+              <a:rPr lang="en-US" dirty="0"/>
+              <a:t>Remedy:</a:t>
+            </a:r>
+          </a:p>
+          <a:p>
+            <a:pPr lvl="2">
+              <a:buFont typeface="Wingdings" panose="05000000000000000000" pitchFamily="2" charset="2"/>
+              <a:buChar char="Ø"/>
+            </a:pPr>
+            <a:r>
+              <a:rPr lang="en-US" dirty="0"/>
+              <a:t>Address any exceptions found during compile (e.g. – Invalid characters in hostname)</a:t>
+            </a:r>
+          </a:p>
+          <a:p>
+            <a:pPr lvl="2">
+              <a:buFont typeface="Wingdings" panose="05000000000000000000" pitchFamily="2" charset="2"/>
+              <a:buChar char="Ø"/>
+            </a:pPr>
+            <a:r>
+              <a:rPr lang="en-US" dirty="0"/>
+              <a:t>Review all deprecations (set compiler to warn) and remove/replace them</a:t>
+            </a:r>
+          </a:p>
+          <a:p>
+            <a:r>
+              <a:rPr lang="en-US" dirty="0" err="1"/>
+              <a:t>Nashorn</a:t>
+            </a:r>
+            <a:r>
+              <a:rPr lang="en-US" dirty="0"/>
+              <a:t> Engine</a:t>
+            </a:r>
+          </a:p>
+          <a:p>
+            <a:pPr lvl="1">
+              <a:buFont typeface="Wingdings" panose="05000000000000000000" pitchFamily="2" charset="2"/>
+              <a:buChar char="Ø"/>
+            </a:pPr>
+            <a:r>
+              <a:rPr lang="en-US" dirty="0"/>
+              <a:t>Any parse of JSON inputs or writing JSON may fail</a:t>
+            </a:r>
+          </a:p>
+          <a:p>
+            <a:pPr lvl="1">
+              <a:buFont typeface="Wingdings" panose="05000000000000000000" pitchFamily="2" charset="2"/>
+              <a:buChar char="Ø"/>
+            </a:pPr>
+            <a:r>
+              <a:rPr lang="en-US" dirty="0"/>
+              <a:t>Usage of JavaScript may fail</a:t>
+            </a:r>
+          </a:p>
+          <a:p>
+            <a:pPr lvl="1">
+              <a:buFont typeface="Wingdings" panose="05000000000000000000" pitchFamily="2" charset="2"/>
+              <a:buChar char="Ø"/>
+            </a:pPr>
+            <a:r>
+              <a:rPr lang="en-US" dirty="0"/>
+              <a:t>Remedy:</a:t>
+            </a:r>
+          </a:p>
+          <a:p>
+            <a:pPr lvl="2">
+              <a:buFont typeface="Wingdings" panose="05000000000000000000" pitchFamily="2" charset="2"/>
+              <a:buChar char="Ø"/>
+            </a:pPr>
+            <a:r>
+              <a:rPr lang="en-US" dirty="0"/>
+              <a:t>Add </a:t>
+            </a:r>
+            <a:r>
+              <a:rPr lang="en-US" dirty="0" err="1"/>
+              <a:t>Nashorn</a:t>
+            </a:r>
+            <a:r>
+              <a:rPr lang="en-US" dirty="0"/>
+              <a:t> dependency</a:t>
+            </a:r>
+          </a:p>
+          <a:p>
+            <a:pPr lvl="2">
+              <a:buFont typeface="Wingdings" panose="05000000000000000000" pitchFamily="2" charset="2"/>
+              <a:buChar char="Ø"/>
+            </a:pPr>
+            <a:r>
+              <a:rPr lang="en-US" dirty="0"/>
+              <a:t>Use GraalVM compiler with </a:t>
+            </a:r>
+            <a:r>
+              <a:rPr lang="en-US" dirty="0" err="1"/>
+              <a:t>Nashorn</a:t>
+            </a:r>
+            <a:r>
+              <a:rPr lang="en-US" dirty="0"/>
+              <a:t> support enabled: </a:t>
+            </a:r>
+            <a:r>
+              <a:rPr lang="en-US" sz="1100" dirty="0">
+                <a:latin typeface="Lucida Console" panose="020B0609040504020204" pitchFamily="49" charset="0"/>
+              </a:rPr>
+              <a:t>-</a:t>
+            </a:r>
+            <a:r>
+              <a:rPr lang="en-US" sz="1100" dirty="0" err="1">
+                <a:latin typeface="Lucida Console" panose="020B0609040504020204" pitchFamily="49" charset="0"/>
+              </a:rPr>
+              <a:t>Dpolyglot.js.nashorn-</a:t>
+            </a:r>
+            <a:r>
+              <a:rPr lang="en-US" sz="1100" u="sng" dirty="0" err="1">
+                <a:solidFill>
+                  <a:srgbClr val="000000"/>
+                </a:solidFill>
+                <a:latin typeface="Lucida Console" panose="020B0609040504020204" pitchFamily="49" charset="0"/>
+              </a:rPr>
+              <a:t>compat</a:t>
+            </a:r>
+            <a:r>
+              <a:rPr lang="en-US" sz="1100" u="sng" dirty="0">
+                <a:solidFill>
+                  <a:srgbClr val="000000"/>
+                </a:solidFill>
+                <a:latin typeface="Lucida Console" panose="020B0609040504020204" pitchFamily="49" charset="0"/>
+              </a:rPr>
+              <a:t>=true</a:t>
+            </a:r>
+            <a:endParaRPr lang="en-US" dirty="0">
+              <a:latin typeface="Lucida Console" panose="020B0609040504020204" pitchFamily="49" charset="0"/>
+            </a:endParaRPr>
+          </a:p>
+          <a:p>
+            <a:pPr lvl="2">
+              <a:buFont typeface="Wingdings" panose="05000000000000000000" pitchFamily="2" charset="2"/>
+              <a:buChar char="Ø"/>
+            </a:pPr>
+            <a:r>
+              <a:rPr lang="en-US" dirty="0"/>
+              <a:t>Use GraalVM compiler and switch to GraalVM script engine in code</a:t>
+            </a:r>
+          </a:p>
+          <a:p>
+            <a:endParaRPr lang="en-US" dirty="0"/>
+          </a:p>
+        </p:txBody>
+      </p:sp>
+    </p:spTree>
+    <p:extLst>
+      <p:ext uri="{BB962C8B-B14F-4D97-AF65-F5344CB8AC3E}">
+        <p14:creationId xmlns:p14="http://schemas.microsoft.com/office/powerpoint/2010/main" val="1972312800"/>
+      </p:ext>
+    </p:extLst>
+  </p:cSld>
+  <p:clrMapOvr>
+    <a:masterClrMapping/>
+  </p:clrMapOvr>
+</p:sld>
+</file>
+
+<file path=ppt/slides/slide21.xml><?xml version="1.0" encoding="utf-8"?>
+<p:sld xmlns:a="http://schemas.openxmlformats.org/drawingml/2006/main" xmlns:r="http://schemas.openxmlformats.org/officeDocument/2006/relationships" xmlns:p="http://schemas.openxmlformats.org/presentationml/2006/main">
+  <p:cSld>
+    <p:spTree>
+      <p:nvGrpSpPr>
+        <p:cNvPr id="1" name=""/>
+        <p:cNvGrpSpPr/>
+        <p:nvPr/>
+      </p:nvGrpSpPr>
+      <p:grpSpPr>
+        <a:xfrm>
+          <a:off x="0" y="0"/>
+          <a:ext cx="0" cy="0"/>
+          <a:chOff x="0" y="0"/>
+          <a:chExt cx="0" cy="0"/>
+        </a:xfrm>
+      </p:grpSpPr>
+      <p:sp>
+        <p:nvSpPr>
+          <p:cNvPr id="2" name="Title 1"/>
+          <p:cNvSpPr>
+            <a:spLocks noGrp="1"/>
+          </p:cNvSpPr>
+          <p:nvPr>
+            <p:ph type="title"/>
+          </p:nvPr>
+        </p:nvSpPr>
+        <p:spPr>
+          <a:xfrm>
+            <a:off x="646111" y="452718"/>
+            <a:ext cx="9404723" cy="910569"/>
+          </a:xfrm>
+        </p:spPr>
+        <p:txBody>
+          <a:bodyPr/>
+          <a:lstStyle/>
+          <a:p>
+            <a:r>
+              <a:rPr lang="en-US" dirty="0"/>
+              <a:t>Common Problems</a:t>
+            </a:r>
+            <a:endParaRPr lang="en-US" sz="1800" dirty="0"/>
+          </a:p>
+        </p:txBody>
+      </p:sp>
+      <p:sp>
+        <p:nvSpPr>
+          <p:cNvPr id="3" name="Content Placeholder 2"/>
+          <p:cNvSpPr>
+            <a:spLocks noGrp="1"/>
+          </p:cNvSpPr>
+          <p:nvPr>
+            <p:ph idx="1"/>
+          </p:nvPr>
+        </p:nvSpPr>
+        <p:spPr>
+          <a:xfrm>
+            <a:off x="646111" y="1363287"/>
+            <a:ext cx="9403743" cy="5120639"/>
+          </a:xfrm>
+        </p:spPr>
+        <p:txBody>
+          <a:bodyPr>
+            <a:normAutofit fontScale="92500" lnSpcReduction="10000"/>
+          </a:bodyPr>
+          <a:lstStyle/>
+          <a:p>
+            <a:r>
+              <a:rPr lang="en-US" dirty="0"/>
+              <a:t>EE and CORBA removal</a:t>
+            </a:r>
+          </a:p>
+          <a:p>
+            <a:pPr lvl="1"/>
+            <a:r>
+              <a:rPr lang="en-US" dirty="0"/>
+              <a:t>Add the dependencies as needed</a:t>
+            </a:r>
+          </a:p>
+          <a:p>
+            <a:pPr lvl="2"/>
+            <a:r>
+              <a:rPr lang="en-US" dirty="0"/>
+              <a:t>JAXB and JAX-WS are the most common</a:t>
+            </a:r>
+          </a:p>
+          <a:p>
+            <a:pPr lvl="2"/>
+            <a:r>
+              <a:rPr lang="en-US" dirty="0"/>
+              <a:t>Verify application container has required dependencies</a:t>
+            </a:r>
+          </a:p>
+          <a:p>
+            <a:r>
+              <a:rPr lang="en-US" dirty="0"/>
+              <a:t>Strong SDK Encapsulation</a:t>
+            </a:r>
+          </a:p>
+          <a:p>
+            <a:pPr lvl="1">
+              <a:buFont typeface="Wingdings" panose="05000000000000000000" pitchFamily="2" charset="2"/>
+              <a:buChar char="Ø"/>
+            </a:pPr>
+            <a:r>
+              <a:rPr lang="en-US" dirty="0"/>
+              <a:t>Internal Java classes and methods should never be used.</a:t>
+            </a:r>
+          </a:p>
+          <a:p>
+            <a:pPr lvl="1">
+              <a:buFont typeface="Wingdings" panose="05000000000000000000" pitchFamily="2" charset="2"/>
+              <a:buChar char="Ø"/>
+            </a:pPr>
+            <a:r>
+              <a:rPr lang="en-US" dirty="0"/>
+              <a:t>Java internals are now being protected (encapsulated)</a:t>
+            </a:r>
+          </a:p>
+          <a:p>
+            <a:pPr lvl="1">
+              <a:buFont typeface="Wingdings" panose="05000000000000000000" pitchFamily="2" charset="2"/>
+              <a:buChar char="Ø"/>
+            </a:pPr>
+            <a:r>
+              <a:rPr lang="en-US" dirty="0"/>
+              <a:t>Remedy:</a:t>
+            </a:r>
+          </a:p>
+          <a:p>
+            <a:pPr lvl="2">
+              <a:buFont typeface="Wingdings" panose="05000000000000000000" pitchFamily="2" charset="2"/>
+              <a:buChar char="Ø"/>
+            </a:pPr>
+            <a:r>
+              <a:rPr lang="en-US" dirty="0"/>
+              <a:t>Remove and replace any calls to internal core Java classes and methods</a:t>
+            </a:r>
+          </a:p>
+          <a:p>
+            <a:pPr>
+              <a:buFont typeface="Wingdings" panose="05000000000000000000" pitchFamily="2" charset="2"/>
+              <a:buChar char="Ø"/>
+            </a:pPr>
+            <a:r>
+              <a:rPr lang="en-US" dirty="0"/>
+              <a:t>Other</a:t>
+            </a:r>
+          </a:p>
+          <a:p>
+            <a:pPr lvl="1">
+              <a:buFont typeface="Wingdings" panose="05000000000000000000" pitchFamily="2" charset="2"/>
+              <a:buChar char="Ø"/>
+            </a:pPr>
+            <a:r>
+              <a:rPr lang="en-US" dirty="0"/>
+              <a:t>Set compiler to warn on deprecations</a:t>
+            </a:r>
+          </a:p>
+          <a:p>
+            <a:pPr lvl="1">
+              <a:buFont typeface="Wingdings" panose="05000000000000000000" pitchFamily="2" charset="2"/>
+              <a:buChar char="Ø"/>
+            </a:pPr>
+            <a:r>
+              <a:rPr lang="en-US" dirty="0"/>
+              <a:t>Review implemented JEPs</a:t>
+            </a:r>
+          </a:p>
+          <a:p>
+            <a:pPr lvl="1">
+              <a:buFont typeface="Wingdings" panose="05000000000000000000" pitchFamily="2" charset="2"/>
+              <a:buChar char="Ø"/>
+            </a:pPr>
+            <a:r>
+              <a:rPr lang="en-US" dirty="0"/>
+              <a:t>Verify extra dependencies (e.g. – </a:t>
+            </a:r>
+            <a:r>
+              <a:rPr lang="en-US" dirty="0" err="1"/>
+              <a:t>Nashorn</a:t>
+            </a:r>
+            <a:r>
+              <a:rPr lang="en-US" dirty="0"/>
+              <a:t>) in application container</a:t>
+            </a:r>
+          </a:p>
+          <a:p>
+            <a:pPr lvl="1">
+              <a:buFont typeface="Wingdings" panose="05000000000000000000" pitchFamily="2" charset="2"/>
+              <a:buChar char="Ø"/>
+            </a:pPr>
+            <a:r>
+              <a:rPr lang="en-US" dirty="0"/>
+              <a:t>External library dependencies</a:t>
+            </a:r>
+          </a:p>
+          <a:p>
+            <a:pPr lvl="2">
+              <a:buFont typeface="Wingdings" panose="05000000000000000000" pitchFamily="2" charset="2"/>
+              <a:buChar char="Ø"/>
+            </a:pPr>
+            <a:r>
+              <a:rPr lang="en-US" dirty="0"/>
+              <a:t>May require updates – minor or major</a:t>
+            </a:r>
+          </a:p>
+        </p:txBody>
+      </p:sp>
+    </p:spTree>
+    <p:extLst>
+      <p:ext uri="{BB962C8B-B14F-4D97-AF65-F5344CB8AC3E}">
+        <p14:creationId xmlns:p14="http://schemas.microsoft.com/office/powerpoint/2010/main" val="1904085561"/>
+      </p:ext>
+    </p:extLst>
+  </p:cSld>
+  <p:clrMapOvr>
+    <a:masterClrMapping/>
+  </p:clrMapOvr>
+</p:sld>
+</file>
+
+<file path=ppt/slides/slide22.xml><?xml version="1.0" encoding="utf-8"?>
 <p:sld xmlns:a="http://schemas.openxmlformats.org/drawingml/2006/main" xmlns:r="http://schemas.openxmlformats.org/officeDocument/2006/relationships" xmlns:p="http://schemas.openxmlformats.org/presentationml/2006/main">
   <p:cSld>
     <p:spTree>
@@ -9365,7 +10109,7 @@
 </p:sld>
 </file>
 
-<file path=ppt/slides/slide21.xml><?xml version="1.0" encoding="utf-8"?>
+<file path=ppt/slides/slide23.xml><?xml version="1.0" encoding="utf-8"?>
 <p:sld xmlns:a="http://schemas.openxmlformats.org/drawingml/2006/main" xmlns:r="http://schemas.openxmlformats.org/officeDocument/2006/relationships" xmlns:p="http://schemas.openxmlformats.org/presentationml/2006/main">
   <p:cSld>
     <p:spTree>
@@ -9449,7 +10193,7 @@
 </p:sld>
 </file>
 
-<file path=ppt/slides/slide22.xml><?xml version="1.0" encoding="utf-8"?>
+<file path=ppt/slides/slide24.xml><?xml version="1.0" encoding="utf-8"?>
 <p:sld xmlns:a="http://schemas.openxmlformats.org/drawingml/2006/main" xmlns:r="http://schemas.openxmlformats.org/officeDocument/2006/relationships" xmlns:p="http://schemas.openxmlformats.org/presentationml/2006/main">
   <p:cSld>
     <p:spTree>
@@ -9544,7 +10288,7 @@
 </p:sld>
 </file>
 
-<file path=ppt/slides/slide23.xml><?xml version="1.0" encoding="utf-8"?>
+<file path=ppt/slides/slide25.xml><?xml version="1.0" encoding="utf-8"?>
 <p:sld xmlns:a="http://schemas.openxmlformats.org/drawingml/2006/main" xmlns:r="http://schemas.openxmlformats.org/officeDocument/2006/relationships" xmlns:p="http://schemas.openxmlformats.org/presentationml/2006/main">
   <p:cSld>
     <p:spTree>
@@ -10864,7 +11608,7 @@
           <a:p>
             <a:r>
               <a:rPr lang="en-US" dirty="0"/>
-              <a:t>JEP Implementations</a:t>
+              <a:t>Major JEP Implementations</a:t>
             </a:r>
           </a:p>
           <a:p>

</xml_diff>

<commit_message>
Java 17 Upgrade PPT RC1
</commit_message>
<xml_diff>
--- a/doc/reference/Java_17 _Upgrade.pptx
+++ b/doc/reference/Java_17 _Upgrade.pptx
@@ -27,9 +27,12 @@
     <p:sldId id="298" r:id="rId21"/>
     <p:sldId id="308" r:id="rId22"/>
     <p:sldId id="295" r:id="rId23"/>
-    <p:sldId id="299" r:id="rId24"/>
-    <p:sldId id="290" r:id="rId25"/>
-    <p:sldId id="273" r:id="rId26"/>
+    <p:sldId id="311" r:id="rId24"/>
+    <p:sldId id="299" r:id="rId25"/>
+    <p:sldId id="309" r:id="rId26"/>
+    <p:sldId id="310" r:id="rId27"/>
+    <p:sldId id="290" r:id="rId28"/>
+    <p:sldId id="273" r:id="rId29"/>
   </p:sldIdLst>
   <p:sldSz cx="12192000" cy="6858000"/>
   <p:notesSz cx="6858000" cy="9144000"/>
@@ -858,7 +861,7 @@
           <a:p>
             <a:fld id="{4AAD347D-5ACD-4C99-B74B-A9C85AD731AF}" type="datetimeFigureOut">
               <a:rPr lang="en-US" smtClean="0"/>
-              <a:t>11/9/2022</a:t>
+              <a:t>11/15/2022</a:t>
             </a:fld>
             <a:endParaRPr lang="en-US" dirty="0"/>
           </a:p>
@@ -1109,7 +1112,7 @@
           <a:p>
             <a:fld id="{4AAD347D-5ACD-4C99-B74B-A9C85AD731AF}" type="datetimeFigureOut">
               <a:rPr lang="en-US" smtClean="0"/>
-              <a:t>11/9/2022</a:t>
+              <a:t>11/15/2022</a:t>
             </a:fld>
             <a:endParaRPr lang="en-US" dirty="0"/>
           </a:p>
@@ -1424,7 +1427,7 @@
           <a:p>
             <a:fld id="{4AAD347D-5ACD-4C99-B74B-A9C85AD731AF}" type="datetimeFigureOut">
               <a:rPr lang="en-US" smtClean="0"/>
-              <a:t>11/9/2022</a:t>
+              <a:t>11/15/2022</a:t>
             </a:fld>
             <a:endParaRPr lang="en-US" dirty="0"/>
           </a:p>
@@ -1766,7 +1769,7 @@
           <a:p>
             <a:fld id="{4509A250-FF31-4206-8172-F9D3106AACB1}" type="datetimeFigureOut">
               <a:rPr lang="en-US" smtClean="0"/>
-              <a:t>11/9/2022</a:t>
+              <a:t>11/15/2022</a:t>
             </a:fld>
             <a:endParaRPr lang="en-US" dirty="0"/>
           </a:p>
@@ -2080,7 +2083,7 @@
           <a:p>
             <a:fld id="{4AAD347D-5ACD-4C99-B74B-A9C85AD731AF}" type="datetimeFigureOut">
               <a:rPr lang="en-US" smtClean="0"/>
-              <a:t>11/9/2022</a:t>
+              <a:t>11/15/2022</a:t>
             </a:fld>
             <a:endParaRPr lang="en-US" dirty="0"/>
           </a:p>
@@ -2474,7 +2477,7 @@
           <a:p>
             <a:fld id="{4AAD347D-5ACD-4C99-B74B-A9C85AD731AF}" type="datetimeFigureOut">
               <a:rPr lang="en-US" smtClean="0"/>
-              <a:t>11/9/2022</a:t>
+              <a:t>11/15/2022</a:t>
             </a:fld>
             <a:endParaRPr lang="en-US" dirty="0"/>
           </a:p>
@@ -2645,7 +2648,7 @@
           <a:p>
             <a:fld id="{4509A250-FF31-4206-8172-F9D3106AACB1}" type="datetimeFigureOut">
               <a:rPr lang="en-US" smtClean="0"/>
-              <a:t>11/9/2022</a:t>
+              <a:t>11/15/2022</a:t>
             </a:fld>
             <a:endParaRPr lang="en-US" dirty="0"/>
           </a:p>
@@ -2825,7 +2828,7 @@
           <a:p>
             <a:fld id="{4509A250-FF31-4206-8172-F9D3106AACB1}" type="datetimeFigureOut">
               <a:rPr lang="en-US" smtClean="0"/>
-              <a:t>11/9/2022</a:t>
+              <a:t>11/15/2022</a:t>
             </a:fld>
             <a:endParaRPr lang="en-US" dirty="0"/>
           </a:p>
@@ -3001,7 +3004,7 @@
           <a:p>
             <a:fld id="{4509A250-FF31-4206-8172-F9D3106AACB1}" type="datetimeFigureOut">
               <a:rPr lang="en-US" smtClean="0"/>
-              <a:t>11/9/2022</a:t>
+              <a:t>11/15/2022</a:t>
             </a:fld>
             <a:endParaRPr lang="en-US" dirty="0"/>
           </a:p>
@@ -3248,7 +3251,7 @@
           <a:p>
             <a:fld id="{9796027F-7875-4030-9381-8BD8C4F21935}" type="datetimeFigureOut">
               <a:rPr lang="en-US" smtClean="0"/>
-              <a:t>11/9/2022</a:t>
+              <a:t>11/15/2022</a:t>
             </a:fld>
             <a:endParaRPr lang="en-US" dirty="0"/>
           </a:p>
@@ -3480,7 +3483,7 @@
           <a:p>
             <a:fld id="{9796027F-7875-4030-9381-8BD8C4F21935}" type="datetimeFigureOut">
               <a:rPr lang="en-US" smtClean="0"/>
-              <a:t>11/9/2022</a:t>
+              <a:t>11/15/2022</a:t>
             </a:fld>
             <a:endParaRPr lang="en-US" dirty="0"/>
           </a:p>
@@ -3854,7 +3857,7 @@
           <a:p>
             <a:fld id="{9796027F-7875-4030-9381-8BD8C4F21935}" type="datetimeFigureOut">
               <a:rPr lang="en-US" smtClean="0"/>
-              <a:t>11/9/2022</a:t>
+              <a:t>11/15/2022</a:t>
             </a:fld>
             <a:endParaRPr lang="en-US" dirty="0"/>
           </a:p>
@@ -3977,7 +3980,7 @@
           <a:p>
             <a:fld id="{4509A250-FF31-4206-8172-F9D3106AACB1}" type="datetimeFigureOut">
               <a:rPr lang="en-US" smtClean="0"/>
-              <a:t>11/9/2022</a:t>
+              <a:t>11/15/2022</a:t>
             </a:fld>
             <a:endParaRPr lang="en-US" dirty="0"/>
           </a:p>
@@ -4072,7 +4075,7 @@
           <a:p>
             <a:fld id="{4509A250-FF31-4206-8172-F9D3106AACB1}" type="datetimeFigureOut">
               <a:rPr lang="en-US" smtClean="0"/>
-              <a:t>11/9/2022</a:t>
+              <a:t>11/15/2022</a:t>
             </a:fld>
             <a:endParaRPr lang="en-US" dirty="0"/>
           </a:p>
@@ -4327,7 +4330,7 @@
           <a:p>
             <a:fld id="{4509A250-FF31-4206-8172-F9D3106AACB1}" type="datetimeFigureOut">
               <a:rPr lang="en-US" smtClean="0"/>
-              <a:t>11/9/2022</a:t>
+              <a:t>11/15/2022</a:t>
             </a:fld>
             <a:endParaRPr lang="en-US" dirty="0"/>
           </a:p>
@@ -4590,7 +4593,7 @@
           <a:p>
             <a:fld id="{4509A250-FF31-4206-8172-F9D3106AACB1}" type="datetimeFigureOut">
               <a:rPr lang="en-US" smtClean="0"/>
-              <a:t>11/9/2022</a:t>
+              <a:t>11/15/2022</a:t>
             </a:fld>
             <a:endParaRPr lang="en-US" dirty="0"/>
           </a:p>
@@ -5333,7 +5336,7 @@
           <a:p>
             <a:fld id="{4AAD347D-5ACD-4C99-B74B-A9C85AD731AF}" type="datetimeFigureOut">
               <a:rPr lang="en-US" smtClean="0"/>
-              <a:t>11/9/2022</a:t>
+              <a:t>11/15/2022</a:t>
             </a:fld>
             <a:endParaRPr lang="en-US" dirty="0"/>
           </a:p>
@@ -10176,7 +10179,332 @@
           </a:bodyPr>
           <a:lstStyle/>
           <a:p>
+            <a:r>
+              <a:rPr lang="en-US" dirty="0"/>
+              <a:t>Java 18 (Release Date: 09-20-2022)</a:t>
+            </a:r>
+          </a:p>
+          <a:p>
+            <a:pPr lvl="1">
+              <a:buFont typeface="Wingdings" panose="05000000000000000000" pitchFamily="2" charset="2"/>
+              <a:buChar char="Ø"/>
+            </a:pPr>
+            <a:r>
+              <a:rPr lang="en-US" dirty="0"/>
+              <a:t>JEPs</a:t>
+            </a:r>
+          </a:p>
+          <a:p>
+            <a:pPr lvl="2">
+              <a:buFont typeface="Wingdings" panose="05000000000000000000" pitchFamily="2" charset="2"/>
+              <a:buChar char="Ø"/>
+            </a:pPr>
+            <a:r>
+              <a:rPr lang="en-US" dirty="0"/>
+              <a:t>**400: UTF-8 by Default</a:t>
+            </a:r>
+          </a:p>
+          <a:p>
+            <a:pPr lvl="2">
+              <a:buFont typeface="Wingdings" panose="05000000000000000000" pitchFamily="2" charset="2"/>
+              <a:buChar char="Ø"/>
+            </a:pPr>
+            <a:r>
+              <a:rPr lang="en-US" dirty="0"/>
+              <a:t>408: Simple Web Server</a:t>
+            </a:r>
+          </a:p>
+          <a:p>
+            <a:pPr lvl="2">
+              <a:buFont typeface="Wingdings" panose="05000000000000000000" pitchFamily="2" charset="2"/>
+              <a:buChar char="Ø"/>
+            </a:pPr>
+            <a:r>
+              <a:rPr lang="en-US" dirty="0"/>
+              <a:t>413: Code Snippets in Java API Documentation</a:t>
+            </a:r>
+          </a:p>
+          <a:p>
+            <a:pPr lvl="2">
+              <a:buFont typeface="Wingdings" panose="05000000000000000000" pitchFamily="2" charset="2"/>
+              <a:buChar char="Ø"/>
+            </a:pPr>
+            <a:r>
+              <a:rPr lang="en-US" dirty="0"/>
+              <a:t>416: Reimplement Core Reflection with Method Handles</a:t>
+            </a:r>
+          </a:p>
+          <a:p>
+            <a:pPr lvl="2">
+              <a:buFont typeface="Wingdings" panose="05000000000000000000" pitchFamily="2" charset="2"/>
+              <a:buChar char="Ø"/>
+            </a:pPr>
+            <a:r>
+              <a:rPr lang="en-US" dirty="0"/>
+              <a:t>417: Vector API (Third Incubator)</a:t>
+            </a:r>
+          </a:p>
+          <a:p>
+            <a:pPr lvl="2">
+              <a:buFont typeface="Wingdings" panose="05000000000000000000" pitchFamily="2" charset="2"/>
+              <a:buChar char="Ø"/>
+            </a:pPr>
+            <a:r>
+              <a:rPr lang="en-US" dirty="0"/>
+              <a:t>*418: Internet-Address Resolution SPI</a:t>
+            </a:r>
+          </a:p>
+          <a:p>
+            <a:pPr lvl="2">
+              <a:buFont typeface="Wingdings" panose="05000000000000000000" pitchFamily="2" charset="2"/>
+              <a:buChar char="Ø"/>
+            </a:pPr>
+            <a:r>
+              <a:rPr lang="en-US" dirty="0"/>
+              <a:t>*419: Foreign Function &amp; Memory API (Second Incubator)</a:t>
+            </a:r>
+          </a:p>
+          <a:p>
+            <a:pPr lvl="2">
+              <a:buFont typeface="Wingdings" panose="05000000000000000000" pitchFamily="2" charset="2"/>
+              <a:buChar char="Ø"/>
+            </a:pPr>
+            <a:r>
+              <a:rPr lang="en-US" dirty="0"/>
+              <a:t>420: Pattern Matching for switch (Second Preview)</a:t>
+            </a:r>
+          </a:p>
+          <a:p>
+            <a:pPr lvl="2">
+              <a:buFont typeface="Wingdings" panose="05000000000000000000" pitchFamily="2" charset="2"/>
+              <a:buChar char="Ø"/>
+            </a:pPr>
+            <a:r>
+              <a:rPr lang="en-US" dirty="0"/>
+              <a:t>**421: Deprecate Finalization for Removal</a:t>
+            </a:r>
+          </a:p>
+          <a:p>
+            <a:pPr lvl="1">
+              <a:buFont typeface="Wingdings" panose="05000000000000000000" pitchFamily="2" charset="2"/>
+              <a:buChar char="Ø"/>
+            </a:pPr>
+            <a:r>
+              <a:rPr lang="en-US" dirty="0"/>
+              <a:t>*New features that may improve performance</a:t>
+            </a:r>
+          </a:p>
+          <a:p>
+            <a:pPr lvl="1">
+              <a:buFont typeface="Wingdings" panose="05000000000000000000" pitchFamily="2" charset="2"/>
+              <a:buChar char="Ø"/>
+            </a:pPr>
+            <a:r>
+              <a:rPr lang="en-US" dirty="0"/>
+              <a:t>**Changes may cause code to not compile, throw exceptions, work unexpectedly</a:t>
+            </a:r>
+          </a:p>
+          <a:p>
+            <a:pPr lvl="1">
+              <a:buFont typeface="Wingdings" panose="05000000000000000000" pitchFamily="2" charset="2"/>
+              <a:buChar char="Ø"/>
+            </a:pPr>
             <a:endParaRPr lang="en-US" dirty="0"/>
+          </a:p>
+          <a:p>
+            <a:pPr lvl="2">
+              <a:buFont typeface="Wingdings" panose="05000000000000000000" pitchFamily="2" charset="2"/>
+              <a:buChar char="Ø"/>
+            </a:pPr>
+            <a:endParaRPr lang="en-US" dirty="0"/>
+          </a:p>
+        </p:txBody>
+      </p:sp>
+    </p:spTree>
+    <p:extLst>
+      <p:ext uri="{BB962C8B-B14F-4D97-AF65-F5344CB8AC3E}">
+        <p14:creationId xmlns:p14="http://schemas.microsoft.com/office/powerpoint/2010/main" val="2416783653"/>
+      </p:ext>
+    </p:extLst>
+  </p:cSld>
+  <p:clrMapOvr>
+    <a:masterClrMapping/>
+  </p:clrMapOvr>
+</p:sld>
+</file>
+
+<file path=ppt/slides/slide24.xml><?xml version="1.0" encoding="utf-8"?>
+<p:sld xmlns:a="http://schemas.openxmlformats.org/drawingml/2006/main" xmlns:r="http://schemas.openxmlformats.org/officeDocument/2006/relationships" xmlns:p="http://schemas.openxmlformats.org/presentationml/2006/main">
+  <p:cSld>
+    <p:spTree>
+      <p:nvGrpSpPr>
+        <p:cNvPr id="1" name=""/>
+        <p:cNvGrpSpPr/>
+        <p:nvPr/>
+      </p:nvGrpSpPr>
+      <p:grpSpPr>
+        <a:xfrm>
+          <a:off x="0" y="0"/>
+          <a:ext cx="0" cy="0"/>
+          <a:chOff x="0" y="0"/>
+          <a:chExt cx="0" cy="0"/>
+        </a:xfrm>
+      </p:grpSpPr>
+      <p:sp>
+        <p:nvSpPr>
+          <p:cNvPr id="2" name="Title 1"/>
+          <p:cNvSpPr>
+            <a:spLocks noGrp="1"/>
+          </p:cNvSpPr>
+          <p:nvPr>
+            <p:ph type="title"/>
+          </p:nvPr>
+        </p:nvSpPr>
+        <p:spPr>
+          <a:xfrm>
+            <a:off x="646111" y="452718"/>
+            <a:ext cx="9404723" cy="910569"/>
+          </a:xfrm>
+        </p:spPr>
+        <p:txBody>
+          <a:bodyPr/>
+          <a:lstStyle/>
+          <a:p>
+            <a:r>
+              <a:rPr lang="en-US" dirty="0"/>
+              <a:t>Future Java </a:t>
+            </a:r>
+            <a:r>
+              <a:rPr lang="en-US" sz="1800" dirty="0"/>
+              <a:t>(</a:t>
+            </a:r>
+            <a:r>
+              <a:rPr lang="en-US" sz="1800" dirty="0" err="1"/>
+              <a:t>Cont</a:t>
+            </a:r>
+            <a:r>
+              <a:rPr lang="en-US" sz="1800" dirty="0"/>
+              <a:t>)</a:t>
+            </a:r>
+          </a:p>
+        </p:txBody>
+      </p:sp>
+      <p:sp>
+        <p:nvSpPr>
+          <p:cNvPr id="3" name="Content Placeholder 2"/>
+          <p:cNvSpPr>
+            <a:spLocks noGrp="1"/>
+          </p:cNvSpPr>
+          <p:nvPr>
+            <p:ph idx="1"/>
+          </p:nvPr>
+        </p:nvSpPr>
+        <p:spPr>
+          <a:xfrm>
+            <a:off x="646111" y="1363287"/>
+            <a:ext cx="9403743" cy="5120639"/>
+          </a:xfrm>
+        </p:spPr>
+        <p:txBody>
+          <a:bodyPr>
+            <a:normAutofit/>
+          </a:bodyPr>
+          <a:lstStyle/>
+          <a:p>
+            <a:r>
+              <a:rPr lang="en-US" dirty="0"/>
+              <a:t>Java 19 (Release Date: 09-20-2022)</a:t>
+            </a:r>
+          </a:p>
+          <a:p>
+            <a:pPr lvl="1">
+              <a:buFont typeface="Wingdings" panose="05000000000000000000" pitchFamily="2" charset="2"/>
+              <a:buChar char="Ø"/>
+            </a:pPr>
+            <a:r>
+              <a:rPr lang="en-US" dirty="0"/>
+              <a:t>JEPs</a:t>
+            </a:r>
+          </a:p>
+          <a:p>
+            <a:pPr lvl="2">
+              <a:buFont typeface="Wingdings" panose="05000000000000000000" pitchFamily="2" charset="2"/>
+              <a:buChar char="Ø"/>
+            </a:pPr>
+            <a:r>
+              <a:rPr lang="en-US" dirty="0"/>
+              <a:t>*405: Record Patterns (Preview)</a:t>
+            </a:r>
+          </a:p>
+          <a:p>
+            <a:pPr lvl="2">
+              <a:buFont typeface="Wingdings" panose="05000000000000000000" pitchFamily="2" charset="2"/>
+              <a:buChar char="Ø"/>
+            </a:pPr>
+            <a:r>
+              <a:rPr lang="en-US" dirty="0"/>
+              <a:t>422: Linux/RISC-V Port</a:t>
+            </a:r>
+          </a:p>
+          <a:p>
+            <a:pPr lvl="2">
+              <a:buFont typeface="Wingdings" panose="05000000000000000000" pitchFamily="2" charset="2"/>
+              <a:buChar char="Ø"/>
+            </a:pPr>
+            <a:r>
+              <a:rPr lang="en-US" dirty="0"/>
+              <a:t>*424: Foreign Function &amp; Memory API (Preview)</a:t>
+            </a:r>
+          </a:p>
+          <a:p>
+            <a:pPr lvl="2">
+              <a:buFont typeface="Wingdings" panose="05000000000000000000" pitchFamily="2" charset="2"/>
+              <a:buChar char="Ø"/>
+            </a:pPr>
+            <a:r>
+              <a:rPr lang="en-US" dirty="0"/>
+              <a:t>*425: Virtual Threads (Preview)</a:t>
+            </a:r>
+          </a:p>
+          <a:p>
+            <a:pPr lvl="2">
+              <a:buFont typeface="Wingdings" panose="05000000000000000000" pitchFamily="2" charset="2"/>
+              <a:buChar char="Ø"/>
+            </a:pPr>
+            <a:r>
+              <a:rPr lang="en-US" dirty="0"/>
+              <a:t>426: Vector API (Fourth Incubator)</a:t>
+            </a:r>
+          </a:p>
+          <a:p>
+            <a:pPr lvl="2">
+              <a:buFont typeface="Wingdings" panose="05000000000000000000" pitchFamily="2" charset="2"/>
+              <a:buChar char="Ø"/>
+            </a:pPr>
+            <a:r>
+              <a:rPr lang="en-US" dirty="0"/>
+              <a:t>427: Pattern Matching for switch (Third Preview)</a:t>
+            </a:r>
+          </a:p>
+          <a:p>
+            <a:pPr lvl="2">
+              <a:buFont typeface="Wingdings" panose="05000000000000000000" pitchFamily="2" charset="2"/>
+              <a:buChar char="Ø"/>
+            </a:pPr>
+            <a:r>
+              <a:rPr lang="en-US" dirty="0"/>
+              <a:t>428: Structured Concurrency (Incubator)</a:t>
+            </a:r>
+          </a:p>
+          <a:p>
+            <a:pPr lvl="1">
+              <a:buFont typeface="Wingdings" panose="05000000000000000000" pitchFamily="2" charset="2"/>
+              <a:buChar char="Ø"/>
+            </a:pPr>
+            <a:r>
+              <a:rPr lang="en-US" dirty="0"/>
+              <a:t>*New features that may improve performance</a:t>
+            </a:r>
           </a:p>
         </p:txBody>
       </p:sp>
@@ -10193,7 +10521,589 @@
 </p:sld>
 </file>
 
-<file path=ppt/slides/slide24.xml><?xml version="1.0" encoding="utf-8"?>
+<file path=ppt/slides/slide25.xml><?xml version="1.0" encoding="utf-8"?>
+<p:sld xmlns:a="http://schemas.openxmlformats.org/drawingml/2006/main" xmlns:r="http://schemas.openxmlformats.org/officeDocument/2006/relationships" xmlns:p="http://schemas.openxmlformats.org/presentationml/2006/main">
+  <p:cSld>
+    <p:spTree>
+      <p:nvGrpSpPr>
+        <p:cNvPr id="1" name=""/>
+        <p:cNvGrpSpPr/>
+        <p:nvPr/>
+      </p:nvGrpSpPr>
+      <p:grpSpPr>
+        <a:xfrm>
+          <a:off x="0" y="0"/>
+          <a:ext cx="0" cy="0"/>
+          <a:chOff x="0" y="0"/>
+          <a:chExt cx="0" cy="0"/>
+        </a:xfrm>
+      </p:grpSpPr>
+      <p:sp>
+        <p:nvSpPr>
+          <p:cNvPr id="2" name="Title 1"/>
+          <p:cNvSpPr>
+            <a:spLocks noGrp="1"/>
+          </p:cNvSpPr>
+          <p:nvPr>
+            <p:ph type="title"/>
+          </p:nvPr>
+        </p:nvSpPr>
+        <p:spPr>
+          <a:xfrm>
+            <a:off x="646111" y="452718"/>
+            <a:ext cx="9404723" cy="910569"/>
+          </a:xfrm>
+        </p:spPr>
+        <p:txBody>
+          <a:bodyPr/>
+          <a:lstStyle/>
+          <a:p>
+            <a:r>
+              <a:rPr lang="en-US" dirty="0"/>
+              <a:t>Future Java </a:t>
+            </a:r>
+            <a:r>
+              <a:rPr lang="en-US" sz="1800" dirty="0"/>
+              <a:t>(</a:t>
+            </a:r>
+            <a:r>
+              <a:rPr lang="en-US" sz="1800" dirty="0" err="1"/>
+              <a:t>Cont</a:t>
+            </a:r>
+            <a:r>
+              <a:rPr lang="en-US" sz="1800" dirty="0"/>
+              <a:t>)</a:t>
+            </a:r>
+          </a:p>
+        </p:txBody>
+      </p:sp>
+      <p:sp>
+        <p:nvSpPr>
+          <p:cNvPr id="3" name="Content Placeholder 2"/>
+          <p:cNvSpPr>
+            <a:spLocks noGrp="1"/>
+          </p:cNvSpPr>
+          <p:nvPr>
+            <p:ph idx="1"/>
+          </p:nvPr>
+        </p:nvSpPr>
+        <p:spPr>
+          <a:xfrm>
+            <a:off x="646111" y="1363287"/>
+            <a:ext cx="9403743" cy="5120639"/>
+          </a:xfrm>
+        </p:spPr>
+        <p:txBody>
+          <a:bodyPr>
+            <a:normAutofit fontScale="85000" lnSpcReduction="20000"/>
+          </a:bodyPr>
+          <a:lstStyle/>
+          <a:p>
+            <a:r>
+              <a:rPr lang="en-US" dirty="0">
+                <a:solidFill>
+                  <a:schemeClr val="tx1"/>
+                </a:solidFill>
+              </a:rPr>
+              <a:t>Java 20 (Release Date: 03-21-2023)</a:t>
+            </a:r>
+          </a:p>
+          <a:p>
+            <a:pPr lvl="1"/>
+            <a:r>
+              <a:rPr lang="en-US" dirty="0">
+                <a:solidFill>
+                  <a:schemeClr val="tx1"/>
+                </a:solidFill>
+              </a:rPr>
+              <a:t>JEPs</a:t>
+            </a:r>
+          </a:p>
+          <a:p>
+            <a:pPr lvl="2"/>
+            <a:r>
+              <a:rPr lang="en-US" dirty="0">
+                <a:solidFill>
+                  <a:schemeClr val="tx1"/>
+                </a:solidFill>
+              </a:rPr>
+              <a:t>Proposed to Target</a:t>
+            </a:r>
+          </a:p>
+          <a:p>
+            <a:pPr lvl="3">
+              <a:buFont typeface="Wingdings" panose="05000000000000000000" pitchFamily="2" charset="2"/>
+              <a:buChar char="Ø"/>
+            </a:pPr>
+            <a:r>
+              <a:rPr lang="en-US" b="0" i="0" dirty="0">
+                <a:solidFill>
+                  <a:schemeClr val="tx1"/>
+                </a:solidFill>
+                <a:effectLst/>
+              </a:rPr>
+              <a:t>JEP 433: Pattern Matching for switch (Fourth Preview)</a:t>
+            </a:r>
+          </a:p>
+          <a:p>
+            <a:pPr lvl="3">
+              <a:buFont typeface="Wingdings" panose="05000000000000000000" pitchFamily="2" charset="2"/>
+              <a:buChar char="Ø"/>
+            </a:pPr>
+            <a:r>
+              <a:rPr lang="en-US" b="0" i="0" dirty="0">
+                <a:solidFill>
+                  <a:schemeClr val="tx1"/>
+                </a:solidFill>
+                <a:effectLst/>
+              </a:rPr>
+              <a:t>JEP 432: Record Patterns (Second Preview)</a:t>
+            </a:r>
+          </a:p>
+          <a:p>
+            <a:pPr lvl="2"/>
+            <a:r>
+              <a:rPr lang="en-US" dirty="0">
+                <a:solidFill>
+                  <a:schemeClr val="tx1"/>
+                </a:solidFill>
+              </a:rPr>
+              <a:t>C</a:t>
+            </a:r>
+            <a:r>
+              <a:rPr lang="en-US" b="0" i="0" dirty="0">
+                <a:solidFill>
+                  <a:schemeClr val="tx1"/>
+                </a:solidFill>
+                <a:effectLst/>
+              </a:rPr>
+              <a:t>andidates</a:t>
+            </a:r>
+          </a:p>
+          <a:p>
+            <a:pPr lvl="3">
+              <a:buFont typeface="Wingdings" panose="05000000000000000000" pitchFamily="2" charset="2"/>
+              <a:buChar char="Ø"/>
+            </a:pPr>
+            <a:r>
+              <a:rPr lang="en-US" b="0" i="0" dirty="0">
+                <a:solidFill>
+                  <a:schemeClr val="tx1"/>
+                </a:solidFill>
+                <a:effectLst/>
+              </a:rPr>
+              <a:t>JEP 436: Virtual Threads (Second Preview)</a:t>
+            </a:r>
+          </a:p>
+          <a:p>
+            <a:pPr lvl="3">
+              <a:buFont typeface="Wingdings" panose="05000000000000000000" pitchFamily="2" charset="2"/>
+              <a:buChar char="Ø"/>
+            </a:pPr>
+            <a:r>
+              <a:rPr lang="en-US" b="0" i="0" dirty="0">
+                <a:solidFill>
+                  <a:schemeClr val="tx1"/>
+                </a:solidFill>
+                <a:effectLst/>
+              </a:rPr>
+              <a:t>JEP 430: String Templates (Preview)</a:t>
+            </a:r>
+          </a:p>
+          <a:p>
+            <a:pPr lvl="3">
+              <a:buFont typeface="Wingdings" panose="05000000000000000000" pitchFamily="2" charset="2"/>
+              <a:buChar char="Ø"/>
+            </a:pPr>
+            <a:r>
+              <a:rPr lang="en-US" b="0" i="0" dirty="0">
+                <a:solidFill>
+                  <a:schemeClr val="tx1"/>
+                </a:solidFill>
+                <a:effectLst/>
+              </a:rPr>
+              <a:t>JEP 431: Sequenced Collections</a:t>
+            </a:r>
+          </a:p>
+          <a:p>
+            <a:pPr lvl="3">
+              <a:buFont typeface="Wingdings" panose="05000000000000000000" pitchFamily="2" charset="2"/>
+              <a:buChar char="Ø"/>
+            </a:pPr>
+            <a:r>
+              <a:rPr lang="en-US" b="0" i="0" dirty="0">
+                <a:solidFill>
+                  <a:schemeClr val="tx1"/>
+                </a:solidFill>
+                <a:effectLst/>
+              </a:rPr>
+              <a:t>JEP 401: Primitive Classes (Preview)</a:t>
+            </a:r>
+          </a:p>
+          <a:p>
+            <a:pPr lvl="3">
+              <a:buFont typeface="Wingdings" panose="05000000000000000000" pitchFamily="2" charset="2"/>
+              <a:buChar char="Ø"/>
+            </a:pPr>
+            <a:r>
+              <a:rPr lang="en-US" b="0" i="0" dirty="0">
+                <a:solidFill>
+                  <a:schemeClr val="tx1"/>
+                </a:solidFill>
+                <a:effectLst/>
+              </a:rPr>
+              <a:t>JEP 402: Classes for the Basic Primitives (Preview)</a:t>
+            </a:r>
+          </a:p>
+          <a:p>
+            <a:pPr lvl="3">
+              <a:buFont typeface="Wingdings" panose="05000000000000000000" pitchFamily="2" charset="2"/>
+              <a:buChar char="Ø"/>
+            </a:pPr>
+            <a:r>
+              <a:rPr lang="en-US" b="0" i="0" dirty="0">
+                <a:solidFill>
+                  <a:schemeClr val="tx1"/>
+                </a:solidFill>
+                <a:effectLst/>
+              </a:rPr>
+              <a:t>JEP 134: Intuitive Semantics for Nested Reference Objects</a:t>
+            </a:r>
+          </a:p>
+          <a:p>
+            <a:pPr lvl="3">
+              <a:buFont typeface="Wingdings" panose="05000000000000000000" pitchFamily="2" charset="2"/>
+              <a:buChar char="Ø"/>
+            </a:pPr>
+            <a:r>
+              <a:rPr lang="en-US" b="0" i="0" dirty="0">
+                <a:solidFill>
+                  <a:schemeClr val="tx1"/>
+                </a:solidFill>
+                <a:effectLst/>
+              </a:rPr>
+              <a:t>JEP 348: Compiler </a:t>
+            </a:r>
+            <a:r>
+              <a:rPr lang="en-US" b="0" i="0" dirty="0" err="1">
+                <a:solidFill>
+                  <a:schemeClr val="tx1"/>
+                </a:solidFill>
+                <a:effectLst/>
+              </a:rPr>
+              <a:t>Intrinsics</a:t>
+            </a:r>
+            <a:r>
+              <a:rPr lang="en-US" b="0" i="0" dirty="0">
+                <a:solidFill>
+                  <a:schemeClr val="tx1"/>
+                </a:solidFill>
+                <a:effectLst/>
+              </a:rPr>
+              <a:t> for Java SE APIs</a:t>
+            </a:r>
+          </a:p>
+          <a:p>
+            <a:pPr lvl="3">
+              <a:buFont typeface="Wingdings" panose="05000000000000000000" pitchFamily="2" charset="2"/>
+              <a:buChar char="Ø"/>
+            </a:pPr>
+            <a:r>
+              <a:rPr lang="en-US" b="0" i="0" dirty="0">
+                <a:solidFill>
+                  <a:schemeClr val="tx1"/>
+                </a:solidFill>
+                <a:effectLst/>
+              </a:rPr>
+              <a:t>JEP 303: </a:t>
+            </a:r>
+            <a:r>
+              <a:rPr lang="en-US" b="0" i="0" dirty="0" err="1">
+                <a:solidFill>
+                  <a:schemeClr val="tx1"/>
+                </a:solidFill>
+                <a:effectLst/>
+              </a:rPr>
+              <a:t>Intrinsics</a:t>
+            </a:r>
+            <a:r>
+              <a:rPr lang="en-US" b="0" i="0" dirty="0">
+                <a:solidFill>
+                  <a:schemeClr val="tx1"/>
+                </a:solidFill>
+                <a:effectLst/>
+              </a:rPr>
+              <a:t> for the LDC and INVOKEDYNAMIC Instructions</a:t>
+            </a:r>
+          </a:p>
+          <a:p>
+            <a:pPr lvl="3">
+              <a:buFont typeface="Wingdings" panose="05000000000000000000" pitchFamily="2" charset="2"/>
+              <a:buChar char="Ø"/>
+            </a:pPr>
+            <a:r>
+              <a:rPr lang="en-US" b="0" i="0" dirty="0">
+                <a:solidFill>
+                  <a:schemeClr val="tx1"/>
+                </a:solidFill>
+                <a:effectLst/>
+              </a:rPr>
+              <a:t>JEP 218: Generics over Primitive Types</a:t>
+            </a:r>
+          </a:p>
+          <a:p>
+            <a:pPr lvl="3">
+              <a:buFont typeface="Wingdings" panose="05000000000000000000" pitchFamily="2" charset="2"/>
+              <a:buChar char="Ø"/>
+            </a:pPr>
+            <a:r>
+              <a:rPr lang="en-US" b="0" i="0" dirty="0">
+                <a:solidFill>
+                  <a:schemeClr val="tx1"/>
+                </a:solidFill>
+                <a:effectLst/>
+              </a:rPr>
+              <a:t>JEP 198: Light-Weight JSON API</a:t>
+            </a:r>
+          </a:p>
+          <a:p>
+            <a:pPr lvl="3">
+              <a:buFont typeface="Wingdings" panose="05000000000000000000" pitchFamily="2" charset="2"/>
+              <a:buChar char="Ø"/>
+            </a:pPr>
+            <a:r>
+              <a:rPr lang="en-US" b="0" i="0" dirty="0">
+                <a:solidFill>
+                  <a:schemeClr val="tx1"/>
+                </a:solidFill>
+                <a:effectLst/>
+              </a:rPr>
+              <a:t>JEP 302: Lambda Leftovers</a:t>
+            </a:r>
+          </a:p>
+          <a:p>
+            <a:pPr lvl="3">
+              <a:buFont typeface="Wingdings" panose="05000000000000000000" pitchFamily="2" charset="2"/>
+              <a:buChar char="Ø"/>
+            </a:pPr>
+            <a:r>
+              <a:rPr lang="en-US" b="0" i="0" dirty="0">
+                <a:solidFill>
+                  <a:schemeClr val="tx1"/>
+                </a:solidFill>
+                <a:effectLst/>
+              </a:rPr>
+              <a:t>JEP 300: Augment Use-Site Variance with Declaration-Site Defaults</a:t>
+            </a:r>
+          </a:p>
+          <a:p>
+            <a:pPr lvl="3">
+              <a:buFont typeface="Wingdings" panose="05000000000000000000" pitchFamily="2" charset="2"/>
+              <a:buChar char="Ø"/>
+            </a:pPr>
+            <a:r>
+              <a:rPr lang="en-US" b="0" i="0" dirty="0">
+                <a:solidFill>
+                  <a:schemeClr val="tx1"/>
+                </a:solidFill>
+                <a:effectLst/>
+              </a:rPr>
+              <a:t>JEP 111: Additional Unicode Constructs for Regular Expressions</a:t>
+            </a:r>
+          </a:p>
+          <a:p>
+            <a:pPr lvl="3">
+              <a:buFont typeface="Wingdings" panose="05000000000000000000" pitchFamily="2" charset="2"/>
+              <a:buChar char="Ø"/>
+            </a:pPr>
+            <a:r>
+              <a:rPr lang="en-US" b="0" i="0" dirty="0">
+                <a:solidFill>
+                  <a:schemeClr val="tx1"/>
+                </a:solidFill>
+                <a:effectLst/>
+              </a:rPr>
+              <a:t>JEP 152: Crypto Operations with Network HSMs</a:t>
+            </a:r>
+          </a:p>
+        </p:txBody>
+      </p:sp>
+    </p:spTree>
+    <p:extLst>
+      <p:ext uri="{BB962C8B-B14F-4D97-AF65-F5344CB8AC3E}">
+        <p14:creationId xmlns:p14="http://schemas.microsoft.com/office/powerpoint/2010/main" val="2816576464"/>
+      </p:ext>
+    </p:extLst>
+  </p:cSld>
+  <p:clrMapOvr>
+    <a:masterClrMapping/>
+  </p:clrMapOvr>
+</p:sld>
+</file>
+
+<file path=ppt/slides/slide26.xml><?xml version="1.0" encoding="utf-8"?>
+<p:sld xmlns:a="http://schemas.openxmlformats.org/drawingml/2006/main" xmlns:r="http://schemas.openxmlformats.org/officeDocument/2006/relationships" xmlns:p="http://schemas.openxmlformats.org/presentationml/2006/main">
+  <p:cSld>
+    <p:spTree>
+      <p:nvGrpSpPr>
+        <p:cNvPr id="1" name=""/>
+        <p:cNvGrpSpPr/>
+        <p:nvPr/>
+      </p:nvGrpSpPr>
+      <p:grpSpPr>
+        <a:xfrm>
+          <a:off x="0" y="0"/>
+          <a:ext cx="0" cy="0"/>
+          <a:chOff x="0" y="0"/>
+          <a:chExt cx="0" cy="0"/>
+        </a:xfrm>
+      </p:grpSpPr>
+      <p:sp>
+        <p:nvSpPr>
+          <p:cNvPr id="2" name="Title 1"/>
+          <p:cNvSpPr>
+            <a:spLocks noGrp="1"/>
+          </p:cNvSpPr>
+          <p:nvPr>
+            <p:ph type="title"/>
+          </p:nvPr>
+        </p:nvSpPr>
+        <p:spPr>
+          <a:xfrm>
+            <a:off x="646111" y="452718"/>
+            <a:ext cx="9404723" cy="910569"/>
+          </a:xfrm>
+        </p:spPr>
+        <p:txBody>
+          <a:bodyPr/>
+          <a:lstStyle/>
+          <a:p>
+            <a:r>
+              <a:rPr lang="en-US" dirty="0"/>
+              <a:t>Future Java </a:t>
+            </a:r>
+            <a:r>
+              <a:rPr lang="en-US" sz="1800" dirty="0"/>
+              <a:t>(</a:t>
+            </a:r>
+            <a:r>
+              <a:rPr lang="en-US" sz="1800" dirty="0" err="1"/>
+              <a:t>Cont</a:t>
+            </a:r>
+            <a:r>
+              <a:rPr lang="en-US" sz="1800" dirty="0"/>
+              <a:t>)</a:t>
+            </a:r>
+          </a:p>
+        </p:txBody>
+      </p:sp>
+      <p:sp>
+        <p:nvSpPr>
+          <p:cNvPr id="3" name="Content Placeholder 2"/>
+          <p:cNvSpPr>
+            <a:spLocks noGrp="1"/>
+          </p:cNvSpPr>
+          <p:nvPr>
+            <p:ph idx="1"/>
+          </p:nvPr>
+        </p:nvSpPr>
+        <p:spPr>
+          <a:xfrm>
+            <a:off x="646111" y="1363287"/>
+            <a:ext cx="9403743" cy="5120639"/>
+          </a:xfrm>
+        </p:spPr>
+        <p:txBody>
+          <a:bodyPr>
+            <a:normAutofit/>
+          </a:bodyPr>
+          <a:lstStyle/>
+          <a:p>
+            <a:r>
+              <a:rPr lang="en-US" dirty="0"/>
+              <a:t>Other considerations</a:t>
+            </a:r>
+          </a:p>
+          <a:p>
+            <a:pPr lvl="1"/>
+            <a:r>
+              <a:rPr lang="en-US" dirty="0"/>
+              <a:t>When will deprecated APIs be removed?</a:t>
+            </a:r>
+          </a:p>
+          <a:p>
+            <a:pPr lvl="1"/>
+            <a:r>
+              <a:rPr lang="en-US" dirty="0"/>
+              <a:t>When will deprecated libraries be removed?</a:t>
+            </a:r>
+          </a:p>
+          <a:p>
+            <a:pPr lvl="1"/>
+            <a:r>
+              <a:rPr lang="en-US" dirty="0"/>
+              <a:t>Should packages be migrated to modules?</a:t>
+            </a:r>
+          </a:p>
+          <a:p>
+            <a:pPr lvl="1"/>
+            <a:r>
+              <a:rPr lang="en-US" dirty="0"/>
+              <a:t>Should legacy code be updated with new features for performance?</a:t>
+            </a:r>
+          </a:p>
+          <a:p>
+            <a:pPr lvl="2"/>
+            <a:r>
+              <a:rPr lang="en-US" dirty="0"/>
+              <a:t>switch</a:t>
+            </a:r>
+          </a:p>
+          <a:p>
+            <a:pPr lvl="2"/>
+            <a:r>
+              <a:rPr lang="en-US" dirty="0"/>
+              <a:t>String</a:t>
+            </a:r>
+          </a:p>
+          <a:p>
+            <a:pPr lvl="2"/>
+            <a:r>
+              <a:rPr lang="en-US" dirty="0"/>
+              <a:t>Lambda expressions</a:t>
+            </a:r>
+          </a:p>
+          <a:p>
+            <a:pPr lvl="2"/>
+            <a:r>
+              <a:rPr lang="en-US" dirty="0"/>
+              <a:t>Records</a:t>
+            </a:r>
+          </a:p>
+          <a:p>
+            <a:pPr lvl="2"/>
+            <a:r>
+              <a:rPr lang="en-US" dirty="0" err="1"/>
+              <a:t>etc</a:t>
+            </a:r>
+            <a:endParaRPr lang="en-US" dirty="0"/>
+          </a:p>
+        </p:txBody>
+      </p:sp>
+    </p:spTree>
+    <p:extLst>
+      <p:ext uri="{BB962C8B-B14F-4D97-AF65-F5344CB8AC3E}">
+        <p14:creationId xmlns:p14="http://schemas.microsoft.com/office/powerpoint/2010/main" val="629354157"/>
+      </p:ext>
+    </p:extLst>
+  </p:cSld>
+  <p:clrMapOvr>
+    <a:masterClrMapping/>
+  </p:clrMapOvr>
+</p:sld>
+</file>
+
+<file path=ppt/slides/slide27.xml><?xml version="1.0" encoding="utf-8"?>
 <p:sld xmlns:a="http://schemas.openxmlformats.org/drawingml/2006/main" xmlns:r="http://schemas.openxmlformats.org/officeDocument/2006/relationships" xmlns:p="http://schemas.openxmlformats.org/presentationml/2006/main">
   <p:cSld>
     <p:spTree>
@@ -10288,7 +11198,7 @@
 </p:sld>
 </file>
 
-<file path=ppt/slides/slide25.xml><?xml version="1.0" encoding="utf-8"?>
+<file path=ppt/slides/slide28.xml><?xml version="1.0" encoding="utf-8"?>
 <p:sld xmlns:a="http://schemas.openxmlformats.org/drawingml/2006/main" xmlns:r="http://schemas.openxmlformats.org/officeDocument/2006/relationships" xmlns:p="http://schemas.openxmlformats.org/presentationml/2006/main">
   <p:cSld>
     <p:spTree>
@@ -10363,7 +11273,9 @@
           </a:xfrm>
         </p:spPr>
         <p:txBody>
-          <a:bodyPr/>
+          <a:bodyPr>
+            <a:normAutofit lnSpcReduction="10000"/>
+          </a:bodyPr>
           <a:lstStyle/>
           <a:p>
             <a:pPr marL="285750" indent="-285750">
@@ -10822,7 +11734,7 @@
                   </a:extLst>
                 </a:hlinkClick>
               </a:rPr>
-              <a:t>JEP-0 (JDK Enhancements and Proposals)</a:t>
+              <a:t>JDK 19: The New Features in Java 19</a:t>
             </a:r>
             <a:endParaRPr lang="en-US" sz="1600" dirty="0">
               <a:solidFill>
@@ -10866,7 +11778,7 @@
                   </a:extLst>
                 </a:hlinkClick>
               </a:rPr>
-              <a:t>Monitoring Java Application with Flight Recorder</a:t>
+              <a:t>JEP-0 (JDK Enhancements and Proposals)</a:t>
             </a:r>
             <a:endParaRPr lang="en-US" sz="1600" dirty="0">
               <a:solidFill>
@@ -10903,6 +11815,50 @@
                   </a:glow>
                 </a:effectLst>
                 <a:hlinkClick r:id="rId13">
+                  <a:extLst>
+                    <a:ext uri="{A12FA001-AC4F-418D-AE19-62706E023703}">
+                      <ahyp:hlinkClr xmlns:ahyp="http://schemas.microsoft.com/office/drawing/2018/hyperlinkcolor" val="tx"/>
+                    </a:ext>
+                  </a:extLst>
+                </a:hlinkClick>
+              </a:rPr>
+              <a:t>Monitoring Java Application with Flight Recorder</a:t>
+            </a:r>
+            <a:endParaRPr lang="en-US" sz="1600" dirty="0">
+              <a:solidFill>
+                <a:schemeClr val="accent2"/>
+              </a:solidFill>
+              <a:effectLst>
+                <a:glow rad="38100">
+                  <a:prstClr val="black">
+                    <a:lumMod val="50000"/>
+                    <a:lumOff val="50000"/>
+                    <a:alpha val="20000"/>
+                  </a:prstClr>
+                </a:glow>
+              </a:effectLst>
+            </a:endParaRPr>
+          </a:p>
+          <a:p>
+            <a:pPr marL="285750" indent="-285750">
+              <a:buFont typeface="Arial" panose="020B0604020202020204" pitchFamily="34" charset="0"/>
+              <a:buChar char="•"/>
+            </a:pPr>
+            <a:r>
+              <a:rPr lang="en-US" sz="1600" dirty="0">
+                <a:solidFill>
+                  <a:schemeClr val="accent2"/>
+                </a:solidFill>
+                <a:effectLst>
+                  <a:glow rad="38100">
+                    <a:prstClr val="black">
+                      <a:lumMod val="50000"/>
+                      <a:lumOff val="50000"/>
+                      <a:alpha val="20000"/>
+                    </a:prstClr>
+                  </a:glow>
+                </a:effectLst>
+                <a:hlinkClick r:id="rId14">
                   <a:extLst>
                     <a:ext uri="{A12FA001-AC4F-418D-AE19-62706E023703}">
                       <ahyp:hlinkClr xmlns:ahyp="http://schemas.microsoft.com/office/drawing/2018/hyperlinkcolor" val="tx"/>

</xml_diff>

<commit_message>
Java 17 Upgrade PPT RC2
</commit_message>
<xml_diff>
--- a/doc/reference/Java_17 _Upgrade.pptx
+++ b/doc/reference/Java_17 _Upgrade.pptx
@@ -27,12 +27,13 @@
     <p:sldId id="298" r:id="rId21"/>
     <p:sldId id="308" r:id="rId22"/>
     <p:sldId id="295" r:id="rId23"/>
-    <p:sldId id="311" r:id="rId24"/>
-    <p:sldId id="299" r:id="rId25"/>
-    <p:sldId id="309" r:id="rId26"/>
-    <p:sldId id="310" r:id="rId27"/>
-    <p:sldId id="290" r:id="rId28"/>
-    <p:sldId id="273" r:id="rId29"/>
+    <p:sldId id="312" r:id="rId24"/>
+    <p:sldId id="311" r:id="rId25"/>
+    <p:sldId id="299" r:id="rId26"/>
+    <p:sldId id="309" r:id="rId27"/>
+    <p:sldId id="310" r:id="rId28"/>
+    <p:sldId id="290" r:id="rId29"/>
+    <p:sldId id="273" r:id="rId30"/>
   </p:sldIdLst>
   <p:sldSz cx="12192000" cy="6858000"/>
   <p:notesSz cx="6858000" cy="9144000"/>
@@ -861,7 +862,7 @@
           <a:p>
             <a:fld id="{4AAD347D-5ACD-4C99-B74B-A9C85AD731AF}" type="datetimeFigureOut">
               <a:rPr lang="en-US" smtClean="0"/>
-              <a:t>11/15/2022</a:t>
+              <a:t>11/18/2022</a:t>
             </a:fld>
             <a:endParaRPr lang="en-US" dirty="0"/>
           </a:p>
@@ -1112,7 +1113,7 @@
           <a:p>
             <a:fld id="{4AAD347D-5ACD-4C99-B74B-A9C85AD731AF}" type="datetimeFigureOut">
               <a:rPr lang="en-US" smtClean="0"/>
-              <a:t>11/15/2022</a:t>
+              <a:t>11/18/2022</a:t>
             </a:fld>
             <a:endParaRPr lang="en-US" dirty="0"/>
           </a:p>
@@ -1427,7 +1428,7 @@
           <a:p>
             <a:fld id="{4AAD347D-5ACD-4C99-B74B-A9C85AD731AF}" type="datetimeFigureOut">
               <a:rPr lang="en-US" smtClean="0"/>
-              <a:t>11/15/2022</a:t>
+              <a:t>11/18/2022</a:t>
             </a:fld>
             <a:endParaRPr lang="en-US" dirty="0"/>
           </a:p>
@@ -1769,7 +1770,7 @@
           <a:p>
             <a:fld id="{4509A250-FF31-4206-8172-F9D3106AACB1}" type="datetimeFigureOut">
               <a:rPr lang="en-US" smtClean="0"/>
-              <a:t>11/15/2022</a:t>
+              <a:t>11/18/2022</a:t>
             </a:fld>
             <a:endParaRPr lang="en-US" dirty="0"/>
           </a:p>
@@ -2083,7 +2084,7 @@
           <a:p>
             <a:fld id="{4AAD347D-5ACD-4C99-B74B-A9C85AD731AF}" type="datetimeFigureOut">
               <a:rPr lang="en-US" smtClean="0"/>
-              <a:t>11/15/2022</a:t>
+              <a:t>11/18/2022</a:t>
             </a:fld>
             <a:endParaRPr lang="en-US" dirty="0"/>
           </a:p>
@@ -2477,7 +2478,7 @@
           <a:p>
             <a:fld id="{4AAD347D-5ACD-4C99-B74B-A9C85AD731AF}" type="datetimeFigureOut">
               <a:rPr lang="en-US" smtClean="0"/>
-              <a:t>11/15/2022</a:t>
+              <a:t>11/18/2022</a:t>
             </a:fld>
             <a:endParaRPr lang="en-US" dirty="0"/>
           </a:p>
@@ -2648,7 +2649,7 @@
           <a:p>
             <a:fld id="{4509A250-FF31-4206-8172-F9D3106AACB1}" type="datetimeFigureOut">
               <a:rPr lang="en-US" smtClean="0"/>
-              <a:t>11/15/2022</a:t>
+              <a:t>11/18/2022</a:t>
             </a:fld>
             <a:endParaRPr lang="en-US" dirty="0"/>
           </a:p>
@@ -2828,7 +2829,7 @@
           <a:p>
             <a:fld id="{4509A250-FF31-4206-8172-F9D3106AACB1}" type="datetimeFigureOut">
               <a:rPr lang="en-US" smtClean="0"/>
-              <a:t>11/15/2022</a:t>
+              <a:t>11/18/2022</a:t>
             </a:fld>
             <a:endParaRPr lang="en-US" dirty="0"/>
           </a:p>
@@ -3004,7 +3005,7 @@
           <a:p>
             <a:fld id="{4509A250-FF31-4206-8172-F9D3106AACB1}" type="datetimeFigureOut">
               <a:rPr lang="en-US" smtClean="0"/>
-              <a:t>11/15/2022</a:t>
+              <a:t>11/18/2022</a:t>
             </a:fld>
             <a:endParaRPr lang="en-US" dirty="0"/>
           </a:p>
@@ -3251,7 +3252,7 @@
           <a:p>
             <a:fld id="{9796027F-7875-4030-9381-8BD8C4F21935}" type="datetimeFigureOut">
               <a:rPr lang="en-US" smtClean="0"/>
-              <a:t>11/15/2022</a:t>
+              <a:t>11/18/2022</a:t>
             </a:fld>
             <a:endParaRPr lang="en-US" dirty="0"/>
           </a:p>
@@ -3483,7 +3484,7 @@
           <a:p>
             <a:fld id="{9796027F-7875-4030-9381-8BD8C4F21935}" type="datetimeFigureOut">
               <a:rPr lang="en-US" smtClean="0"/>
-              <a:t>11/15/2022</a:t>
+              <a:t>11/18/2022</a:t>
             </a:fld>
             <a:endParaRPr lang="en-US" dirty="0"/>
           </a:p>
@@ -3857,7 +3858,7 @@
           <a:p>
             <a:fld id="{9796027F-7875-4030-9381-8BD8C4F21935}" type="datetimeFigureOut">
               <a:rPr lang="en-US" smtClean="0"/>
-              <a:t>11/15/2022</a:t>
+              <a:t>11/18/2022</a:t>
             </a:fld>
             <a:endParaRPr lang="en-US" dirty="0"/>
           </a:p>
@@ -3980,7 +3981,7 @@
           <a:p>
             <a:fld id="{4509A250-FF31-4206-8172-F9D3106AACB1}" type="datetimeFigureOut">
               <a:rPr lang="en-US" smtClean="0"/>
-              <a:t>11/15/2022</a:t>
+              <a:t>11/18/2022</a:t>
             </a:fld>
             <a:endParaRPr lang="en-US" dirty="0"/>
           </a:p>
@@ -4075,7 +4076,7 @@
           <a:p>
             <a:fld id="{4509A250-FF31-4206-8172-F9D3106AACB1}" type="datetimeFigureOut">
               <a:rPr lang="en-US" smtClean="0"/>
-              <a:t>11/15/2022</a:t>
+              <a:t>11/18/2022</a:t>
             </a:fld>
             <a:endParaRPr lang="en-US" dirty="0"/>
           </a:p>
@@ -4330,7 +4331,7 @@
           <a:p>
             <a:fld id="{4509A250-FF31-4206-8172-F9D3106AACB1}" type="datetimeFigureOut">
               <a:rPr lang="en-US" smtClean="0"/>
-              <a:t>11/15/2022</a:t>
+              <a:t>11/18/2022</a:t>
             </a:fld>
             <a:endParaRPr lang="en-US" dirty="0"/>
           </a:p>
@@ -4593,7 +4594,7 @@
           <a:p>
             <a:fld id="{4509A250-FF31-4206-8172-F9D3106AACB1}" type="datetimeFigureOut">
               <a:rPr lang="en-US" smtClean="0"/>
-              <a:t>11/15/2022</a:t>
+              <a:t>11/18/2022</a:t>
             </a:fld>
             <a:endParaRPr lang="en-US" dirty="0"/>
           </a:p>
@@ -5336,7 +5337,7 @@
           <a:p>
             <a:fld id="{4AAD347D-5ACD-4C99-B74B-A9C85AD731AF}" type="datetimeFigureOut">
               <a:rPr lang="en-US" smtClean="0"/>
-              <a:t>11/15/2022</a:t>
+              <a:t>11/18/2022</a:t>
             </a:fld>
             <a:endParaRPr lang="en-US" dirty="0"/>
           </a:p>
@@ -10151,9 +10152,20 @@
           <a:p>
             <a:r>
               <a:rPr lang="en-US" dirty="0"/>
-              <a:t>Future Java</a:t>
-            </a:r>
-            <a:endParaRPr lang="en-US" sz="1800" dirty="0"/>
+              <a:t>Future Java </a:t>
+            </a:r>
+            <a:r>
+              <a:rPr lang="en-US" sz="1800" dirty="0"/>
+              <a:t>(</a:t>
+            </a:r>
+            <a:r>
+              <a:rPr lang="en-US" sz="1800" dirty="0" err="1"/>
+              <a:t>Cont</a:t>
+            </a:r>
+            <a:r>
+              <a:rPr lang="en-US" sz="1800" dirty="0"/>
+              <a:t>)</a:t>
+            </a:r>
           </a:p>
         </p:txBody>
       </p:sp>
@@ -10181,17 +10193,21 @@
           <a:p>
             <a:r>
               <a:rPr lang="en-US" dirty="0"/>
-              <a:t>Java 18 (Release Date: 09-20-2022)</a:t>
-            </a:r>
-          </a:p>
-          <a:p>
-            <a:pPr lvl="1">
-              <a:buFont typeface="Wingdings" panose="05000000000000000000" pitchFamily="2" charset="2"/>
-              <a:buChar char="Ø"/>
-            </a:pPr>
-            <a:r>
-              <a:rPr lang="en-US" dirty="0"/>
-              <a:t>JEPs</a:t>
+              <a:t>Java SE Roadmap</a:t>
+            </a:r>
+          </a:p>
+          <a:p>
+            <a:pPr lvl="1">
+              <a:buFont typeface="Wingdings" panose="05000000000000000000" pitchFamily="2" charset="2"/>
+              <a:buChar char="Ø"/>
+            </a:pPr>
+            <a:r>
+              <a:rPr lang="en-US" dirty="0">
+                <a:solidFill>
+                  <a:schemeClr val="tx1"/>
+                </a:solidFill>
+              </a:rPr>
+              <a:t>Java 17 LTS released 09-14-2021</a:t>
             </a:r>
           </a:p>
           <a:p>
@@ -10200,8 +10216,12 @@
               <a:buChar char="Ø"/>
             </a:pPr>
             <a:r>
-              <a:rPr lang="en-US" dirty="0"/>
-              <a:t>**400: UTF-8 by Default</a:t>
+              <a:rPr lang="en-US" dirty="0">
+                <a:solidFill>
+                  <a:schemeClr val="tx1"/>
+                </a:solidFill>
+              </a:rPr>
+              <a:t>Active Support to 09-2026</a:t>
             </a:r>
           </a:p>
           <a:p>
@@ -10210,8 +10230,26 @@
               <a:buChar char="Ø"/>
             </a:pPr>
             <a:r>
-              <a:rPr lang="en-US" dirty="0"/>
-              <a:t>408: Simple Web Server</a:t>
+              <a:rPr lang="en-US" dirty="0">
+                <a:solidFill>
+                  <a:schemeClr val="tx1"/>
+                </a:solidFill>
+              </a:rPr>
+              <a:t>Extended Support to 09-2029</a:t>
+            </a:r>
+          </a:p>
+          <a:p>
+            <a:pPr lvl="1">
+              <a:buFont typeface="Wingdings" panose="05000000000000000000" pitchFamily="2" charset="2"/>
+              <a:buChar char="Ø"/>
+            </a:pPr>
+            <a:r>
+              <a:rPr lang="en-US" dirty="0">
+                <a:solidFill>
+                  <a:schemeClr val="tx1"/>
+                </a:solidFill>
+              </a:rPr>
+              <a:t>Java 18 released 09-20-2022</a:t>
             </a:r>
           </a:p>
           <a:p>
@@ -10220,8 +10258,26 @@
               <a:buChar char="Ø"/>
             </a:pPr>
             <a:r>
-              <a:rPr lang="en-US" dirty="0"/>
-              <a:t>413: Code Snippets in Java API Documentation</a:t>
+              <a:rPr lang="en-US" dirty="0">
+                <a:solidFill>
+                  <a:schemeClr val="tx1"/>
+                </a:solidFill>
+              </a:rPr>
+              <a:t>Active Support to 09-2022</a:t>
+            </a:r>
+          </a:p>
+          <a:p>
+            <a:pPr lvl="1">
+              <a:buFont typeface="Wingdings" panose="05000000000000000000" pitchFamily="2" charset="2"/>
+              <a:buChar char="Ø"/>
+            </a:pPr>
+            <a:r>
+              <a:rPr lang="en-US" dirty="0">
+                <a:solidFill>
+                  <a:schemeClr val="tx1"/>
+                </a:solidFill>
+              </a:rPr>
+              <a:t>Java 19 released 09-20-2022</a:t>
             </a:r>
           </a:p>
           <a:p>
@@ -10230,8 +10286,26 @@
               <a:buChar char="Ø"/>
             </a:pPr>
             <a:r>
-              <a:rPr lang="en-US" dirty="0"/>
-              <a:t>416: Reimplement Core Reflection with Method Handles</a:t>
+              <a:rPr lang="en-US" dirty="0">
+                <a:solidFill>
+                  <a:schemeClr val="tx1"/>
+                </a:solidFill>
+              </a:rPr>
+              <a:t>Active Support to 03-2023</a:t>
+            </a:r>
+          </a:p>
+          <a:p>
+            <a:pPr lvl="1">
+              <a:buFont typeface="Wingdings" panose="05000000000000000000" pitchFamily="2" charset="2"/>
+              <a:buChar char="Ø"/>
+            </a:pPr>
+            <a:r>
+              <a:rPr lang="en-US" dirty="0">
+                <a:solidFill>
+                  <a:schemeClr val="tx1"/>
+                </a:solidFill>
+              </a:rPr>
+              <a:t>Java 20 Release date 03-21-2023</a:t>
             </a:r>
           </a:p>
           <a:p>
@@ -10240,8 +10314,26 @@
               <a:buChar char="Ø"/>
             </a:pPr>
             <a:r>
-              <a:rPr lang="en-US" dirty="0"/>
-              <a:t>417: Vector API (Third Incubator)</a:t>
+              <a:rPr lang="en-US" dirty="0">
+                <a:solidFill>
+                  <a:schemeClr val="tx1"/>
+                </a:solidFill>
+              </a:rPr>
+              <a:t>Active Support to 09-2023</a:t>
+            </a:r>
+          </a:p>
+          <a:p>
+            <a:pPr lvl="1">
+              <a:buFont typeface="Wingdings" panose="05000000000000000000" pitchFamily="2" charset="2"/>
+              <a:buChar char="Ø"/>
+            </a:pPr>
+            <a:r>
+              <a:rPr lang="en-US" dirty="0">
+                <a:solidFill>
+                  <a:schemeClr val="tx1"/>
+                </a:solidFill>
+              </a:rPr>
+              <a:t>Java 21 LTS release date 09-2023</a:t>
             </a:r>
           </a:p>
           <a:p>
@@ -10250,58 +10342,12 @@
               <a:buChar char="Ø"/>
             </a:pPr>
             <a:r>
-              <a:rPr lang="en-US" dirty="0"/>
-              <a:t>*418: Internet-Address Resolution SPI</a:t>
-            </a:r>
-          </a:p>
-          <a:p>
-            <a:pPr lvl="2">
-              <a:buFont typeface="Wingdings" panose="05000000000000000000" pitchFamily="2" charset="2"/>
-              <a:buChar char="Ø"/>
-            </a:pPr>
-            <a:r>
-              <a:rPr lang="en-US" dirty="0"/>
-              <a:t>*419: Foreign Function &amp; Memory API (Second Incubator)</a:t>
-            </a:r>
-          </a:p>
-          <a:p>
-            <a:pPr lvl="2">
-              <a:buFont typeface="Wingdings" panose="05000000000000000000" pitchFamily="2" charset="2"/>
-              <a:buChar char="Ø"/>
-            </a:pPr>
-            <a:r>
-              <a:rPr lang="en-US" dirty="0"/>
-              <a:t>420: Pattern Matching for switch (Second Preview)</a:t>
-            </a:r>
-          </a:p>
-          <a:p>
-            <a:pPr lvl="2">
-              <a:buFont typeface="Wingdings" panose="05000000000000000000" pitchFamily="2" charset="2"/>
-              <a:buChar char="Ø"/>
-            </a:pPr>
-            <a:r>
-              <a:rPr lang="en-US" dirty="0"/>
-              <a:t>**421: Deprecate Finalization for Removal</a:t>
-            </a:r>
-          </a:p>
-          <a:p>
-            <a:pPr lvl="1">
-              <a:buFont typeface="Wingdings" panose="05000000000000000000" pitchFamily="2" charset="2"/>
-              <a:buChar char="Ø"/>
-            </a:pPr>
-            <a:r>
-              <a:rPr lang="en-US" dirty="0"/>
-              <a:t>*New features that may improve performance</a:t>
-            </a:r>
-          </a:p>
-          <a:p>
-            <a:pPr lvl="1">
-              <a:buFont typeface="Wingdings" panose="05000000000000000000" pitchFamily="2" charset="2"/>
-              <a:buChar char="Ø"/>
-            </a:pPr>
-            <a:r>
-              <a:rPr lang="en-US" dirty="0"/>
-              <a:t>**Changes may cause code to not compile, throw exceptions, work unexpectedly</a:t>
+              <a:rPr lang="en-US" dirty="0">
+                <a:solidFill>
+                  <a:schemeClr val="tx1"/>
+                </a:solidFill>
+              </a:rPr>
+              <a:t>Extended Support through 09-2031</a:t>
             </a:r>
           </a:p>
           <a:p>
@@ -10323,7 +10369,7 @@
     </p:spTree>
     <p:extLst>
       <p:ext uri="{BB962C8B-B14F-4D97-AF65-F5344CB8AC3E}">
-        <p14:creationId xmlns:p14="http://schemas.microsoft.com/office/powerpoint/2010/main" val="2416783653"/>
+        <p14:creationId xmlns:p14="http://schemas.microsoft.com/office/powerpoint/2010/main" val="2107629931"/>
       </p:ext>
     </p:extLst>
   </p:cSld>
@@ -10413,7 +10459,7 @@
           <a:p>
             <a:r>
               <a:rPr lang="en-US" dirty="0"/>
-              <a:t>Java 19 (Release Date: 09-20-2022)</a:t>
+              <a:t>Java 18 (Release Date: 03-22-2022)</a:t>
             </a:r>
           </a:p>
           <a:p>
@@ -10433,7 +10479,7 @@
             </a:pPr>
             <a:r>
               <a:rPr lang="en-US" dirty="0"/>
-              <a:t>*405: Record Patterns (Preview)</a:t>
+              <a:t>**400: UTF-8 by Default</a:t>
             </a:r>
           </a:p>
           <a:p>
@@ -10443,7 +10489,7 @@
             </a:pPr>
             <a:r>
               <a:rPr lang="en-US" dirty="0"/>
-              <a:t>422: Linux/RISC-V Port</a:t>
+              <a:t>408: Simple Web Server</a:t>
             </a:r>
           </a:p>
           <a:p>
@@ -10453,7 +10499,7 @@
             </a:pPr>
             <a:r>
               <a:rPr lang="en-US" dirty="0"/>
-              <a:t>*424: Foreign Function &amp; Memory API (Preview)</a:t>
+              <a:t>413: Code Snippets in Java API Documentation</a:t>
             </a:r>
           </a:p>
           <a:p>
@@ -10463,7 +10509,7 @@
             </a:pPr>
             <a:r>
               <a:rPr lang="en-US" dirty="0"/>
-              <a:t>*425: Virtual Threads (Preview)</a:t>
+              <a:t>416: Reimplement Core Reflection with Method Handles</a:t>
             </a:r>
           </a:p>
           <a:p>
@@ -10473,7 +10519,7 @@
             </a:pPr>
             <a:r>
               <a:rPr lang="en-US" dirty="0"/>
-              <a:t>426: Vector API (Fourth Incubator)</a:t>
+              <a:t>417: Vector API (Third Incubator)</a:t>
             </a:r>
           </a:p>
           <a:p>
@@ -10483,7 +10529,7 @@
             </a:pPr>
             <a:r>
               <a:rPr lang="en-US" dirty="0"/>
-              <a:t>427: Pattern Matching for switch (Third Preview)</a:t>
+              <a:t>*418: Internet-Address Resolution SPI</a:t>
             </a:r>
           </a:p>
           <a:p>
@@ -10493,7 +10539,27 @@
             </a:pPr>
             <a:r>
               <a:rPr lang="en-US" dirty="0"/>
-              <a:t>428: Structured Concurrency (Incubator)</a:t>
+              <a:t>*419: Foreign Function &amp; Memory API (Second Incubator)</a:t>
+            </a:r>
+          </a:p>
+          <a:p>
+            <a:pPr lvl="2">
+              <a:buFont typeface="Wingdings" panose="05000000000000000000" pitchFamily="2" charset="2"/>
+              <a:buChar char="Ø"/>
+            </a:pPr>
+            <a:r>
+              <a:rPr lang="en-US" dirty="0"/>
+              <a:t>420: Pattern Matching for switch (Second Preview)</a:t>
+            </a:r>
+          </a:p>
+          <a:p>
+            <a:pPr lvl="2">
+              <a:buFont typeface="Wingdings" panose="05000000000000000000" pitchFamily="2" charset="2"/>
+              <a:buChar char="Ø"/>
+            </a:pPr>
+            <a:r>
+              <a:rPr lang="en-US" dirty="0"/>
+              <a:t>**421: Deprecate Finalization for Removal</a:t>
             </a:r>
           </a:p>
           <a:p>
@@ -10505,13 +10571,37 @@
               <a:rPr lang="en-US" dirty="0"/>
               <a:t>*New features that may improve performance</a:t>
             </a:r>
+          </a:p>
+          <a:p>
+            <a:pPr lvl="1">
+              <a:buFont typeface="Wingdings" panose="05000000000000000000" pitchFamily="2" charset="2"/>
+              <a:buChar char="Ø"/>
+            </a:pPr>
+            <a:r>
+              <a:rPr lang="en-US" dirty="0"/>
+              <a:t>**Changes may cause code to not compile, throw exceptions, work unexpectedly</a:t>
+            </a:r>
+          </a:p>
+          <a:p>
+            <a:pPr lvl="1">
+              <a:buFont typeface="Wingdings" panose="05000000000000000000" pitchFamily="2" charset="2"/>
+              <a:buChar char="Ø"/>
+            </a:pPr>
+            <a:endParaRPr lang="en-US" dirty="0"/>
+          </a:p>
+          <a:p>
+            <a:pPr lvl="2">
+              <a:buFont typeface="Wingdings" panose="05000000000000000000" pitchFamily="2" charset="2"/>
+              <a:buChar char="Ø"/>
+            </a:pPr>
+            <a:endParaRPr lang="en-US" dirty="0"/>
           </a:p>
         </p:txBody>
       </p:sp>
     </p:spTree>
     <p:extLst>
       <p:ext uri="{BB962C8B-B14F-4D97-AF65-F5344CB8AC3E}">
-        <p14:creationId xmlns:p14="http://schemas.microsoft.com/office/powerpoint/2010/main" val="4148255914"/>
+        <p14:creationId xmlns:p14="http://schemas.microsoft.com/office/powerpoint/2010/main" val="2416783653"/>
       </p:ext>
     </p:extLst>
   </p:cSld>
@@ -10595,335 +10685,103 @@
         </p:spPr>
         <p:txBody>
           <a:bodyPr>
-            <a:normAutofit fontScale="85000" lnSpcReduction="20000"/>
+            <a:normAutofit/>
           </a:bodyPr>
           <a:lstStyle/>
           <a:p>
             <a:r>
-              <a:rPr lang="en-US" dirty="0">
-                <a:solidFill>
-                  <a:schemeClr val="tx1"/>
-                </a:solidFill>
-              </a:rPr>
-              <a:t>Java 20 (Release Date: 03-21-2023)</a:t>
-            </a:r>
-          </a:p>
-          <a:p>
-            <a:pPr lvl="1"/>
-            <a:r>
-              <a:rPr lang="en-US" dirty="0">
-                <a:solidFill>
-                  <a:schemeClr val="tx1"/>
-                </a:solidFill>
-              </a:rPr>
+              <a:rPr lang="en-US" dirty="0"/>
+              <a:t>Java 19 (Release Date: 09-20-2022)</a:t>
+            </a:r>
+          </a:p>
+          <a:p>
+            <a:pPr lvl="1">
+              <a:buFont typeface="Wingdings" panose="05000000000000000000" pitchFamily="2" charset="2"/>
+              <a:buChar char="Ø"/>
+            </a:pPr>
+            <a:r>
+              <a:rPr lang="en-US" dirty="0"/>
               <a:t>JEPs</a:t>
             </a:r>
           </a:p>
           <a:p>
-            <a:pPr lvl="2"/>
-            <a:r>
-              <a:rPr lang="en-US" dirty="0">
-                <a:solidFill>
-                  <a:schemeClr val="tx1"/>
-                </a:solidFill>
-              </a:rPr>
-              <a:t>Proposed to Target</a:t>
-            </a:r>
-          </a:p>
-          <a:p>
-            <a:pPr lvl="3">
-              <a:buFont typeface="Wingdings" panose="05000000000000000000" pitchFamily="2" charset="2"/>
-              <a:buChar char="Ø"/>
-            </a:pPr>
-            <a:r>
-              <a:rPr lang="en-US" b="0" i="0" dirty="0">
-                <a:solidFill>
-                  <a:schemeClr val="tx1"/>
-                </a:solidFill>
-                <a:effectLst/>
-              </a:rPr>
-              <a:t>JEP 433: Pattern Matching for switch (Fourth Preview)</a:t>
-            </a:r>
-          </a:p>
-          <a:p>
-            <a:pPr lvl="3">
-              <a:buFont typeface="Wingdings" panose="05000000000000000000" pitchFamily="2" charset="2"/>
-              <a:buChar char="Ø"/>
-            </a:pPr>
-            <a:r>
-              <a:rPr lang="en-US" b="0" i="0" dirty="0">
-                <a:solidFill>
-                  <a:schemeClr val="tx1"/>
-                </a:solidFill>
-                <a:effectLst/>
-              </a:rPr>
-              <a:t>JEP 432: Record Patterns (Second Preview)</a:t>
-            </a:r>
-          </a:p>
-          <a:p>
-            <a:pPr lvl="2"/>
-            <a:r>
-              <a:rPr lang="en-US" dirty="0">
-                <a:solidFill>
-                  <a:schemeClr val="tx1"/>
-                </a:solidFill>
-              </a:rPr>
-              <a:t>C</a:t>
-            </a:r>
-            <a:r>
-              <a:rPr lang="en-US" b="0" i="0" dirty="0">
-                <a:solidFill>
-                  <a:schemeClr val="tx1"/>
-                </a:solidFill>
-                <a:effectLst/>
-              </a:rPr>
-              <a:t>andidates</a:t>
-            </a:r>
-          </a:p>
-          <a:p>
-            <a:pPr lvl="3">
-              <a:buFont typeface="Wingdings" panose="05000000000000000000" pitchFamily="2" charset="2"/>
-              <a:buChar char="Ø"/>
-            </a:pPr>
-            <a:r>
-              <a:rPr lang="en-US" b="0" i="0" dirty="0">
-                <a:solidFill>
-                  <a:schemeClr val="tx1"/>
-                </a:solidFill>
-                <a:effectLst/>
-              </a:rPr>
-              <a:t>JEP 436: Virtual Threads (Second Preview)</a:t>
-            </a:r>
-          </a:p>
-          <a:p>
-            <a:pPr lvl="3">
-              <a:buFont typeface="Wingdings" panose="05000000000000000000" pitchFamily="2" charset="2"/>
-              <a:buChar char="Ø"/>
-            </a:pPr>
-            <a:r>
-              <a:rPr lang="en-US" b="0" i="0" dirty="0">
-                <a:solidFill>
-                  <a:schemeClr val="tx1"/>
-                </a:solidFill>
-                <a:effectLst/>
-              </a:rPr>
-              <a:t>JEP 430: String Templates (Preview)</a:t>
-            </a:r>
-          </a:p>
-          <a:p>
-            <a:pPr lvl="3">
-              <a:buFont typeface="Wingdings" panose="05000000000000000000" pitchFamily="2" charset="2"/>
-              <a:buChar char="Ø"/>
-            </a:pPr>
-            <a:r>
-              <a:rPr lang="en-US" b="0" i="0" dirty="0">
-                <a:solidFill>
-                  <a:schemeClr val="tx1"/>
-                </a:solidFill>
-                <a:effectLst/>
-              </a:rPr>
-              <a:t>JEP 431: Sequenced Collections</a:t>
-            </a:r>
-          </a:p>
-          <a:p>
-            <a:pPr lvl="3">
-              <a:buFont typeface="Wingdings" panose="05000000000000000000" pitchFamily="2" charset="2"/>
-              <a:buChar char="Ø"/>
-            </a:pPr>
-            <a:r>
-              <a:rPr lang="en-US" b="0" i="0" dirty="0">
-                <a:solidFill>
-                  <a:schemeClr val="tx1"/>
-                </a:solidFill>
-                <a:effectLst/>
-              </a:rPr>
-              <a:t>JEP 401: Primitive Classes (Preview)</a:t>
-            </a:r>
-          </a:p>
-          <a:p>
-            <a:pPr lvl="3">
-              <a:buFont typeface="Wingdings" panose="05000000000000000000" pitchFamily="2" charset="2"/>
-              <a:buChar char="Ø"/>
-            </a:pPr>
-            <a:r>
-              <a:rPr lang="en-US" b="0" i="0" dirty="0">
-                <a:solidFill>
-                  <a:schemeClr val="tx1"/>
-                </a:solidFill>
-                <a:effectLst/>
-              </a:rPr>
-              <a:t>JEP 402: Classes for the Basic Primitives (Preview)</a:t>
-            </a:r>
-          </a:p>
-          <a:p>
-            <a:pPr lvl="3">
-              <a:buFont typeface="Wingdings" panose="05000000000000000000" pitchFamily="2" charset="2"/>
-              <a:buChar char="Ø"/>
-            </a:pPr>
-            <a:r>
-              <a:rPr lang="en-US" b="0" i="0" dirty="0">
-                <a:solidFill>
-                  <a:schemeClr val="tx1"/>
-                </a:solidFill>
-                <a:effectLst/>
-              </a:rPr>
-              <a:t>JEP 134: Intuitive Semantics for Nested Reference Objects</a:t>
-            </a:r>
-          </a:p>
-          <a:p>
-            <a:pPr lvl="3">
-              <a:buFont typeface="Wingdings" panose="05000000000000000000" pitchFamily="2" charset="2"/>
-              <a:buChar char="Ø"/>
-            </a:pPr>
-            <a:r>
-              <a:rPr lang="en-US" b="0" i="0" dirty="0">
-                <a:solidFill>
-                  <a:schemeClr val="tx1"/>
-                </a:solidFill>
-                <a:effectLst/>
-              </a:rPr>
-              <a:t>JEP 348: Compiler </a:t>
-            </a:r>
-            <a:r>
-              <a:rPr lang="en-US" b="0" i="0" dirty="0" err="1">
-                <a:solidFill>
-                  <a:schemeClr val="tx1"/>
-                </a:solidFill>
-                <a:effectLst/>
-              </a:rPr>
-              <a:t>Intrinsics</a:t>
-            </a:r>
-            <a:r>
-              <a:rPr lang="en-US" b="0" i="0" dirty="0">
-                <a:solidFill>
-                  <a:schemeClr val="tx1"/>
-                </a:solidFill>
-                <a:effectLst/>
-              </a:rPr>
-              <a:t> for Java SE APIs</a:t>
-            </a:r>
-          </a:p>
-          <a:p>
-            <a:pPr lvl="3">
-              <a:buFont typeface="Wingdings" panose="05000000000000000000" pitchFamily="2" charset="2"/>
-              <a:buChar char="Ø"/>
-            </a:pPr>
-            <a:r>
-              <a:rPr lang="en-US" b="0" i="0" dirty="0">
-                <a:solidFill>
-                  <a:schemeClr val="tx1"/>
-                </a:solidFill>
-                <a:effectLst/>
-              </a:rPr>
-              <a:t>JEP 303: </a:t>
-            </a:r>
-            <a:r>
-              <a:rPr lang="en-US" b="0" i="0" dirty="0" err="1">
-                <a:solidFill>
-                  <a:schemeClr val="tx1"/>
-                </a:solidFill>
-                <a:effectLst/>
-              </a:rPr>
-              <a:t>Intrinsics</a:t>
-            </a:r>
-            <a:r>
-              <a:rPr lang="en-US" b="0" i="0" dirty="0">
-                <a:solidFill>
-                  <a:schemeClr val="tx1"/>
-                </a:solidFill>
-                <a:effectLst/>
-              </a:rPr>
-              <a:t> for the LDC and INVOKEDYNAMIC Instructions</a:t>
-            </a:r>
-          </a:p>
-          <a:p>
-            <a:pPr lvl="3">
-              <a:buFont typeface="Wingdings" panose="05000000000000000000" pitchFamily="2" charset="2"/>
-              <a:buChar char="Ø"/>
-            </a:pPr>
-            <a:r>
-              <a:rPr lang="en-US" b="0" i="0" dirty="0">
-                <a:solidFill>
-                  <a:schemeClr val="tx1"/>
-                </a:solidFill>
-                <a:effectLst/>
-              </a:rPr>
-              <a:t>JEP 218: Generics over Primitive Types</a:t>
-            </a:r>
-          </a:p>
-          <a:p>
-            <a:pPr lvl="3">
-              <a:buFont typeface="Wingdings" panose="05000000000000000000" pitchFamily="2" charset="2"/>
-              <a:buChar char="Ø"/>
-            </a:pPr>
-            <a:r>
-              <a:rPr lang="en-US" b="0" i="0" dirty="0">
-                <a:solidFill>
-                  <a:schemeClr val="tx1"/>
-                </a:solidFill>
-                <a:effectLst/>
-              </a:rPr>
-              <a:t>JEP 198: Light-Weight JSON API</a:t>
-            </a:r>
-          </a:p>
-          <a:p>
-            <a:pPr lvl="3">
-              <a:buFont typeface="Wingdings" panose="05000000000000000000" pitchFamily="2" charset="2"/>
-              <a:buChar char="Ø"/>
-            </a:pPr>
-            <a:r>
-              <a:rPr lang="en-US" b="0" i="0" dirty="0">
-                <a:solidFill>
-                  <a:schemeClr val="tx1"/>
-                </a:solidFill>
-                <a:effectLst/>
-              </a:rPr>
-              <a:t>JEP 302: Lambda Leftovers</a:t>
-            </a:r>
-          </a:p>
-          <a:p>
-            <a:pPr lvl="3">
-              <a:buFont typeface="Wingdings" panose="05000000000000000000" pitchFamily="2" charset="2"/>
-              <a:buChar char="Ø"/>
-            </a:pPr>
-            <a:r>
-              <a:rPr lang="en-US" b="0" i="0" dirty="0">
-                <a:solidFill>
-                  <a:schemeClr val="tx1"/>
-                </a:solidFill>
-                <a:effectLst/>
-              </a:rPr>
-              <a:t>JEP 300: Augment Use-Site Variance with Declaration-Site Defaults</a:t>
-            </a:r>
-          </a:p>
-          <a:p>
-            <a:pPr lvl="3">
-              <a:buFont typeface="Wingdings" panose="05000000000000000000" pitchFamily="2" charset="2"/>
-              <a:buChar char="Ø"/>
-            </a:pPr>
-            <a:r>
-              <a:rPr lang="en-US" b="0" i="0" dirty="0">
-                <a:solidFill>
-                  <a:schemeClr val="tx1"/>
-                </a:solidFill>
-                <a:effectLst/>
-              </a:rPr>
-              <a:t>JEP 111: Additional Unicode Constructs for Regular Expressions</a:t>
-            </a:r>
-          </a:p>
-          <a:p>
-            <a:pPr lvl="3">
-              <a:buFont typeface="Wingdings" panose="05000000000000000000" pitchFamily="2" charset="2"/>
-              <a:buChar char="Ø"/>
-            </a:pPr>
-            <a:r>
-              <a:rPr lang="en-US" b="0" i="0" dirty="0">
-                <a:solidFill>
-                  <a:schemeClr val="tx1"/>
-                </a:solidFill>
-                <a:effectLst/>
-              </a:rPr>
-              <a:t>JEP 152: Crypto Operations with Network HSMs</a:t>
+            <a:pPr lvl="2">
+              <a:buFont typeface="Wingdings" panose="05000000000000000000" pitchFamily="2" charset="2"/>
+              <a:buChar char="Ø"/>
+            </a:pPr>
+            <a:r>
+              <a:rPr lang="en-US" dirty="0"/>
+              <a:t>*405: Record Patterns (Preview)</a:t>
+            </a:r>
+          </a:p>
+          <a:p>
+            <a:pPr lvl="2">
+              <a:buFont typeface="Wingdings" panose="05000000000000000000" pitchFamily="2" charset="2"/>
+              <a:buChar char="Ø"/>
+            </a:pPr>
+            <a:r>
+              <a:rPr lang="en-US" dirty="0"/>
+              <a:t>422: Linux/RISC-V Port</a:t>
+            </a:r>
+          </a:p>
+          <a:p>
+            <a:pPr lvl="2">
+              <a:buFont typeface="Wingdings" panose="05000000000000000000" pitchFamily="2" charset="2"/>
+              <a:buChar char="Ø"/>
+            </a:pPr>
+            <a:r>
+              <a:rPr lang="en-US" dirty="0"/>
+              <a:t>*424: Foreign Function &amp; Memory API (Preview)</a:t>
+            </a:r>
+          </a:p>
+          <a:p>
+            <a:pPr lvl="2">
+              <a:buFont typeface="Wingdings" panose="05000000000000000000" pitchFamily="2" charset="2"/>
+              <a:buChar char="Ø"/>
+            </a:pPr>
+            <a:r>
+              <a:rPr lang="en-US" dirty="0"/>
+              <a:t>*425: Virtual Threads (Preview)</a:t>
+            </a:r>
+          </a:p>
+          <a:p>
+            <a:pPr lvl="2">
+              <a:buFont typeface="Wingdings" panose="05000000000000000000" pitchFamily="2" charset="2"/>
+              <a:buChar char="Ø"/>
+            </a:pPr>
+            <a:r>
+              <a:rPr lang="en-US" dirty="0"/>
+              <a:t>426: Vector API (Fourth Incubator)</a:t>
+            </a:r>
+          </a:p>
+          <a:p>
+            <a:pPr lvl="2">
+              <a:buFont typeface="Wingdings" panose="05000000000000000000" pitchFamily="2" charset="2"/>
+              <a:buChar char="Ø"/>
+            </a:pPr>
+            <a:r>
+              <a:rPr lang="en-US" dirty="0"/>
+              <a:t>427: Pattern Matching for switch (Third Preview)</a:t>
+            </a:r>
+          </a:p>
+          <a:p>
+            <a:pPr lvl="2">
+              <a:buFont typeface="Wingdings" panose="05000000000000000000" pitchFamily="2" charset="2"/>
+              <a:buChar char="Ø"/>
+            </a:pPr>
+            <a:r>
+              <a:rPr lang="en-US" dirty="0"/>
+              <a:t>428: Structured Concurrency (Incubator)</a:t>
+            </a:r>
+          </a:p>
+          <a:p>
+            <a:pPr lvl="1">
+              <a:buFont typeface="Wingdings" panose="05000000000000000000" pitchFamily="2" charset="2"/>
+              <a:buChar char="Ø"/>
+            </a:pPr>
+            <a:r>
+              <a:rPr lang="en-US" dirty="0"/>
+              <a:t>*New features that may improve performance</a:t>
             </a:r>
           </a:p>
         </p:txBody>
@@ -10931,7 +10789,7 @@
     </p:spTree>
     <p:extLst>
       <p:ext uri="{BB962C8B-B14F-4D97-AF65-F5344CB8AC3E}">
-        <p14:creationId xmlns:p14="http://schemas.microsoft.com/office/powerpoint/2010/main" val="2816576464"/>
+        <p14:creationId xmlns:p14="http://schemas.microsoft.com/office/powerpoint/2010/main" val="4148255914"/>
       </p:ext>
     </p:extLst>
   </p:cSld>
@@ -11015,6 +10873,426 @@
         </p:spPr>
         <p:txBody>
           <a:bodyPr>
+            <a:normAutofit fontScale="85000" lnSpcReduction="20000"/>
+          </a:bodyPr>
+          <a:lstStyle/>
+          <a:p>
+            <a:r>
+              <a:rPr lang="en-US" dirty="0">
+                <a:solidFill>
+                  <a:schemeClr val="tx1"/>
+                </a:solidFill>
+              </a:rPr>
+              <a:t>Java 20 (Release Date: 03-21-2023)</a:t>
+            </a:r>
+          </a:p>
+          <a:p>
+            <a:pPr lvl="1"/>
+            <a:r>
+              <a:rPr lang="en-US" dirty="0">
+                <a:solidFill>
+                  <a:schemeClr val="tx1"/>
+                </a:solidFill>
+              </a:rPr>
+              <a:t>JEPs</a:t>
+            </a:r>
+          </a:p>
+          <a:p>
+            <a:pPr lvl="2"/>
+            <a:r>
+              <a:rPr lang="en-US" dirty="0">
+                <a:solidFill>
+                  <a:schemeClr val="tx1"/>
+                </a:solidFill>
+              </a:rPr>
+              <a:t>Proposed to Target</a:t>
+            </a:r>
+          </a:p>
+          <a:p>
+            <a:pPr lvl="3">
+              <a:buFont typeface="Wingdings" panose="05000000000000000000" pitchFamily="2" charset="2"/>
+              <a:buChar char="Ø"/>
+            </a:pPr>
+            <a:r>
+              <a:rPr lang="en-US" b="0" i="0" dirty="0">
+                <a:solidFill>
+                  <a:schemeClr val="tx1"/>
+                </a:solidFill>
+                <a:effectLst/>
+              </a:rPr>
+              <a:t>JEP 433: Pattern Matching for switch (Fourth Preview)</a:t>
+            </a:r>
+          </a:p>
+          <a:p>
+            <a:pPr lvl="3">
+              <a:buFont typeface="Wingdings" panose="05000000000000000000" pitchFamily="2" charset="2"/>
+              <a:buChar char="Ø"/>
+            </a:pPr>
+            <a:r>
+              <a:rPr lang="en-US" b="0" i="0" dirty="0">
+                <a:solidFill>
+                  <a:schemeClr val="tx1"/>
+                </a:solidFill>
+                <a:effectLst/>
+              </a:rPr>
+              <a:t>JEP 432: Record Patterns (Second Preview)</a:t>
+            </a:r>
+          </a:p>
+          <a:p>
+            <a:pPr lvl="2"/>
+            <a:r>
+              <a:rPr lang="en-US" dirty="0">
+                <a:solidFill>
+                  <a:schemeClr val="tx1"/>
+                </a:solidFill>
+              </a:rPr>
+              <a:t>C</a:t>
+            </a:r>
+            <a:r>
+              <a:rPr lang="en-US" b="0" i="0" dirty="0">
+                <a:solidFill>
+                  <a:schemeClr val="tx1"/>
+                </a:solidFill>
+                <a:effectLst/>
+              </a:rPr>
+              <a:t>andidates</a:t>
+            </a:r>
+          </a:p>
+          <a:p>
+            <a:pPr lvl="3">
+              <a:buFont typeface="Wingdings" panose="05000000000000000000" pitchFamily="2" charset="2"/>
+              <a:buChar char="Ø"/>
+            </a:pPr>
+            <a:r>
+              <a:rPr lang="en-US" b="0" i="0" dirty="0">
+                <a:solidFill>
+                  <a:schemeClr val="tx1"/>
+                </a:solidFill>
+                <a:effectLst/>
+              </a:rPr>
+              <a:t>JEP 436: Virtual Threads (Second Preview)</a:t>
+            </a:r>
+          </a:p>
+          <a:p>
+            <a:pPr lvl="3">
+              <a:buFont typeface="Wingdings" panose="05000000000000000000" pitchFamily="2" charset="2"/>
+              <a:buChar char="Ø"/>
+            </a:pPr>
+            <a:r>
+              <a:rPr lang="en-US" b="0" i="0" dirty="0">
+                <a:solidFill>
+                  <a:schemeClr val="tx1"/>
+                </a:solidFill>
+                <a:effectLst/>
+              </a:rPr>
+              <a:t>JEP 430: String Templates (Preview)</a:t>
+            </a:r>
+          </a:p>
+          <a:p>
+            <a:pPr lvl="3">
+              <a:buFont typeface="Wingdings" panose="05000000000000000000" pitchFamily="2" charset="2"/>
+              <a:buChar char="Ø"/>
+            </a:pPr>
+            <a:r>
+              <a:rPr lang="en-US" b="0" i="0" dirty="0">
+                <a:solidFill>
+                  <a:schemeClr val="tx1"/>
+                </a:solidFill>
+                <a:effectLst/>
+              </a:rPr>
+              <a:t>JEP 431: Sequenced Collections</a:t>
+            </a:r>
+          </a:p>
+          <a:p>
+            <a:pPr lvl="3">
+              <a:buFont typeface="Wingdings" panose="05000000000000000000" pitchFamily="2" charset="2"/>
+              <a:buChar char="Ø"/>
+            </a:pPr>
+            <a:r>
+              <a:rPr lang="en-US" b="0" i="0" dirty="0">
+                <a:solidFill>
+                  <a:schemeClr val="tx1"/>
+                </a:solidFill>
+                <a:effectLst/>
+              </a:rPr>
+              <a:t>JEP 401: Primitive Classes (Preview)</a:t>
+            </a:r>
+          </a:p>
+          <a:p>
+            <a:pPr lvl="3">
+              <a:buFont typeface="Wingdings" panose="05000000000000000000" pitchFamily="2" charset="2"/>
+              <a:buChar char="Ø"/>
+            </a:pPr>
+            <a:r>
+              <a:rPr lang="en-US" b="0" i="0" dirty="0">
+                <a:solidFill>
+                  <a:schemeClr val="tx1"/>
+                </a:solidFill>
+                <a:effectLst/>
+              </a:rPr>
+              <a:t>JEP 402: Classes for the Basic Primitives (Preview)</a:t>
+            </a:r>
+          </a:p>
+          <a:p>
+            <a:pPr lvl="3">
+              <a:buFont typeface="Wingdings" panose="05000000000000000000" pitchFamily="2" charset="2"/>
+              <a:buChar char="Ø"/>
+            </a:pPr>
+            <a:r>
+              <a:rPr lang="en-US" b="0" i="0" dirty="0">
+                <a:solidFill>
+                  <a:schemeClr val="tx1"/>
+                </a:solidFill>
+                <a:effectLst/>
+              </a:rPr>
+              <a:t>JEP 134: Intuitive Semantics for Nested Reference Objects</a:t>
+            </a:r>
+          </a:p>
+          <a:p>
+            <a:pPr lvl="3">
+              <a:buFont typeface="Wingdings" panose="05000000000000000000" pitchFamily="2" charset="2"/>
+              <a:buChar char="Ø"/>
+            </a:pPr>
+            <a:r>
+              <a:rPr lang="en-US" b="0" i="0" dirty="0">
+                <a:solidFill>
+                  <a:schemeClr val="tx1"/>
+                </a:solidFill>
+                <a:effectLst/>
+              </a:rPr>
+              <a:t>JEP 348: Compiler </a:t>
+            </a:r>
+            <a:r>
+              <a:rPr lang="en-US" b="0" i="0" dirty="0" err="1">
+                <a:solidFill>
+                  <a:schemeClr val="tx1"/>
+                </a:solidFill>
+                <a:effectLst/>
+              </a:rPr>
+              <a:t>Intrinsics</a:t>
+            </a:r>
+            <a:r>
+              <a:rPr lang="en-US" b="0" i="0" dirty="0">
+                <a:solidFill>
+                  <a:schemeClr val="tx1"/>
+                </a:solidFill>
+                <a:effectLst/>
+              </a:rPr>
+              <a:t> for Java SE APIs</a:t>
+            </a:r>
+          </a:p>
+          <a:p>
+            <a:pPr lvl="3">
+              <a:buFont typeface="Wingdings" panose="05000000000000000000" pitchFamily="2" charset="2"/>
+              <a:buChar char="Ø"/>
+            </a:pPr>
+            <a:r>
+              <a:rPr lang="en-US" b="0" i="0" dirty="0">
+                <a:solidFill>
+                  <a:schemeClr val="tx1"/>
+                </a:solidFill>
+                <a:effectLst/>
+              </a:rPr>
+              <a:t>JEP 303: </a:t>
+            </a:r>
+            <a:r>
+              <a:rPr lang="en-US" b="0" i="0" dirty="0" err="1">
+                <a:solidFill>
+                  <a:schemeClr val="tx1"/>
+                </a:solidFill>
+                <a:effectLst/>
+              </a:rPr>
+              <a:t>Intrinsics</a:t>
+            </a:r>
+            <a:r>
+              <a:rPr lang="en-US" b="0" i="0" dirty="0">
+                <a:solidFill>
+                  <a:schemeClr val="tx1"/>
+                </a:solidFill>
+                <a:effectLst/>
+              </a:rPr>
+              <a:t> for the LDC and INVOKEDYNAMIC Instructions</a:t>
+            </a:r>
+          </a:p>
+          <a:p>
+            <a:pPr lvl="3">
+              <a:buFont typeface="Wingdings" panose="05000000000000000000" pitchFamily="2" charset="2"/>
+              <a:buChar char="Ø"/>
+            </a:pPr>
+            <a:r>
+              <a:rPr lang="en-US" b="0" i="0" dirty="0">
+                <a:solidFill>
+                  <a:schemeClr val="tx1"/>
+                </a:solidFill>
+                <a:effectLst/>
+              </a:rPr>
+              <a:t>JEP 218: Generics over Primitive Types</a:t>
+            </a:r>
+          </a:p>
+          <a:p>
+            <a:pPr lvl="3">
+              <a:buFont typeface="Wingdings" panose="05000000000000000000" pitchFamily="2" charset="2"/>
+              <a:buChar char="Ø"/>
+            </a:pPr>
+            <a:r>
+              <a:rPr lang="en-US" b="0" i="0" dirty="0">
+                <a:solidFill>
+                  <a:schemeClr val="tx1"/>
+                </a:solidFill>
+                <a:effectLst/>
+              </a:rPr>
+              <a:t>JEP 198: Light-Weight JSON API</a:t>
+            </a:r>
+          </a:p>
+          <a:p>
+            <a:pPr lvl="3">
+              <a:buFont typeface="Wingdings" panose="05000000000000000000" pitchFamily="2" charset="2"/>
+              <a:buChar char="Ø"/>
+            </a:pPr>
+            <a:r>
+              <a:rPr lang="en-US" b="0" i="0" dirty="0">
+                <a:solidFill>
+                  <a:schemeClr val="tx1"/>
+                </a:solidFill>
+                <a:effectLst/>
+              </a:rPr>
+              <a:t>JEP 302: Lambda Leftovers</a:t>
+            </a:r>
+          </a:p>
+          <a:p>
+            <a:pPr lvl="3">
+              <a:buFont typeface="Wingdings" panose="05000000000000000000" pitchFamily="2" charset="2"/>
+              <a:buChar char="Ø"/>
+            </a:pPr>
+            <a:r>
+              <a:rPr lang="en-US" b="0" i="0" dirty="0">
+                <a:solidFill>
+                  <a:schemeClr val="tx1"/>
+                </a:solidFill>
+                <a:effectLst/>
+              </a:rPr>
+              <a:t>JEP 300: Augment Use-Site Variance with Declaration-Site Defaults</a:t>
+            </a:r>
+          </a:p>
+          <a:p>
+            <a:pPr lvl="3">
+              <a:buFont typeface="Wingdings" panose="05000000000000000000" pitchFamily="2" charset="2"/>
+              <a:buChar char="Ø"/>
+            </a:pPr>
+            <a:r>
+              <a:rPr lang="en-US" b="0" i="0" dirty="0">
+                <a:solidFill>
+                  <a:schemeClr val="tx1"/>
+                </a:solidFill>
+                <a:effectLst/>
+              </a:rPr>
+              <a:t>JEP 111: Additional Unicode Constructs for Regular Expressions</a:t>
+            </a:r>
+          </a:p>
+          <a:p>
+            <a:pPr lvl="3">
+              <a:buFont typeface="Wingdings" panose="05000000000000000000" pitchFamily="2" charset="2"/>
+              <a:buChar char="Ø"/>
+            </a:pPr>
+            <a:r>
+              <a:rPr lang="en-US" b="0" i="0" dirty="0">
+                <a:solidFill>
+                  <a:schemeClr val="tx1"/>
+                </a:solidFill>
+                <a:effectLst/>
+              </a:rPr>
+              <a:t>JEP 152: Crypto Operations with Network HSMs</a:t>
+            </a:r>
+          </a:p>
+        </p:txBody>
+      </p:sp>
+    </p:spTree>
+    <p:extLst>
+      <p:ext uri="{BB962C8B-B14F-4D97-AF65-F5344CB8AC3E}">
+        <p14:creationId xmlns:p14="http://schemas.microsoft.com/office/powerpoint/2010/main" val="2816576464"/>
+      </p:ext>
+    </p:extLst>
+  </p:cSld>
+  <p:clrMapOvr>
+    <a:masterClrMapping/>
+  </p:clrMapOvr>
+</p:sld>
+</file>
+
+<file path=ppt/slides/slide27.xml><?xml version="1.0" encoding="utf-8"?>
+<p:sld xmlns:a="http://schemas.openxmlformats.org/drawingml/2006/main" xmlns:r="http://schemas.openxmlformats.org/officeDocument/2006/relationships" xmlns:p="http://schemas.openxmlformats.org/presentationml/2006/main">
+  <p:cSld>
+    <p:spTree>
+      <p:nvGrpSpPr>
+        <p:cNvPr id="1" name=""/>
+        <p:cNvGrpSpPr/>
+        <p:nvPr/>
+      </p:nvGrpSpPr>
+      <p:grpSpPr>
+        <a:xfrm>
+          <a:off x="0" y="0"/>
+          <a:ext cx="0" cy="0"/>
+          <a:chOff x="0" y="0"/>
+          <a:chExt cx="0" cy="0"/>
+        </a:xfrm>
+      </p:grpSpPr>
+      <p:sp>
+        <p:nvSpPr>
+          <p:cNvPr id="2" name="Title 1"/>
+          <p:cNvSpPr>
+            <a:spLocks noGrp="1"/>
+          </p:cNvSpPr>
+          <p:nvPr>
+            <p:ph type="title"/>
+          </p:nvPr>
+        </p:nvSpPr>
+        <p:spPr>
+          <a:xfrm>
+            <a:off x="646111" y="452718"/>
+            <a:ext cx="9404723" cy="910569"/>
+          </a:xfrm>
+        </p:spPr>
+        <p:txBody>
+          <a:bodyPr/>
+          <a:lstStyle/>
+          <a:p>
+            <a:r>
+              <a:rPr lang="en-US" dirty="0"/>
+              <a:t>Future Java </a:t>
+            </a:r>
+            <a:r>
+              <a:rPr lang="en-US" sz="1800" dirty="0"/>
+              <a:t>(</a:t>
+            </a:r>
+            <a:r>
+              <a:rPr lang="en-US" sz="1800" dirty="0" err="1"/>
+              <a:t>Cont</a:t>
+            </a:r>
+            <a:r>
+              <a:rPr lang="en-US" sz="1800" dirty="0"/>
+              <a:t>)</a:t>
+            </a:r>
+          </a:p>
+        </p:txBody>
+      </p:sp>
+      <p:sp>
+        <p:nvSpPr>
+          <p:cNvPr id="3" name="Content Placeholder 2"/>
+          <p:cNvSpPr>
+            <a:spLocks noGrp="1"/>
+          </p:cNvSpPr>
+          <p:nvPr>
+            <p:ph idx="1"/>
+          </p:nvPr>
+        </p:nvSpPr>
+        <p:spPr>
+          <a:xfrm>
+            <a:off x="646111" y="1363287"/>
+            <a:ext cx="9403743" cy="5120639"/>
+          </a:xfrm>
+        </p:spPr>
+        <p:txBody>
+          <a:bodyPr>
             <a:normAutofit/>
           </a:bodyPr>
           <a:lstStyle/>
@@ -11083,10 +11361,9 @@
           <a:p>
             <a:pPr lvl="2"/>
             <a:r>
-              <a:rPr lang="en-US" dirty="0" err="1"/>
-              <a:t>etc</a:t>
-            </a:r>
-            <a:endParaRPr lang="en-US" dirty="0"/>
+              <a:rPr lang="en-US" dirty="0"/>
+              <a:t>Etc.</a:t>
+            </a:r>
           </a:p>
         </p:txBody>
       </p:sp>
@@ -11103,7 +11380,7 @@
 </p:sld>
 </file>
 
-<file path=ppt/slides/slide27.xml><?xml version="1.0" encoding="utf-8"?>
+<file path=ppt/slides/slide28.xml><?xml version="1.0" encoding="utf-8"?>
 <p:sld xmlns:a="http://schemas.openxmlformats.org/drawingml/2006/main" xmlns:r="http://schemas.openxmlformats.org/officeDocument/2006/relationships" xmlns:p="http://schemas.openxmlformats.org/presentationml/2006/main">
   <p:cSld>
     <p:spTree>
@@ -11198,7 +11475,7 @@
 </p:sld>
 </file>
 
-<file path=ppt/slides/slide28.xml><?xml version="1.0" encoding="utf-8"?>
+<file path=ppt/slides/slide29.xml><?xml version="1.0" encoding="utf-8"?>
 <p:sld xmlns:a="http://schemas.openxmlformats.org/drawingml/2006/main" xmlns:r="http://schemas.openxmlformats.org/officeDocument/2006/relationships" xmlns:p="http://schemas.openxmlformats.org/presentationml/2006/main">
   <p:cSld>
     <p:spTree>
@@ -11274,7 +11551,7 @@
         </p:spPr>
         <p:txBody>
           <a:bodyPr>
-            <a:normAutofit lnSpcReduction="10000"/>
+            <a:normAutofit fontScale="92500" lnSpcReduction="10000"/>
           </a:bodyPr>
           <a:lstStyle/>
           <a:p>
@@ -11646,7 +11923,7 @@
                   </a:extLst>
                 </a:hlinkClick>
               </a:rPr>
-              <a:t>Java 17 Features: A comparison between versions 8 and 17. What has changed over the years?</a:t>
+              <a:t>Java 17: Container Awareness</a:t>
             </a:r>
             <a:endParaRPr lang="en-US" sz="1600" dirty="0">
               <a:solidFill>
@@ -11690,7 +11967,7 @@
                   </a:extLst>
                 </a:hlinkClick>
               </a:rPr>
-              <a:t>Java Version Almanac</a:t>
+              <a:t>Java 17 Features: A comparison between versions 8 and 17. What has changed over the years?</a:t>
             </a:r>
             <a:endParaRPr lang="en-US" sz="1600" dirty="0">
               <a:solidFill>
@@ -11734,7 +12011,7 @@
                   </a:extLst>
                 </a:hlinkClick>
               </a:rPr>
-              <a:t>JDK 19: The New Features in Java 19</a:t>
+              <a:t>Java Version Almanac</a:t>
             </a:r>
             <a:endParaRPr lang="en-US" sz="1600" dirty="0">
               <a:solidFill>
@@ -11778,7 +12055,7 @@
                   </a:extLst>
                 </a:hlinkClick>
               </a:rPr>
-              <a:t>JEP-0 (JDK Enhancements and Proposals)</a:t>
+              <a:t>JDK 19: The New Features in Java 19</a:t>
             </a:r>
             <a:endParaRPr lang="en-US" sz="1600" dirty="0">
               <a:solidFill>
@@ -11822,7 +12099,7 @@
                   </a:extLst>
                 </a:hlinkClick>
               </a:rPr>
-              <a:t>Monitoring Java Application with Flight Recorder</a:t>
+              <a:t>JEP-0 (JDK Enhancements and Proposals)</a:t>
             </a:r>
             <a:endParaRPr lang="en-US" sz="1600" dirty="0">
               <a:solidFill>
@@ -11866,7 +12143,95 @@
                   </a:extLst>
                 </a:hlinkClick>
               </a:rPr>
+              <a:t>Monitoring Java Application with Flight Recorder</a:t>
+            </a:r>
+            <a:endParaRPr lang="en-US" sz="1600" dirty="0">
+              <a:solidFill>
+                <a:schemeClr val="accent2"/>
+              </a:solidFill>
+              <a:effectLst>
+                <a:glow rad="38100">
+                  <a:prstClr val="black">
+                    <a:lumMod val="50000"/>
+                    <a:lumOff val="50000"/>
+                    <a:alpha val="20000"/>
+                  </a:prstClr>
+                </a:glow>
+              </a:effectLst>
+            </a:endParaRPr>
+          </a:p>
+          <a:p>
+            <a:pPr marL="285750" indent="-285750">
+              <a:buFont typeface="Arial" panose="020B0604020202020204" pitchFamily="34" charset="0"/>
+              <a:buChar char="•"/>
+            </a:pPr>
+            <a:r>
+              <a:rPr lang="en-US" sz="1600" dirty="0">
+                <a:solidFill>
+                  <a:schemeClr val="accent2"/>
+                </a:solidFill>
+                <a:effectLst>
+                  <a:glow rad="38100">
+                    <a:prstClr val="black">
+                      <a:lumMod val="50000"/>
+                      <a:lumOff val="50000"/>
+                      <a:alpha val="20000"/>
+                    </a:prstClr>
+                  </a:glow>
+                </a:effectLst>
+                <a:hlinkClick r:id="rId15">
+                  <a:extLst>
+                    <a:ext uri="{A12FA001-AC4F-418D-AE19-62706E023703}">
+                      <ahyp:hlinkClr xmlns:ahyp="http://schemas.microsoft.com/office/drawing/2018/hyperlinkcolor" val="tx"/>
+                    </a:ext>
+                  </a:extLst>
+                </a:hlinkClick>
+              </a:rPr>
               <a:t>Oracle JDK Migration Guide</a:t>
+            </a:r>
+            <a:endParaRPr lang="en-US" sz="1600" dirty="0">
+              <a:solidFill>
+                <a:schemeClr val="accent2"/>
+              </a:solidFill>
+              <a:effectLst>
+                <a:glow rad="38100">
+                  <a:prstClr val="black">
+                    <a:lumMod val="50000"/>
+                    <a:lumOff val="50000"/>
+                    <a:alpha val="20000"/>
+                  </a:prstClr>
+                </a:glow>
+              </a:effectLst>
+            </a:endParaRPr>
+          </a:p>
+          <a:p>
+            <a:pPr marL="285750" indent="-285750">
+              <a:buFont typeface="Arial" panose="020B0604020202020204" pitchFamily="34" charset="0"/>
+              <a:buChar char="•"/>
+            </a:pPr>
+            <a:r>
+              <a:rPr lang="en-US" sz="1600" dirty="0">
+                <a:solidFill>
+                  <a:schemeClr val="accent2"/>
+                </a:solidFill>
+                <a:effectLst>
+                  <a:glow rad="38100">
+                    <a:prstClr val="black">
+                      <a:lumMod val="50000"/>
+                      <a:lumOff val="50000"/>
+                      <a:alpha val="20000"/>
+                    </a:prstClr>
+                  </a:glow>
+                </a:effectLst>
+                <a:hlinkClick r:id="rId16">
+                  <a:extLst>
+                    <a:ext uri="{A12FA001-AC4F-418D-AE19-62706E023703}">
+                      <ahyp:hlinkClr xmlns:ahyp="http://schemas.microsoft.com/office/drawing/2018/hyperlinkcolor" val="tx"/>
+                    </a:ext>
+                  </a:extLst>
+                </a:hlinkClick>
+              </a:rPr>
+              <a:t>Oracle Java SE Support Roadmap</a:t>
             </a:r>
             <a:endParaRPr lang="en-US" sz="1600" dirty="0">
               <a:solidFill>

</xml_diff>

<commit_message>
Final version of Java 17 Upgrade PPT
</commit_message>
<xml_diff>
--- a/doc/reference/Java_17 _Upgrade.pptx
+++ b/doc/reference/Java_17 _Upgrade.pptx
@@ -862,7 +862,7 @@
           <a:p>
             <a:fld id="{4AAD347D-5ACD-4C99-B74B-A9C85AD731AF}" type="datetimeFigureOut">
               <a:rPr lang="en-US" smtClean="0"/>
-              <a:t>11/18/2022</a:t>
+              <a:t>11/29/2022</a:t>
             </a:fld>
             <a:endParaRPr lang="en-US" dirty="0"/>
           </a:p>
@@ -1113,7 +1113,7 @@
           <a:p>
             <a:fld id="{4AAD347D-5ACD-4C99-B74B-A9C85AD731AF}" type="datetimeFigureOut">
               <a:rPr lang="en-US" smtClean="0"/>
-              <a:t>11/18/2022</a:t>
+              <a:t>11/29/2022</a:t>
             </a:fld>
             <a:endParaRPr lang="en-US" dirty="0"/>
           </a:p>
@@ -1428,7 +1428,7 @@
           <a:p>
             <a:fld id="{4AAD347D-5ACD-4C99-B74B-A9C85AD731AF}" type="datetimeFigureOut">
               <a:rPr lang="en-US" smtClean="0"/>
-              <a:t>11/18/2022</a:t>
+              <a:t>11/29/2022</a:t>
             </a:fld>
             <a:endParaRPr lang="en-US" dirty="0"/>
           </a:p>
@@ -1770,7 +1770,7 @@
           <a:p>
             <a:fld id="{4509A250-FF31-4206-8172-F9D3106AACB1}" type="datetimeFigureOut">
               <a:rPr lang="en-US" smtClean="0"/>
-              <a:t>11/18/2022</a:t>
+              <a:t>11/29/2022</a:t>
             </a:fld>
             <a:endParaRPr lang="en-US" dirty="0"/>
           </a:p>
@@ -2084,7 +2084,7 @@
           <a:p>
             <a:fld id="{4AAD347D-5ACD-4C99-B74B-A9C85AD731AF}" type="datetimeFigureOut">
               <a:rPr lang="en-US" smtClean="0"/>
-              <a:t>11/18/2022</a:t>
+              <a:t>11/29/2022</a:t>
             </a:fld>
             <a:endParaRPr lang="en-US" dirty="0"/>
           </a:p>
@@ -2478,7 +2478,7 @@
           <a:p>
             <a:fld id="{4AAD347D-5ACD-4C99-B74B-A9C85AD731AF}" type="datetimeFigureOut">
               <a:rPr lang="en-US" smtClean="0"/>
-              <a:t>11/18/2022</a:t>
+              <a:t>11/29/2022</a:t>
             </a:fld>
             <a:endParaRPr lang="en-US" dirty="0"/>
           </a:p>
@@ -2649,7 +2649,7 @@
           <a:p>
             <a:fld id="{4509A250-FF31-4206-8172-F9D3106AACB1}" type="datetimeFigureOut">
               <a:rPr lang="en-US" smtClean="0"/>
-              <a:t>11/18/2022</a:t>
+              <a:t>11/29/2022</a:t>
             </a:fld>
             <a:endParaRPr lang="en-US" dirty="0"/>
           </a:p>
@@ -2829,7 +2829,7 @@
           <a:p>
             <a:fld id="{4509A250-FF31-4206-8172-F9D3106AACB1}" type="datetimeFigureOut">
               <a:rPr lang="en-US" smtClean="0"/>
-              <a:t>11/18/2022</a:t>
+              <a:t>11/29/2022</a:t>
             </a:fld>
             <a:endParaRPr lang="en-US" dirty="0"/>
           </a:p>
@@ -3005,7 +3005,7 @@
           <a:p>
             <a:fld id="{4509A250-FF31-4206-8172-F9D3106AACB1}" type="datetimeFigureOut">
               <a:rPr lang="en-US" smtClean="0"/>
-              <a:t>11/18/2022</a:t>
+              <a:t>11/29/2022</a:t>
             </a:fld>
             <a:endParaRPr lang="en-US" dirty="0"/>
           </a:p>
@@ -3252,7 +3252,7 @@
           <a:p>
             <a:fld id="{9796027F-7875-4030-9381-8BD8C4F21935}" type="datetimeFigureOut">
               <a:rPr lang="en-US" smtClean="0"/>
-              <a:t>11/18/2022</a:t>
+              <a:t>11/29/2022</a:t>
             </a:fld>
             <a:endParaRPr lang="en-US" dirty="0"/>
           </a:p>
@@ -3484,7 +3484,7 @@
           <a:p>
             <a:fld id="{9796027F-7875-4030-9381-8BD8C4F21935}" type="datetimeFigureOut">
               <a:rPr lang="en-US" smtClean="0"/>
-              <a:t>11/18/2022</a:t>
+              <a:t>11/29/2022</a:t>
             </a:fld>
             <a:endParaRPr lang="en-US" dirty="0"/>
           </a:p>
@@ -3858,7 +3858,7 @@
           <a:p>
             <a:fld id="{9796027F-7875-4030-9381-8BD8C4F21935}" type="datetimeFigureOut">
               <a:rPr lang="en-US" smtClean="0"/>
-              <a:t>11/18/2022</a:t>
+              <a:t>11/29/2022</a:t>
             </a:fld>
             <a:endParaRPr lang="en-US" dirty="0"/>
           </a:p>
@@ -3981,7 +3981,7 @@
           <a:p>
             <a:fld id="{4509A250-FF31-4206-8172-F9D3106AACB1}" type="datetimeFigureOut">
               <a:rPr lang="en-US" smtClean="0"/>
-              <a:t>11/18/2022</a:t>
+              <a:t>11/29/2022</a:t>
             </a:fld>
             <a:endParaRPr lang="en-US" dirty="0"/>
           </a:p>
@@ -4076,7 +4076,7 @@
           <a:p>
             <a:fld id="{4509A250-FF31-4206-8172-F9D3106AACB1}" type="datetimeFigureOut">
               <a:rPr lang="en-US" smtClean="0"/>
-              <a:t>11/18/2022</a:t>
+              <a:t>11/29/2022</a:t>
             </a:fld>
             <a:endParaRPr lang="en-US" dirty="0"/>
           </a:p>
@@ -4331,7 +4331,7 @@
           <a:p>
             <a:fld id="{4509A250-FF31-4206-8172-F9D3106AACB1}" type="datetimeFigureOut">
               <a:rPr lang="en-US" smtClean="0"/>
-              <a:t>11/18/2022</a:t>
+              <a:t>11/29/2022</a:t>
             </a:fld>
             <a:endParaRPr lang="en-US" dirty="0"/>
           </a:p>
@@ -4594,7 +4594,7 @@
           <a:p>
             <a:fld id="{4509A250-FF31-4206-8172-F9D3106AACB1}" type="datetimeFigureOut">
               <a:rPr lang="en-US" smtClean="0"/>
-              <a:t>11/18/2022</a:t>
+              <a:t>11/29/2022</a:t>
             </a:fld>
             <a:endParaRPr lang="en-US" dirty="0"/>
           </a:p>
@@ -5337,7 +5337,7 @@
           <a:p>
             <a:fld id="{4AAD347D-5ACD-4C99-B74B-A9C85AD731AF}" type="datetimeFigureOut">
               <a:rPr lang="en-US" smtClean="0"/>
-              <a:t>11/18/2022</a:t>
+              <a:t>11/29/2022</a:t>
             </a:fld>
             <a:endParaRPr lang="en-US" dirty="0"/>
           </a:p>
@@ -7938,7 +7938,7 @@
           </a:bodyPr>
           <a:lstStyle/>
           <a:p>
-            <a:pPr lvl="1">
+            <a:pPr>
               <a:buFont typeface="Wingdings" panose="05000000000000000000" pitchFamily="2" charset="2"/>
               <a:buChar char="Ø"/>
             </a:pPr>
@@ -7947,15 +7947,15 @@
               <a:t>Removals </a:t>
             </a:r>
             <a:r>
-              <a:rPr lang="en-US" sz="1100" dirty="0"/>
+              <a:rPr lang="en-US" sz="1300" dirty="0"/>
               <a:t>(</a:t>
             </a:r>
             <a:r>
-              <a:rPr lang="en-US" sz="1100" dirty="0" err="1"/>
+              <a:rPr lang="en-US" sz="1300" dirty="0" err="1"/>
               <a:t>Cont</a:t>
             </a:r>
             <a:r>
-              <a:rPr lang="en-US" sz="1100" dirty="0"/>
+              <a:rPr lang="en-US" sz="1300" dirty="0"/>
               <a:t>)</a:t>
             </a:r>
             <a:endParaRPr lang="en-US" dirty="0">
@@ -8371,6 +8371,16 @@
             </a:pPr>
             <a:r>
               <a:rPr lang="en-US" dirty="0"/>
+              <a:t>320</a:t>
+            </a:r>
+          </a:p>
+          <a:p>
+            <a:pPr lvl="1">
+              <a:buFont typeface="Wingdings" panose="05000000000000000000" pitchFamily="2" charset="2"/>
+              <a:buChar char="Ø"/>
+            </a:pPr>
+            <a:r>
+              <a:rPr lang="en-US" dirty="0"/>
               <a:t>321</a:t>
             </a:r>
           </a:p>
@@ -8399,6 +8409,20 @@
               <a:buFont typeface="Wingdings" panose="05000000000000000000" pitchFamily="2" charset="2"/>
               <a:buChar char="Ø"/>
             </a:pPr>
+            <a:endParaRPr lang="en-US" dirty="0"/>
+          </a:p>
+          <a:p>
+            <a:pPr lvl="1">
+              <a:buFont typeface="Wingdings" panose="05000000000000000000" pitchFamily="2" charset="2"/>
+              <a:buChar char="Ø"/>
+            </a:pPr>
+            <a:endParaRPr lang="en-US" dirty="0"/>
+          </a:p>
+          <a:p>
+            <a:pPr lvl="1">
+              <a:buFont typeface="Wingdings" panose="05000000000000000000" pitchFamily="2" charset="2"/>
+              <a:buChar char="Ø"/>
+            </a:pPr>
             <a:r>
               <a:rPr lang="en-US" dirty="0"/>
               <a:t>346</a:t>
@@ -8409,20 +8433,6 @@
               <a:buFont typeface="Wingdings" panose="05000000000000000000" pitchFamily="2" charset="2"/>
               <a:buChar char="Ø"/>
             </a:pPr>
-            <a:endParaRPr lang="en-US" dirty="0"/>
-          </a:p>
-          <a:p>
-            <a:pPr lvl="1">
-              <a:buFont typeface="Wingdings" panose="05000000000000000000" pitchFamily="2" charset="2"/>
-              <a:buChar char="Ø"/>
-            </a:pPr>
-            <a:endParaRPr lang="en-US" dirty="0"/>
-          </a:p>
-          <a:p>
-            <a:pPr lvl="1">
-              <a:buFont typeface="Wingdings" panose="05000000000000000000" pitchFamily="2" charset="2"/>
-              <a:buChar char="Ø"/>
-            </a:pPr>
             <a:r>
               <a:rPr lang="en-US" dirty="0"/>
               <a:t>350</a:t>
@@ -8527,13 +8537,6 @@
               <a:rPr lang="en-US" dirty="0"/>
               <a:t>391</a:t>
             </a:r>
-          </a:p>
-          <a:p>
-            <a:pPr lvl="1">
-              <a:buFont typeface="Wingdings" panose="05000000000000000000" pitchFamily="2" charset="2"/>
-              <a:buChar char="Ø"/>
-            </a:pPr>
-            <a:endParaRPr lang="en-US" dirty="0"/>
           </a:p>
           <a:p>
             <a:pPr lvl="1">
@@ -8901,6 +8904,16 @@
             </a:pPr>
             <a:r>
               <a:rPr lang="en-US" dirty="0"/>
+              <a:t>*JEP 320: Remove the Java EE and CORBA Modules</a:t>
+            </a:r>
+          </a:p>
+          <a:p>
+            <a:pPr lvl="1">
+              <a:buFont typeface="Wingdings" panose="05000000000000000000" pitchFamily="2" charset="2"/>
+              <a:buChar char="Ø"/>
+            </a:pPr>
+            <a:r>
+              <a:rPr lang="en-US" dirty="0"/>
               <a:t>*JEP 372: Remove the </a:t>
             </a:r>
             <a:r>
@@ -9034,7 +9047,7 @@
         </p:spPr>
         <p:txBody>
           <a:bodyPr>
-            <a:normAutofit/>
+            <a:normAutofit lnSpcReduction="10000"/>
           </a:bodyPr>
           <a:lstStyle/>
           <a:p>
@@ -9044,6 +9057,36 @@
             </a:pPr>
             <a:r>
               <a:rPr lang="en-US" dirty="0"/>
+              <a:t>JEP 320: Remove Java EE and CORBA Modules</a:t>
+            </a:r>
+          </a:p>
+          <a:p>
+            <a:pPr lvl="1">
+              <a:buFont typeface="Wingdings" panose="05000000000000000000" pitchFamily="2" charset="2"/>
+              <a:buChar char="Ø"/>
+            </a:pPr>
+            <a:r>
+              <a:rPr lang="en-US" dirty="0"/>
+              <a:t>Any use of these will result in compile time exceptions</a:t>
+            </a:r>
+          </a:p>
+          <a:p>
+            <a:pPr lvl="2">
+              <a:buFont typeface="Wingdings" panose="05000000000000000000" pitchFamily="2" charset="2"/>
+              <a:buChar char="Ø"/>
+            </a:pPr>
+            <a:r>
+              <a:rPr lang="en-US" dirty="0"/>
+              <a:t>JAX-WS and JAXB  the most common</a:t>
+            </a:r>
+          </a:p>
+          <a:p>
+            <a:pPr>
+              <a:buFont typeface="Wingdings" panose="05000000000000000000" pitchFamily="2" charset="2"/>
+              <a:buChar char="Ø"/>
+            </a:pPr>
+            <a:r>
+              <a:rPr lang="en-US" dirty="0"/>
               <a:t>JEP 372: Remove the </a:t>
             </a:r>
             <a:r>
@@ -9130,7 +9173,7 @@
             </a:pPr>
             <a:r>
               <a:rPr lang="en-US" dirty="0"/>
-              <a:t>It was tightened up in a previous Java release (Java 15)</a:t>
+              <a:t>It was tightened up in a previous Java release (Java 15)Letme1n</a:t>
             </a:r>
           </a:p>
           <a:p>
@@ -9590,73 +9633,34 @@
         </p:spPr>
         <p:txBody>
           <a:bodyPr>
-            <a:normAutofit/>
+            <a:normAutofit fontScale="92500" lnSpcReduction="20000"/>
           </a:bodyPr>
           <a:lstStyle/>
           <a:p>
             <a:r>
               <a:rPr lang="en-US" dirty="0"/>
-              <a:t>Security Manager</a:t>
-            </a:r>
-          </a:p>
-          <a:p>
-            <a:pPr lvl="1">
-              <a:buFont typeface="Wingdings" panose="05000000000000000000" pitchFamily="2" charset="2"/>
-              <a:buChar char="Ø"/>
-            </a:pPr>
-            <a:r>
-              <a:rPr lang="en-US" dirty="0"/>
-              <a:t>Invalid hostname failures</a:t>
-            </a:r>
-          </a:p>
-          <a:p>
-            <a:pPr lvl="1">
-              <a:buFont typeface="Wingdings" panose="05000000000000000000" pitchFamily="2" charset="2"/>
-              <a:buChar char="Ø"/>
-            </a:pPr>
-            <a:r>
-              <a:rPr lang="en-US" dirty="0"/>
-              <a:t>Unable to verify/validate certificates</a:t>
-            </a:r>
-          </a:p>
-          <a:p>
-            <a:pPr lvl="1">
-              <a:buFont typeface="Wingdings" panose="05000000000000000000" pitchFamily="2" charset="2"/>
-              <a:buChar char="Ø"/>
-            </a:pPr>
-            <a:r>
-              <a:rPr lang="en-US" dirty="0"/>
-              <a:t>Other issues depending upon API used and parameters passed</a:t>
-            </a:r>
-          </a:p>
-          <a:p>
-            <a:pPr lvl="1">
-              <a:buFont typeface="Wingdings" panose="05000000000000000000" pitchFamily="2" charset="2"/>
-              <a:buChar char="Ø"/>
-            </a:pPr>
-            <a:r>
-              <a:rPr lang="en-US" dirty="0"/>
-              <a:t>Remedy:</a:t>
-            </a:r>
-          </a:p>
-          <a:p>
-            <a:pPr lvl="2">
-              <a:buFont typeface="Wingdings" panose="05000000000000000000" pitchFamily="2" charset="2"/>
-              <a:buChar char="Ø"/>
-            </a:pPr>
-            <a:r>
-              <a:rPr lang="en-US" dirty="0"/>
-              <a:t>Address any exceptions found during compile (e.g. – Invalid characters in hostname)</a:t>
-            </a:r>
-          </a:p>
-          <a:p>
-            <a:pPr lvl="2">
-              <a:buFont typeface="Wingdings" panose="05000000000000000000" pitchFamily="2" charset="2"/>
-              <a:buChar char="Ø"/>
-            </a:pPr>
-            <a:r>
-              <a:rPr lang="en-US" dirty="0"/>
-              <a:t>Review all deprecations (set compiler to warn) and remove/replace them</a:t>
+              <a:t>Java EE and CORBA removal</a:t>
+            </a:r>
+          </a:p>
+          <a:p>
+            <a:pPr lvl="1"/>
+            <a:r>
+              <a:rPr lang="en-US" dirty="0"/>
+              <a:t>Add the dependencies as needed</a:t>
+            </a:r>
+          </a:p>
+          <a:p>
+            <a:pPr lvl="2"/>
+            <a:r>
+              <a:rPr lang="en-US" dirty="0"/>
+              <a:t>JAXB and JAX-WS are the most common</a:t>
+            </a:r>
+          </a:p>
+          <a:p>
+            <a:pPr lvl="2"/>
+            <a:r>
+              <a:rPr lang="en-US" dirty="0"/>
+              <a:t>Verify application container has required dependencies</a:t>
             </a:r>
           </a:p>
           <a:p>
@@ -9779,7 +9783,50 @@
             </a:r>
           </a:p>
           <a:p>
-            <a:endParaRPr lang="en-US" dirty="0"/>
+            <a:r>
+              <a:rPr lang="en-US" dirty="0"/>
+              <a:t>Strong SDK Encapsulation</a:t>
+            </a:r>
+          </a:p>
+          <a:p>
+            <a:pPr lvl="1">
+              <a:buFont typeface="Wingdings" panose="05000000000000000000" pitchFamily="2" charset="2"/>
+              <a:buChar char="Ø"/>
+            </a:pPr>
+            <a:r>
+              <a:rPr lang="en-US" dirty="0"/>
+              <a:t>Internal Java classes and methods should never be used.</a:t>
+            </a:r>
+          </a:p>
+          <a:p>
+            <a:pPr lvl="1">
+              <a:buFont typeface="Wingdings" panose="05000000000000000000" pitchFamily="2" charset="2"/>
+              <a:buChar char="Ø"/>
+            </a:pPr>
+            <a:r>
+              <a:rPr lang="en-US" dirty="0"/>
+              <a:t>Java internals are now being protected (encapsulated)Thank you for the </a:t>
+            </a:r>
+          </a:p>
+          <a:p>
+            <a:pPr lvl="1">
+              <a:buFont typeface="Wingdings" panose="05000000000000000000" pitchFamily="2" charset="2"/>
+              <a:buChar char="Ø"/>
+            </a:pPr>
+            <a:r>
+              <a:rPr lang="en-US" dirty="0"/>
+              <a:t>Remedy:</a:t>
+            </a:r>
+          </a:p>
+          <a:p>
+            <a:pPr lvl="2">
+              <a:buFont typeface="Wingdings" panose="05000000000000000000" pitchFamily="2" charset="2"/>
+              <a:buChar char="Ø"/>
+            </a:pPr>
+            <a:r>
+              <a:rPr lang="en-US" dirty="0"/>
+              <a:t>Remove and replace any calls to internal core Java classes and methods</a:t>
+            </a:r>
           </a:p>
         </p:txBody>
       </p:sp>
@@ -9859,60 +9906,43 @@
         </p:spPr>
         <p:txBody>
           <a:bodyPr>
-            <a:normAutofit fontScale="92500" lnSpcReduction="10000"/>
+            <a:normAutofit/>
           </a:bodyPr>
           <a:lstStyle/>
           <a:p>
             <a:r>
               <a:rPr lang="en-US" dirty="0"/>
-              <a:t>EE and CORBA removal</a:t>
-            </a:r>
-          </a:p>
-          <a:p>
-            <a:pPr lvl="1"/>
-            <a:r>
-              <a:rPr lang="en-US" dirty="0"/>
-              <a:t>Add the dependencies as needed</a:t>
-            </a:r>
-          </a:p>
-          <a:p>
-            <a:pPr lvl="2"/>
-            <a:r>
-              <a:rPr lang="en-US" dirty="0"/>
-              <a:t>JAXB and JAX-WS are the most common</a:t>
-            </a:r>
-          </a:p>
-          <a:p>
-            <a:pPr lvl="2"/>
-            <a:r>
-              <a:rPr lang="en-US" dirty="0"/>
-              <a:t>Verify application container has required dependencies</a:t>
-            </a:r>
-          </a:p>
-          <a:p>
-            <a:r>
-              <a:rPr lang="en-US" dirty="0"/>
-              <a:t>Strong SDK Encapsulation</a:t>
-            </a:r>
-          </a:p>
-          <a:p>
-            <a:pPr lvl="1">
-              <a:buFont typeface="Wingdings" panose="05000000000000000000" pitchFamily="2" charset="2"/>
-              <a:buChar char="Ø"/>
-            </a:pPr>
-            <a:r>
-              <a:rPr lang="en-US" dirty="0"/>
-              <a:t>Internal Java classes and methods should never be used.</a:t>
-            </a:r>
-          </a:p>
-          <a:p>
-            <a:pPr lvl="1">
-              <a:buFont typeface="Wingdings" panose="05000000000000000000" pitchFamily="2" charset="2"/>
-              <a:buChar char="Ø"/>
-            </a:pPr>
-            <a:r>
-              <a:rPr lang="en-US" dirty="0"/>
-              <a:t>Java internals are now being protected (encapsulated)</a:t>
+              <a:t>Security Manager</a:t>
+            </a:r>
+          </a:p>
+          <a:p>
+            <a:pPr lvl="1">
+              <a:buFont typeface="Wingdings" panose="05000000000000000000" pitchFamily="2" charset="2"/>
+              <a:buChar char="Ø"/>
+            </a:pPr>
+            <a:r>
+              <a:rPr lang="en-US" dirty="0"/>
+              <a:t>Invalid hostname failures</a:t>
+            </a:r>
+          </a:p>
+          <a:p>
+            <a:pPr lvl="1">
+              <a:buFont typeface="Wingdings" panose="05000000000000000000" pitchFamily="2" charset="2"/>
+              <a:buChar char="Ø"/>
+            </a:pPr>
+            <a:r>
+              <a:rPr lang="en-US" dirty="0"/>
+              <a:t>Unable to verify/validate certificates</a:t>
+            </a:r>
+          </a:p>
+          <a:p>
+            <a:pPr lvl="1">
+              <a:buFont typeface="Wingdings" panose="05000000000000000000" pitchFamily="2" charset="2"/>
+              <a:buChar char="Ø"/>
+            </a:pPr>
+            <a:r>
+              <a:rPr lang="en-US" dirty="0"/>
+              <a:t>Other issues depending upon API used and parameters passed</a:t>
             </a:r>
           </a:p>
           <a:p>
@@ -9932,7 +9962,17 @@
             </a:pPr>
             <a:r>
               <a:rPr lang="en-US" dirty="0"/>
-              <a:t>Remove and replace any calls to internal core Java classes and methods</a:t>
+              <a:t>Address any exceptions found during compile (e.g. – Invalid characters in hostname)</a:t>
+            </a:r>
+          </a:p>
+          <a:p>
+            <a:pPr lvl="2">
+              <a:buFont typeface="Wingdings" panose="05000000000000000000" pitchFamily="2" charset="2"/>
+              <a:buChar char="Ø"/>
+            </a:pPr>
+            <a:r>
+              <a:rPr lang="en-US" dirty="0"/>
+              <a:t>Review all deprecations (set compiler to warn) and remove/replace them</a:t>
             </a:r>
           </a:p>
           <a:p>
@@ -9952,7 +9992,7 @@
             </a:pPr>
             <a:r>
               <a:rPr lang="en-US" dirty="0"/>
-              <a:t>Set compiler to warn on deprecations</a:t>
+              <a:t>Set compiler to warn on deprecations and address them (e.g. use of new keyword)</a:t>
             </a:r>
           </a:p>
           <a:p>
@@ -11551,7 +11591,7 @@
         </p:spPr>
         <p:txBody>
           <a:bodyPr>
-            <a:normAutofit fontScale="92500" lnSpcReduction="10000"/>
+            <a:normAutofit fontScale="92500" lnSpcReduction="20000"/>
           </a:bodyPr>
           <a:lstStyle/>
           <a:p>
@@ -11581,7 +11621,55 @@
                   </a:extLst>
                 </a:hlinkClick>
               </a:rPr>
-              <a:t>Exploring the New HTTP Client in Java</a:t>
+              <a:t>GraalVM Native Image </a:t>
+            </a:r>
+            <a:r>
+              <a:rPr lang="en-US" sz="1600" dirty="0" err="1">
+                <a:solidFill>
+                  <a:schemeClr val="accent2"/>
+                </a:solidFill>
+                <a:effectLst>
+                  <a:glow rad="38100">
+                    <a:prstClr val="black">
+                      <a:lumMod val="50000"/>
+                      <a:lumOff val="50000"/>
+                      <a:alpha val="20000"/>
+                    </a:prstClr>
+                  </a:glow>
+                </a:effectLst>
+                <a:hlinkClick r:id="rId2">
+                  <a:extLst>
+                    <a:ext uri="{A12FA001-AC4F-418D-AE19-62706E023703}">
+                      <ahyp:hlinkClr xmlns:ahyp="http://schemas.microsoft.com/office/drawing/2018/hyperlinkcolor" val="tx"/>
+                    </a:ext>
+                  </a:extLst>
+                </a:hlinkClick>
+              </a:rPr>
+              <a:t>Qpid</a:t>
+            </a:r>
+            <a:r>
+              <a:rPr lang="en-US" sz="1600" dirty="0">
+                <a:solidFill>
+                  <a:schemeClr val="accent2"/>
+                </a:solidFill>
+                <a:effectLst>
+                  <a:glow rad="38100">
+                    <a:prstClr val="black">
+                      <a:lumMod val="50000"/>
+                      <a:lumOff val="50000"/>
+                      <a:alpha val="20000"/>
+                    </a:prstClr>
+                  </a:glow>
+                </a:effectLst>
+                <a:hlinkClick r:id="rId2">
+                  <a:extLst>
+                    <a:ext uri="{A12FA001-AC4F-418D-AE19-62706E023703}">
+                      <ahyp:hlinkClr xmlns:ahyp="http://schemas.microsoft.com/office/drawing/2018/hyperlinkcolor" val="tx"/>
+                    </a:ext>
+                  </a:extLst>
+                </a:hlinkClick>
+              </a:rPr>
+              <a:t> Project (where this document lives)</a:t>
             </a:r>
             <a:endParaRPr lang="en-US" sz="1600" dirty="0">
               <a:solidFill>
@@ -11632,7 +11720,7 @@
                   </a:extLst>
                 </a:hlinkClick>
               </a:rPr>
-              <a:t>Forbes: Meet the Team that Built GraalVM, an Energy-Saving Multi-Lingual Compiler Written Entirely in Java </a:t>
+              <a:t>Exploring the New HTTP Client in Java</a:t>
             </a:r>
             <a:endParaRPr lang="en-US" sz="1600" dirty="0">
               <a:solidFill>
@@ -11647,6 +11735,13 @@
                   </a:prstClr>
                 </a:glow>
               </a:effectLst>
+              <a:hlinkClick r:id="rId4">
+                <a:extLst>
+                  <a:ext uri="{A12FA001-AC4F-418D-AE19-62706E023703}">
+                    <ahyp:hlinkClr xmlns:ahyp="http://schemas.microsoft.com/office/drawing/2018/hyperlinkcolor" val="tx"/>
+                  </a:ext>
+                </a:extLst>
+              </a:hlinkClick>
             </a:endParaRPr>
           </a:p>
           <a:p>
@@ -11676,7 +11771,7 @@
                   </a:extLst>
                 </a:hlinkClick>
               </a:rPr>
-              <a:t>GraalVM Project</a:t>
+              <a:t>Forbes: Meet the Team that Built GraalVM, an Energy-Saving Multi-Lingual Compiler Written Entirely in Java </a:t>
             </a:r>
             <a:endParaRPr lang="en-US" sz="1600" dirty="0">
               <a:solidFill>
@@ -11699,7 +11794,7 @@
               <a:buChar char="•"/>
             </a:pPr>
             <a:r>
-              <a:rPr lang="en-US" sz="1600" dirty="0" err="1">
+              <a:rPr lang="en-US" sz="1600" dirty="0">
                 <a:solidFill>
                   <a:schemeClr val="accent2"/>
                 </a:solidFill>
@@ -11720,31 +11815,7 @@
                   </a:extLst>
                 </a:hlinkClick>
               </a:rPr>
-              <a:t>GraalVm</a:t>
-            </a:r>
-            <a:r>
-              <a:rPr lang="en-US" sz="1600" dirty="0">
-                <a:solidFill>
-                  <a:schemeClr val="accent2"/>
-                </a:solidFill>
-                <a:effectLst>
-                  <a:glow rad="38100">
-                    <a:prstClr val="black">
-                      <a:lumMod val="50000"/>
-                      <a:lumOff val="50000"/>
-                      <a:alpha val="20000"/>
-                    </a:prstClr>
-                  </a:glow>
-                </a:effectLst>
-                <a:hlinkClick r:id="rId5">
-                  <a:extLst>
-                    <a:ext uri="{A12FA001-AC4F-418D-AE19-62706E023703}">
-                      <ahyp:hlinkClr xmlns:ahyp="http://schemas.microsoft.com/office/drawing/2018/hyperlinkcolor" val="tx"/>
-                    </a:ext>
-                  </a:extLst>
-                </a:hlinkClick>
-              </a:rPr>
-              <a:t> v22.2 Reference Manuals</a:t>
+              <a:t>GraalVM Project</a:t>
             </a:r>
             <a:endParaRPr lang="en-US" sz="1600" dirty="0">
               <a:solidFill>
@@ -11767,7 +11838,7 @@
               <a:buChar char="•"/>
             </a:pPr>
             <a:r>
-              <a:rPr lang="en-US" sz="1600" dirty="0">
+              <a:rPr lang="en-US" sz="1600" dirty="0" err="1">
                 <a:solidFill>
                   <a:schemeClr val="accent2"/>
                 </a:solidFill>
@@ -11788,7 +11859,31 @@
                   </a:extLst>
                 </a:hlinkClick>
               </a:rPr>
-              <a:t>Improve Launch Times on Java 13 with Application Class-Data Sharing</a:t>
+              <a:t>GraalVm</a:t>
+            </a:r>
+            <a:r>
+              <a:rPr lang="en-US" sz="1600" dirty="0">
+                <a:solidFill>
+                  <a:schemeClr val="accent2"/>
+                </a:solidFill>
+                <a:effectLst>
+                  <a:glow rad="38100">
+                    <a:prstClr val="black">
+                      <a:lumMod val="50000"/>
+                      <a:lumOff val="50000"/>
+                      <a:alpha val="20000"/>
+                    </a:prstClr>
+                  </a:glow>
+                </a:effectLst>
+                <a:hlinkClick r:id="rId6">
+                  <a:extLst>
+                    <a:ext uri="{A12FA001-AC4F-418D-AE19-62706E023703}">
+                      <ahyp:hlinkClr xmlns:ahyp="http://schemas.microsoft.com/office/drawing/2018/hyperlinkcolor" val="tx"/>
+                    </a:ext>
+                  </a:extLst>
+                </a:hlinkClick>
+              </a:rPr>
+              <a:t> v22.2 Reference Manuals</a:t>
             </a:r>
             <a:endParaRPr lang="en-US" sz="1600" dirty="0">
               <a:solidFill>
@@ -11832,25 +11927,22 @@
                   </a:extLst>
                 </a:hlinkClick>
               </a:rPr>
-              <a:t>Introduction to Project Jigsaw</a:t>
-            </a:r>
-            <a:r>
-              <a:rPr lang="en-US" sz="1600" dirty="0">
-                <a:solidFill>
-                  <a:schemeClr val="accent2"/>
-                </a:solidFill>
-                <a:effectLst>
-                  <a:glow rad="38100">
-                    <a:prstClr val="black">
-                      <a:lumMod val="50000"/>
-                      <a:lumOff val="50000"/>
-                      <a:alpha val="20000"/>
-                    </a:prstClr>
-                  </a:glow>
-                </a:effectLst>
-              </a:rPr>
-              <a:t> (Java Modularity)</a:t>
-            </a:r>
+              <a:t>Improve Launch Times on Java 13 with Application Class-Data Sharing</a:t>
+            </a:r>
+            <a:endParaRPr lang="en-US" sz="1600" dirty="0">
+              <a:solidFill>
+                <a:schemeClr val="accent2"/>
+              </a:solidFill>
+              <a:effectLst>
+                <a:glow rad="38100">
+                  <a:prstClr val="black">
+                    <a:lumMod val="50000"/>
+                    <a:lumOff val="50000"/>
+                    <a:alpha val="20000"/>
+                  </a:prstClr>
+                </a:glow>
+              </a:effectLst>
+            </a:endParaRPr>
           </a:p>
           <a:p>
             <a:pPr marL="285750" indent="-285750">
@@ -11879,22 +11971,25 @@
                   </a:extLst>
                 </a:hlinkClick>
               </a:rPr>
-              <a:t>Java 17</a:t>
-            </a:r>
-            <a:endParaRPr lang="en-US" sz="1600" dirty="0">
-              <a:solidFill>
-                <a:schemeClr val="accent2"/>
-              </a:solidFill>
-              <a:effectLst>
-                <a:glow rad="38100">
-                  <a:prstClr val="black">
-                    <a:lumMod val="50000"/>
-                    <a:lumOff val="50000"/>
-                    <a:alpha val="20000"/>
-                  </a:prstClr>
-                </a:glow>
-              </a:effectLst>
-            </a:endParaRPr>
+              <a:t>Introduction to Project Jigsaw</a:t>
+            </a:r>
+            <a:r>
+              <a:rPr lang="en-US" sz="1600" dirty="0">
+                <a:solidFill>
+                  <a:schemeClr val="accent2"/>
+                </a:solidFill>
+                <a:effectLst>
+                  <a:glow rad="38100">
+                    <a:prstClr val="black">
+                      <a:lumMod val="50000"/>
+                      <a:lumOff val="50000"/>
+                      <a:alpha val="20000"/>
+                    </a:prstClr>
+                  </a:glow>
+                </a:effectLst>
+              </a:rPr>
+              <a:t> (Java Modularity)</a:t>
+            </a:r>
           </a:p>
           <a:p>
             <a:pPr marL="285750" indent="-285750">
@@ -11923,7 +12018,7 @@
                   </a:extLst>
                 </a:hlinkClick>
               </a:rPr>
-              <a:t>Java 17: Container Awareness</a:t>
+              <a:t>Java 17 is Here</a:t>
             </a:r>
             <a:endParaRPr lang="en-US" sz="1600" dirty="0">
               <a:solidFill>
@@ -11967,7 +12062,7 @@
                   </a:extLst>
                 </a:hlinkClick>
               </a:rPr>
-              <a:t>Java 17 Features: A comparison between versions 8 and 17. What has changed over the years?</a:t>
+              <a:t>Java 17: Container Awareness</a:t>
             </a:r>
             <a:endParaRPr lang="en-US" sz="1600" dirty="0">
               <a:solidFill>
@@ -12011,7 +12106,7 @@
                   </a:extLst>
                 </a:hlinkClick>
               </a:rPr>
-              <a:t>Java Version Almanac</a:t>
+              <a:t>Java 17 Features: A comparison between versions 8 and 17. What has changed over the years?</a:t>
             </a:r>
             <a:endParaRPr lang="en-US" sz="1600" dirty="0">
               <a:solidFill>
@@ -12055,7 +12150,7 @@
                   </a:extLst>
                 </a:hlinkClick>
               </a:rPr>
-              <a:t>JDK 19: The New Features in Java 19</a:t>
+              <a:t>Java Version Almanac</a:t>
             </a:r>
             <a:endParaRPr lang="en-US" sz="1600" dirty="0">
               <a:solidFill>
@@ -12099,7 +12194,7 @@
                   </a:extLst>
                 </a:hlinkClick>
               </a:rPr>
-              <a:t>JEP-0 (JDK Enhancements and Proposals)</a:t>
+              <a:t>JDK 19: The New Features in Java 19</a:t>
             </a:r>
             <a:endParaRPr lang="en-US" sz="1600" dirty="0">
               <a:solidFill>
@@ -12143,7 +12238,7 @@
                   </a:extLst>
                 </a:hlinkClick>
               </a:rPr>
-              <a:t>Monitoring Java Application with Flight Recorder</a:t>
+              <a:t>JEP-0 (JDK Enhancements and Proposals)</a:t>
             </a:r>
             <a:endParaRPr lang="en-US" sz="1600" dirty="0">
               <a:solidFill>
@@ -12187,7 +12282,7 @@
                   </a:extLst>
                 </a:hlinkClick>
               </a:rPr>
-              <a:t>Oracle JDK Migration Guide</a:t>
+              <a:t>Monitoring Java Application with Flight Recorder</a:t>
             </a:r>
             <a:endParaRPr lang="en-US" sz="1600" dirty="0">
               <a:solidFill>
@@ -12224,6 +12319,50 @@
                   </a:glow>
                 </a:effectLst>
                 <a:hlinkClick r:id="rId16">
+                  <a:extLst>
+                    <a:ext uri="{A12FA001-AC4F-418D-AE19-62706E023703}">
+                      <ahyp:hlinkClr xmlns:ahyp="http://schemas.microsoft.com/office/drawing/2018/hyperlinkcolor" val="tx"/>
+                    </a:ext>
+                  </a:extLst>
+                </a:hlinkClick>
+              </a:rPr>
+              <a:t>Oracle JDK Migration Guide</a:t>
+            </a:r>
+            <a:endParaRPr lang="en-US" sz="1600" dirty="0">
+              <a:solidFill>
+                <a:schemeClr val="accent2"/>
+              </a:solidFill>
+              <a:effectLst>
+                <a:glow rad="38100">
+                  <a:prstClr val="black">
+                    <a:lumMod val="50000"/>
+                    <a:lumOff val="50000"/>
+                    <a:alpha val="20000"/>
+                  </a:prstClr>
+                </a:glow>
+              </a:effectLst>
+            </a:endParaRPr>
+          </a:p>
+          <a:p>
+            <a:pPr marL="285750" indent="-285750">
+              <a:buFont typeface="Arial" panose="020B0604020202020204" pitchFamily="34" charset="0"/>
+              <a:buChar char="•"/>
+            </a:pPr>
+            <a:r>
+              <a:rPr lang="en-US" sz="1600" dirty="0">
+                <a:solidFill>
+                  <a:schemeClr val="accent2"/>
+                </a:solidFill>
+                <a:effectLst>
+                  <a:glow rad="38100">
+                    <a:prstClr val="black">
+                      <a:lumMod val="50000"/>
+                      <a:lumOff val="50000"/>
+                      <a:alpha val="20000"/>
+                    </a:prstClr>
+                  </a:glow>
+                </a:effectLst>
+                <a:hlinkClick r:id="rId17">
                   <a:extLst>
                     <a:ext uri="{A12FA001-AC4F-418D-AE19-62706E023703}">
                       <ahyp:hlinkClr xmlns:ahyp="http://schemas.microsoft.com/office/drawing/2018/hyperlinkcolor" val="tx"/>
@@ -12923,7 +13062,7 @@
         </p:spPr>
         <p:txBody>
           <a:bodyPr>
-            <a:normAutofit/>
+            <a:normAutofit lnSpcReduction="10000"/>
           </a:bodyPr>
           <a:lstStyle/>
           <a:p>
@@ -12940,6 +13079,16 @@
             <a:r>
               <a:rPr lang="en-US" dirty="0"/>
               <a:t>JEP 110: HTTP/2 Client (Incubator)</a:t>
+            </a:r>
+          </a:p>
+          <a:p>
+            <a:pPr lvl="1">
+              <a:buFont typeface="Wingdings" panose="05000000000000000000" pitchFamily="2" charset="2"/>
+              <a:buChar char="Ø"/>
+            </a:pPr>
+            <a:r>
+              <a:rPr lang="en-US" dirty="0"/>
+              <a:t>*JEP 320: Removal of Java EE and CORBA</a:t>
             </a:r>
           </a:p>
           <a:p>

</xml_diff>